<commit_message>
Prettier slides and applied Jay's feedback.
</commit_message>
<xml_diff>
--- a/GeoCDB Statistics.pptx
+++ b/GeoCDB Statistics.pptx
@@ -126,10 +126,10 @@
   <c:roundedCorners val="0"/>
   <mc:AlternateContent xmlns:mc="http://schemas.openxmlformats.org/markup-compatibility/2006">
     <mc:Choice xmlns:c14="http://schemas.microsoft.com/office/drawing/2007/8/2/chart" Requires="c14">
-      <c14:style val="103"/>
+      <c14:style val="102"/>
     </mc:Choice>
     <mc:Fallback>
-      <c:style val="3"/>
+      <c:style val="2"/>
     </mc:Fallback>
   </mc:AlternateContent>
   <c:chart>
@@ -140,7 +140,7 @@
           <a:lstStyle/>
           <a:p>
             <a:pPr>
-              <a:defRPr sz="1400" b="0" i="0" u="none" strike="noStrike" kern="1200" spc="0" baseline="0">
+              <a:defRPr sz="2128" b="1" i="0" u="none" strike="noStrike" kern="1200" cap="all" spc="120" normalizeH="0" baseline="0">
                 <a:solidFill>
                   <a:schemeClr val="tx1">
                     <a:lumMod val="65000"/>
@@ -154,13 +154,8 @@
             </a:pPr>
             <a:r>
               <a:rPr lang="en-US"/>
-              <a:t>Time</a:t>
+              <a:t>Time to Open GeoPackage File by Layer Count</a:t>
             </a:r>
-            <a:r>
-              <a:rPr lang="en-US" baseline="0"/>
-              <a:t> to Open GeoPackage File by Layer Count</a:t>
-            </a:r>
-            <a:endParaRPr lang="en-US"/>
           </a:p>
         </c:rich>
       </c:tx>
@@ -177,7 +172,7 @@
         <a:lstStyle/>
         <a:p>
           <a:pPr>
-            <a:defRPr sz="1400" b="0" i="0" u="none" strike="noStrike" kern="1200" spc="0" baseline="0">
+            <a:defRPr sz="2128" b="1" i="0" u="none" strike="noStrike" kern="1200" cap="all" spc="120" normalizeH="0" baseline="0">
               <a:solidFill>
                 <a:schemeClr val="tx1">
                   <a:lumMod val="65000"/>
@@ -214,31 +209,26 @@
             </c:strRef>
           </c:tx>
           <c:spPr>
-            <a:ln w="28575" cap="rnd">
+            <a:ln w="22225" cap="rnd">
               <a:solidFill>
-                <a:schemeClr val="accent1">
-                  <a:shade val="76000"/>
-                </a:schemeClr>
+                <a:schemeClr val="accent1"/>
               </a:solidFill>
               <a:round/>
             </a:ln>
             <a:effectLst/>
           </c:spPr>
           <c:marker>
-            <c:symbol val="circle"/>
-            <c:size val="5"/>
+            <c:symbol val="diamond"/>
+            <c:size val="6"/>
             <c:spPr>
               <a:solidFill>
-                <a:schemeClr val="accent1">
-                  <a:shade val="76000"/>
-                </a:schemeClr>
+                <a:schemeClr val="accent1"/>
               </a:solidFill>
               <a:ln w="9525">
                 <a:solidFill>
-                  <a:schemeClr val="accent1">
-                    <a:shade val="76000"/>
-                  </a:schemeClr>
+                  <a:schemeClr val="accent1"/>
                 </a:solidFill>
+                <a:round/>
               </a:ln>
               <a:effectLst/>
             </c:spPr>
@@ -248,11 +238,9 @@
             <c:spPr>
               <a:ln w="19050" cap="rnd">
                 <a:solidFill>
-                  <a:schemeClr val="accent1">
-                    <a:shade val="76000"/>
-                  </a:schemeClr>
+                  <a:schemeClr val="accent1"/>
                 </a:solidFill>
-                <a:prstDash val="sysDot"/>
+                <a:prstDash val="sysDash"/>
               </a:ln>
               <a:effectLst/>
             </c:spPr>
@@ -348,31 +336,26 @@
             </c:strRef>
           </c:tx>
           <c:spPr>
-            <a:ln w="28575" cap="rnd">
+            <a:ln w="22225" cap="rnd">
               <a:solidFill>
-                <a:schemeClr val="accent1">
-                  <a:tint val="77000"/>
-                </a:schemeClr>
+                <a:schemeClr val="accent2"/>
               </a:solidFill>
               <a:round/>
             </a:ln>
             <a:effectLst/>
           </c:spPr>
           <c:marker>
-            <c:symbol val="circle"/>
-            <c:size val="5"/>
+            <c:symbol val="square"/>
+            <c:size val="6"/>
             <c:spPr>
               <a:solidFill>
-                <a:schemeClr val="accent1">
-                  <a:tint val="77000"/>
-                </a:schemeClr>
+                <a:schemeClr val="accent2"/>
               </a:solidFill>
               <a:ln w="9525">
                 <a:solidFill>
-                  <a:schemeClr val="accent1">
-                    <a:tint val="77000"/>
-                  </a:schemeClr>
+                  <a:schemeClr val="accent2"/>
                 </a:solidFill>
+                <a:round/>
               </a:ln>
               <a:effectLst/>
             </c:spPr>
@@ -440,6 +423,20 @@
         </c:scaling>
         <c:delete val="0"/>
         <c:axPos val="b"/>
+        <c:majorGridlines>
+          <c:spPr>
+            <a:ln w="9525" cap="flat" cmpd="sng" algn="ctr">
+              <a:solidFill>
+                <a:schemeClr val="tx1">
+                  <a:lumMod val="15000"/>
+                  <a:lumOff val="85000"/>
+                </a:schemeClr>
+              </a:solidFill>
+              <a:round/>
+            </a:ln>
+            <a:effectLst/>
+          </c:spPr>
+        </c:majorGridlines>
         <c:numFmt formatCode="General" sourceLinked="1"/>
         <c:majorTickMark val="none"/>
         <c:minorTickMark val="none"/>
@@ -462,7 +459,7 @@
           <a:lstStyle/>
           <a:p>
             <a:pPr>
-              <a:defRPr sz="900" b="0" i="0" u="none" strike="noStrike" kern="1200" baseline="0">
+              <a:defRPr sz="1064" b="0" i="0" u="none" strike="noStrike" kern="1200" cap="all" spc="120" normalizeH="0" baseline="0">
                 <a:solidFill>
                   <a:schemeClr val="tx1">
                     <a:lumMod val="65000"/>
@@ -492,20 +489,6 @@
         </c:scaling>
         <c:delete val="0"/>
         <c:axPos val="l"/>
-        <c:majorGridlines>
-          <c:spPr>
-            <a:ln w="9525" cap="flat" cmpd="sng" algn="ctr">
-              <a:solidFill>
-                <a:schemeClr val="tx1">
-                  <a:lumMod val="15000"/>
-                  <a:lumOff val="85000"/>
-                </a:schemeClr>
-              </a:solidFill>
-              <a:round/>
-            </a:ln>
-            <a:effectLst/>
-          </c:spPr>
-        </c:majorGridlines>
         <c:title>
           <c:tx>
             <c:rich>
@@ -513,7 +496,7 @@
               <a:lstStyle/>
               <a:p>
                 <a:pPr>
-                  <a:defRPr sz="1000" b="0" i="0" u="none" strike="noStrike" kern="1200" baseline="0">
+                  <a:defRPr sz="1197" b="0" i="0" u="none" strike="noStrike" kern="1200" cap="all" baseline="0">
                     <a:solidFill>
                       <a:schemeClr val="tx1">
                         <a:lumMod val="65000"/>
@@ -545,7 +528,7 @@
             <a:lstStyle/>
             <a:p>
               <a:pPr>
-                <a:defRPr sz="1000" b="0" i="0" u="none" strike="noStrike" kern="1200" baseline="0">
+                <a:defRPr sz="1197" b="0" i="0" u="none" strike="noStrike" kern="1200" cap="all" baseline="0">
                   <a:solidFill>
                     <a:schemeClr val="tx1">
                       <a:lumMod val="65000"/>
@@ -567,8 +550,14 @@
         <c:tickLblPos val="nextTo"/>
         <c:spPr>
           <a:noFill/>
-          <a:ln>
-            <a:noFill/>
+          <a:ln w="9525" cap="flat" cmpd="sng" algn="ctr">
+            <a:solidFill>
+              <a:schemeClr val="dk1">
+                <a:lumMod val="15000"/>
+                <a:lumOff val="85000"/>
+              </a:schemeClr>
+            </a:solidFill>
+            <a:round/>
           </a:ln>
           <a:effectLst/>
         </c:spPr>
@@ -577,7 +566,7 @@
           <a:lstStyle/>
           <a:p>
             <a:pPr>
-              <a:defRPr sz="900" b="0" i="0" u="none" strike="noStrike" kern="1200" baseline="0">
+              <a:defRPr sz="1197" b="0" i="0" u="none" strike="noStrike" kern="1200" baseline="0">
                 <a:solidFill>
                   <a:schemeClr val="tx1">
                     <a:lumMod val="65000"/>
@@ -605,7 +594,7 @@
       </c:spPr>
     </c:plotArea>
     <c:legend>
-      <c:legendPos val="b"/>
+      <c:legendPos val="t"/>
       <c:overlay val="0"/>
       <c:spPr>
         <a:noFill/>
@@ -619,7 +608,7 @@
         <a:lstStyle/>
         <a:p>
           <a:pPr>
-            <a:defRPr sz="900" b="0" i="0" u="none" strike="noStrike" kern="1200" baseline="0">
+            <a:defRPr sz="1197" b="0" i="0" u="none" strike="noStrike" kern="1200" baseline="0">
               <a:solidFill>
                 <a:schemeClr val="tx1">
                   <a:lumMod val="65000"/>
@@ -670,18 +659,47 @@
 </file>
 
 <file path=ppt/charts/colors1.xml><?xml version="1.0" encoding="utf-8"?>
-<cs:colorStyle xmlns:cs="http://schemas.microsoft.com/office/drawing/2012/chartStyle" xmlns:a="http://schemas.openxmlformats.org/drawingml/2006/main" meth="withinLinear" id="3">
+<cs:colorStyle xmlns:cs="http://schemas.microsoft.com/office/drawing/2012/chartStyle" xmlns:a="http://schemas.openxmlformats.org/drawingml/2006/main" meth="cycle" id="10">
   <a:schemeClr val="accent1"/>
-  <a:schemeClr val="accent1"/>
-  <a:schemeClr val="accent1"/>
-  <a:schemeClr val="accent1"/>
-  <a:schemeClr val="accent1"/>
-  <a:schemeClr val="accent1"/>
+  <a:schemeClr val="accent2"/>
+  <a:schemeClr val="accent3"/>
+  <a:schemeClr val="accent4"/>
+  <a:schemeClr val="accent5"/>
+  <a:schemeClr val="accent6"/>
+  <cs:variation/>
+  <cs:variation>
+    <a:lumMod val="60000"/>
+  </cs:variation>
+  <cs:variation>
+    <a:lumMod val="80000"/>
+    <a:lumOff val="20000"/>
+  </cs:variation>
+  <cs:variation>
+    <a:lumMod val="80000"/>
+  </cs:variation>
+  <cs:variation>
+    <a:lumMod val="60000"/>
+    <a:lumOff val="40000"/>
+  </cs:variation>
+  <cs:variation>
+    <a:lumMod val="50000"/>
+  </cs:variation>
+  <cs:variation>
+    <a:lumMod val="70000"/>
+    <a:lumOff val="30000"/>
+  </cs:variation>
+  <cs:variation>
+    <a:lumMod val="70000"/>
+  </cs:variation>
+  <cs:variation>
+    <a:lumMod val="50000"/>
+    <a:lumOff val="50000"/>
+  </cs:variation>
 </cs:colorStyle>
 </file>
 
 <file path=ppt/charts/style1.xml><?xml version="1.0" encoding="utf-8"?>
-<cs:chartStyle xmlns:cs="http://schemas.microsoft.com/office/drawing/2012/chartStyle" xmlns:a="http://schemas.openxmlformats.org/drawingml/2006/main" id="332">
+<cs:chartStyle xmlns:cs="http://schemas.microsoft.com/office/drawing/2012/chartStyle" xmlns:a="http://schemas.openxmlformats.org/drawingml/2006/main" id="239">
   <cs:axisTitle>
     <cs:lnRef idx="0"/>
     <cs:fillRef idx="0"/>
@@ -692,7 +710,7 @@
         <a:lumOff val="35000"/>
       </a:schemeClr>
     </cs:fontRef>
-    <cs:defRPr sz="1000" kern="1200"/>
+    <cs:defRPr sz="1197" kern="1200" cap="all"/>
   </cs:axisTitle>
   <cs:categoryAxis>
     <cs:lnRef idx="0"/>
@@ -715,18 +733,18 @@
         <a:round/>
       </a:ln>
     </cs:spPr>
-    <cs:defRPr sz="900" kern="1200"/>
+    <cs:defRPr sz="1064" kern="1200" cap="all" spc="120" normalizeH="0" baseline="0"/>
   </cs:categoryAxis>
   <cs:chartArea mods="allowNoFillOverride allowNoLineOverride">
     <cs:lnRef idx="0"/>
     <cs:fillRef idx="0"/>
     <cs:effectRef idx="0"/>
     <cs:fontRef idx="minor">
-      <a:schemeClr val="tx1"/>
+      <a:schemeClr val="dk1"/>
     </cs:fontRef>
     <cs:spPr>
       <a:solidFill>
-        <a:schemeClr val="bg1"/>
+        <a:schemeClr val="lt1"/>
       </a:solidFill>
       <a:ln w="9525" cap="flat" cmpd="sng" algn="ctr">
         <a:solidFill>
@@ -738,7 +756,7 @@
         <a:round/>
       </a:ln>
     </cs:spPr>
-    <cs:defRPr sz="1000" kern="1200"/>
+    <cs:defRPr sz="1197" kern="1200"/>
   </cs:chartArea>
   <cs:dataLabel>
     <cs:lnRef idx="0"/>
@@ -746,11 +764,11 @@
     <cs:effectRef idx="0"/>
     <cs:fontRef idx="minor">
       <a:schemeClr val="tx1">
-        <a:lumMod val="75000"/>
-        <a:lumOff val="25000"/>
+        <a:lumMod val="50000"/>
+        <a:lumOff val="50000"/>
       </a:schemeClr>
     </cs:fontRef>
-    <cs:defRPr sz="900" kern="1200"/>
+    <cs:defRPr sz="1197" b="0" i="0" u="none" strike="noStrike" kern="1200" baseline="0"/>
   </cs:dataLabel>
   <cs:dataLabelCallout>
     <cs:lnRef idx="0"/>
@@ -775,42 +793,52 @@
         </a:solidFill>
       </a:ln>
     </cs:spPr>
-    <cs:defRPr sz="900" kern="1200"/>
+    <cs:defRPr sz="1197" kern="1200"/>
     <cs:bodyPr rot="0" spcFirstLastPara="1" vertOverflow="clip" horzOverflow="clip" vert="horz" wrap="square" lIns="36576" tIns="18288" rIns="36576" bIns="18288" anchor="ctr" anchorCtr="1">
       <a:spAutoFit/>
     </cs:bodyPr>
   </cs:dataLabelCallout>
   <cs:dataPoint>
     <cs:lnRef idx="0"/>
-    <cs:fillRef idx="1">
+    <cs:fillRef idx="0">
       <cs:styleClr val="auto"/>
     </cs:fillRef>
     <cs:effectRef idx="0"/>
     <cs:fontRef idx="minor">
-      <a:schemeClr val="tx1"/>
+      <a:schemeClr val="dk1"/>
     </cs:fontRef>
+    <cs:spPr>
+      <a:solidFill>
+        <a:schemeClr val="phClr"/>
+      </a:solidFill>
+    </cs:spPr>
   </cs:dataPoint>
   <cs:dataPoint3D>
     <cs:lnRef idx="0"/>
-    <cs:fillRef idx="1">
+    <cs:fillRef idx="0">
       <cs:styleClr val="auto"/>
     </cs:fillRef>
     <cs:effectRef idx="0"/>
     <cs:fontRef idx="minor">
-      <a:schemeClr val="tx1"/>
+      <a:schemeClr val="dk1"/>
     </cs:fontRef>
+    <cs:spPr>
+      <a:solidFill>
+        <a:schemeClr val="phClr"/>
+      </a:solidFill>
+    </cs:spPr>
   </cs:dataPoint3D>
   <cs:dataPointLine>
     <cs:lnRef idx="0">
       <cs:styleClr val="auto"/>
     </cs:lnRef>
-    <cs:fillRef idx="1"/>
+    <cs:fillRef idx="0"/>
     <cs:effectRef idx="0"/>
     <cs:fontRef idx="minor">
-      <a:schemeClr val="tx1"/>
+      <a:schemeClr val="dk1"/>
     </cs:fontRef>
     <cs:spPr>
-      <a:ln w="28575" cap="rnd">
+      <a:ln w="22225" cap="rnd">
         <a:solidFill>
           <a:schemeClr val="phClr"/>
         </a:solidFill>
@@ -822,30 +850,34 @@
     <cs:lnRef idx="0">
       <cs:styleClr val="auto"/>
     </cs:lnRef>
-    <cs:fillRef idx="1">
+    <cs:fillRef idx="0">
       <cs:styleClr val="auto"/>
     </cs:fillRef>
     <cs:effectRef idx="0"/>
     <cs:fontRef idx="minor">
-      <a:schemeClr val="tx1"/>
+      <a:schemeClr val="dk1"/>
     </cs:fontRef>
     <cs:spPr>
+      <a:solidFill>
+        <a:schemeClr val="phClr"/>
+      </a:solidFill>
       <a:ln w="9525">
         <a:solidFill>
           <a:schemeClr val="phClr"/>
         </a:solidFill>
+        <a:round/>
       </a:ln>
     </cs:spPr>
   </cs:dataPointMarker>
-  <cs:dataPointMarkerLayout symbol="circle" size="5"/>
+  <cs:dataPointMarkerLayout size="6"/>
   <cs:dataPointWireframe>
     <cs:lnRef idx="0">
       <cs:styleClr val="auto"/>
     </cs:lnRef>
-    <cs:fillRef idx="1"/>
+    <cs:fillRef idx="0"/>
     <cs:effectRef idx="0"/>
     <cs:fontRef idx="minor">
-      <a:schemeClr val="tx1"/>
+      <a:schemeClr val="dk1"/>
     </cs:fontRef>
     <cs:spPr>
       <a:ln w="9525" cap="rnd">
@@ -867,18 +899,16 @@
       </a:schemeClr>
     </cs:fontRef>
     <cs:spPr>
-      <a:noFill/>
-      <a:ln w="9525" cap="flat" cmpd="sng" algn="ctr">
+      <a:ln w="9525">
         <a:solidFill>
           <a:schemeClr val="tx1">
             <a:lumMod val="15000"/>
             <a:lumOff val="85000"/>
           </a:schemeClr>
         </a:solidFill>
-        <a:round/>
       </a:ln>
     </cs:spPr>
-    <cs:defRPr sz="900" kern="1200"/>
+    <cs:defRPr sz="1197" kern="1200"/>
   </cs:dataTable>
   <cs:downBar>
     <cs:lnRef idx="0"/>
@@ -890,15 +920,15 @@
     <cs:spPr>
       <a:solidFill>
         <a:schemeClr val="dk1">
-          <a:lumMod val="65000"/>
-          <a:lumOff val="35000"/>
+          <a:lumMod val="75000"/>
+          <a:lumOff val="25000"/>
         </a:schemeClr>
       </a:solidFill>
       <a:ln w="9525">
         <a:solidFill>
           <a:schemeClr val="tx1">
-            <a:lumMod val="65000"/>
-            <a:lumOff val="35000"/>
+            <a:lumMod val="15000"/>
+            <a:lumOff val="85000"/>
           </a:schemeClr>
         </a:solidFill>
       </a:ln>
@@ -909,17 +939,16 @@
     <cs:fillRef idx="0"/>
     <cs:effectRef idx="0"/>
     <cs:fontRef idx="minor">
-      <a:schemeClr val="tx1"/>
+      <a:schemeClr val="dk1"/>
     </cs:fontRef>
     <cs:spPr>
-      <a:ln w="9525" cap="flat" cmpd="sng" algn="ctr">
+      <a:ln w="9525">
         <a:solidFill>
           <a:schemeClr val="tx1">
             <a:lumMod val="35000"/>
             <a:lumOff val="65000"/>
           </a:schemeClr>
         </a:solidFill>
-        <a:round/>
       </a:ln>
     </cs:spPr>
   </cs:dropLine>
@@ -928,10 +957,10 @@
     <cs:fillRef idx="0"/>
     <cs:effectRef idx="0"/>
     <cs:fontRef idx="minor">
-      <a:schemeClr val="tx1"/>
+      <a:schemeClr val="dk1"/>
     </cs:fontRef>
     <cs:spPr>
-      <a:ln w="9525" cap="flat" cmpd="sng" algn="ctr">
+      <a:ln w="9525">
         <a:solidFill>
           <a:schemeClr val="tx1">
             <a:lumMod val="65000"/>
@@ -947,21 +976,15 @@
     <cs:fillRef idx="0"/>
     <cs:effectRef idx="0"/>
     <cs:fontRef idx="minor">
-      <a:schemeClr val="tx1"/>
+      <a:schemeClr val="dk1"/>
     </cs:fontRef>
-    <cs:spPr>
-      <a:noFill/>
-      <a:ln>
-        <a:noFill/>
-      </a:ln>
-    </cs:spPr>
   </cs:floor>
   <cs:gridlineMajor>
     <cs:lnRef idx="0"/>
     <cs:fillRef idx="0"/>
     <cs:effectRef idx="0"/>
     <cs:fontRef idx="minor">
-      <a:schemeClr val="tx1"/>
+      <a:schemeClr val="dk1"/>
     </cs:fontRef>
     <cs:spPr>
       <a:ln w="9525" cap="flat" cmpd="sng" algn="ctr">
@@ -980,17 +1003,16 @@
     <cs:fillRef idx="0"/>
     <cs:effectRef idx="0"/>
     <cs:fontRef idx="minor">
-      <a:schemeClr val="tx1"/>
+      <a:schemeClr val="dk1"/>
     </cs:fontRef>
     <cs:spPr>
-      <a:ln w="9525" cap="flat" cmpd="sng" algn="ctr">
+      <a:ln>
         <a:solidFill>
           <a:schemeClr val="tx1">
             <a:lumMod val="5000"/>
             <a:lumOff val="95000"/>
           </a:schemeClr>
         </a:solidFill>
-        <a:round/>
       </a:ln>
     </cs:spPr>
   </cs:gridlineMinor>
@@ -999,17 +1021,16 @@
     <cs:fillRef idx="0"/>
     <cs:effectRef idx="0"/>
     <cs:fontRef idx="minor">
-      <a:schemeClr val="tx1"/>
+      <a:schemeClr val="dk1"/>
     </cs:fontRef>
     <cs:spPr>
-      <a:ln w="9525" cap="flat" cmpd="sng" algn="ctr">
+      <a:ln w="9525">
         <a:solidFill>
           <a:schemeClr val="tx1">
-            <a:lumMod val="75000"/>
-            <a:lumOff val="25000"/>
+            <a:lumMod val="50000"/>
+            <a:lumOff val="50000"/>
           </a:schemeClr>
         </a:solidFill>
-        <a:round/>
       </a:ln>
     </cs:spPr>
   </cs:hiLoLine>
@@ -1018,17 +1039,16 @@
     <cs:fillRef idx="0"/>
     <cs:effectRef idx="0"/>
     <cs:fontRef idx="minor">
-      <a:schemeClr val="tx1"/>
+      <a:schemeClr val="dk1"/>
     </cs:fontRef>
     <cs:spPr>
-      <a:ln w="9525" cap="flat" cmpd="sng" algn="ctr">
+      <a:ln w="9525">
         <a:solidFill>
           <a:schemeClr val="tx1">
             <a:lumMod val="35000"/>
             <a:lumOff val="65000"/>
           </a:schemeClr>
         </a:solidFill>
-        <a:round/>
       </a:ln>
     </cs:spPr>
   </cs:leaderLine>
@@ -1042,14 +1062,14 @@
         <a:lumOff val="35000"/>
       </a:schemeClr>
     </cs:fontRef>
-    <cs:defRPr sz="900" kern="1200"/>
+    <cs:defRPr sz="1197" kern="1200"/>
   </cs:legend>
   <cs:plotArea mods="allowNoFillOverride allowNoLineOverride">
     <cs:lnRef idx="0"/>
     <cs:fillRef idx="0"/>
     <cs:effectRef idx="0"/>
     <cs:fontRef idx="minor">
-      <a:schemeClr val="tx1"/>
+      <a:schemeClr val="dk1"/>
     </cs:fontRef>
   </cs:plotArea>
   <cs:plotArea3D mods="allowNoFillOverride allowNoLineOverride">
@@ -1057,7 +1077,7 @@
     <cs:fillRef idx="0"/>
     <cs:effectRef idx="0"/>
     <cs:fontRef idx="minor">
-      <a:schemeClr val="tx1"/>
+      <a:schemeClr val="dk1"/>
     </cs:fontRef>
   </cs:plotArea3D>
   <cs:seriesAxis>
@@ -1070,17 +1090,28 @@
         <a:lumOff val="35000"/>
       </a:schemeClr>
     </cs:fontRef>
-    <cs:defRPr sz="900" kern="1200"/>
+    <cs:spPr>
+      <a:ln w="9525" cap="flat" cmpd="sng" algn="ctr">
+        <a:solidFill>
+          <a:schemeClr val="tx1">
+            <a:lumMod val="15000"/>
+            <a:lumOff val="85000"/>
+          </a:schemeClr>
+        </a:solidFill>
+        <a:round/>
+      </a:ln>
+    </cs:spPr>
+    <cs:defRPr sz="1197" kern="1200"/>
   </cs:seriesAxis>
   <cs:seriesLine>
     <cs:lnRef idx="0"/>
     <cs:fillRef idx="0"/>
     <cs:effectRef idx="0"/>
     <cs:fontRef idx="minor">
-      <a:schemeClr val="tx1"/>
+      <a:schemeClr val="dk1"/>
     </cs:fontRef>
     <cs:spPr>
-      <a:ln w="9525" cap="flat" cmpd="sng" algn="ctr">
+      <a:ln w="9525">
         <a:solidFill>
           <a:schemeClr val="tx1">
             <a:lumMod val="35000"/>
@@ -1101,7 +1132,7 @@
         <a:lumOff val="35000"/>
       </a:schemeClr>
     </cs:fontRef>
-    <cs:defRPr sz="1400" b="0" kern="1200" spc="0" baseline="0"/>
+    <cs:defRPr sz="2128" b="1" kern="1200" cap="all" spc="120" normalizeH="0" baseline="0"/>
   </cs:title>
   <cs:trendline>
     <cs:lnRef idx="0">
@@ -1110,14 +1141,14 @@
     <cs:fillRef idx="0"/>
     <cs:effectRef idx="0"/>
     <cs:fontRef idx="minor">
-      <a:schemeClr val="tx1"/>
+      <a:schemeClr val="dk1"/>
     </cs:fontRef>
     <cs:spPr>
       <a:ln w="19050" cap="rnd">
         <a:solidFill>
           <a:schemeClr val="phClr"/>
         </a:solidFill>
-        <a:prstDash val="sysDot"/>
+        <a:prstDash val="sysDash"/>
       </a:ln>
     </cs:spPr>
   </cs:trendline>
@@ -1131,7 +1162,7 @@
         <a:lumOff val="35000"/>
       </a:schemeClr>
     </cs:fontRef>
-    <cs:defRPr sz="900" kern="1200"/>
+    <cs:defRPr sz="1064" kern="1200"/>
   </cs:trendlineLabel>
   <cs:upBar>
     <cs:lnRef idx="0"/>
@@ -1147,8 +1178,8 @@
       <a:ln w="9525">
         <a:solidFill>
           <a:schemeClr val="tx1">
-            <a:lumMod val="15000"/>
-            <a:lumOff val="85000"/>
+            <a:lumMod val="65000"/>
+            <a:lumOff val="35000"/>
           </a:schemeClr>
         </a:solidFill>
       </a:ln>
@@ -1164,21 +1195,26 @@
         <a:lumOff val="35000"/>
       </a:schemeClr>
     </cs:fontRef>
-    <cs:defRPr sz="900" kern="1200"/>
+    <cs:spPr>
+      <a:ln w="9525" cap="flat" cmpd="sng" algn="ctr">
+        <a:solidFill>
+          <a:schemeClr val="dk1">
+            <a:lumMod val="15000"/>
+            <a:lumOff val="85000"/>
+          </a:schemeClr>
+        </a:solidFill>
+        <a:round/>
+      </a:ln>
+    </cs:spPr>
+    <cs:defRPr sz="1197" kern="1200"/>
   </cs:valueAxis>
   <cs:wall>
     <cs:lnRef idx="0"/>
     <cs:fillRef idx="0"/>
     <cs:effectRef idx="0"/>
     <cs:fontRef idx="minor">
-      <a:schemeClr val="tx1"/>
+      <a:schemeClr val="dk1"/>
     </cs:fontRef>
-    <cs:spPr>
-      <a:noFill/>
-      <a:ln>
-        <a:noFill/>
-      </a:ln>
-    </cs:spPr>
   </cs:wall>
 </cs:chartStyle>
 </file>
@@ -1965,11 +2001,795 @@
 </dgm:colorsDef>
 </file>
 
+<file path=ppt/diagrams/colors2.xml><?xml version="1.0" encoding="utf-8"?>
+<dgm:colorsDef xmlns:dgm="http://schemas.openxmlformats.org/drawingml/2006/diagram" xmlns:a="http://schemas.openxmlformats.org/drawingml/2006/main" uniqueId="urn:microsoft.com/office/officeart/2018/5/colors/Iconchunking_neutralbg_colorful2">
+  <dgm:title val=""/>
+  <dgm:desc val=""/>
+  <dgm:catLst>
+    <dgm:cat type="colorful" pri="10200"/>
+  </dgm:catLst>
+  <dgm:styleLbl name="node0">
+    <dgm:fillClrLst meth="repeat">
+      <a:schemeClr val="accent1"/>
+    </dgm:fillClrLst>
+    <dgm:linClrLst meth="repeat">
+      <a:schemeClr val="lt1"/>
+    </dgm:linClrLst>
+    <dgm:effectClrLst/>
+    <dgm:txLinClrLst/>
+    <dgm:txFillClrLst/>
+    <dgm:txEffectClrLst/>
+  </dgm:styleLbl>
+  <dgm:styleLbl name="node1">
+    <dgm:fillClrLst>
+      <a:schemeClr val="accent2"/>
+      <a:schemeClr val="accent3"/>
+    </dgm:fillClrLst>
+    <dgm:linClrLst meth="repeat">
+      <a:schemeClr val="lt1">
+        <a:alpha val="0"/>
+      </a:schemeClr>
+    </dgm:linClrLst>
+    <dgm:effectClrLst/>
+    <dgm:txLinClrLst/>
+    <dgm:txFillClrLst/>
+    <dgm:txEffectClrLst/>
+  </dgm:styleLbl>
+  <dgm:styleLbl name="alignNode1">
+    <dgm:fillClrLst>
+      <a:schemeClr val="accent2"/>
+      <a:schemeClr val="accent3"/>
+    </dgm:fillClrLst>
+    <dgm:linClrLst>
+      <a:schemeClr val="accent2"/>
+      <a:schemeClr val="accent3"/>
+    </dgm:linClrLst>
+    <dgm:effectClrLst/>
+    <dgm:txLinClrLst/>
+    <dgm:txFillClrLst/>
+    <dgm:txEffectClrLst/>
+  </dgm:styleLbl>
+  <dgm:styleLbl name="lnNode1">
+    <dgm:fillClrLst>
+      <a:schemeClr val="accent2"/>
+      <a:schemeClr val="accent3"/>
+    </dgm:fillClrLst>
+    <dgm:linClrLst meth="repeat">
+      <a:schemeClr val="lt1"/>
+    </dgm:linClrLst>
+    <dgm:effectClrLst/>
+    <dgm:txLinClrLst/>
+    <dgm:txFillClrLst/>
+    <dgm:txEffectClrLst/>
+  </dgm:styleLbl>
+  <dgm:styleLbl name="vennNode1">
+    <dgm:fillClrLst>
+      <a:schemeClr val="accent2">
+        <a:alpha val="50000"/>
+      </a:schemeClr>
+      <a:schemeClr val="accent3">
+        <a:alpha val="50000"/>
+      </a:schemeClr>
+    </dgm:fillClrLst>
+    <dgm:linClrLst meth="repeat">
+      <a:schemeClr val="lt1"/>
+    </dgm:linClrLst>
+    <dgm:effectClrLst/>
+    <dgm:txLinClrLst/>
+    <dgm:txFillClrLst/>
+    <dgm:txEffectClrLst/>
+  </dgm:styleLbl>
+  <dgm:styleLbl name="node2">
+    <dgm:fillClrLst>
+      <a:schemeClr val="accent3"/>
+    </dgm:fillClrLst>
+    <dgm:linClrLst meth="repeat">
+      <a:schemeClr val="lt1"/>
+    </dgm:linClrLst>
+    <dgm:effectClrLst/>
+    <dgm:txLinClrLst/>
+    <dgm:txFillClrLst/>
+    <dgm:txEffectClrLst/>
+  </dgm:styleLbl>
+  <dgm:styleLbl name="node3">
+    <dgm:fillClrLst>
+      <a:schemeClr val="accent4"/>
+    </dgm:fillClrLst>
+    <dgm:linClrLst meth="repeat">
+      <a:schemeClr val="lt1"/>
+    </dgm:linClrLst>
+    <dgm:effectClrLst/>
+    <dgm:txLinClrLst/>
+    <dgm:txFillClrLst/>
+    <dgm:txEffectClrLst/>
+  </dgm:styleLbl>
+  <dgm:styleLbl name="node4">
+    <dgm:fillClrLst>
+      <a:schemeClr val="accent5"/>
+    </dgm:fillClrLst>
+    <dgm:linClrLst meth="repeat">
+      <a:schemeClr val="lt1"/>
+    </dgm:linClrLst>
+    <dgm:effectClrLst/>
+    <dgm:txLinClrLst/>
+    <dgm:txFillClrLst/>
+    <dgm:txEffectClrLst/>
+  </dgm:styleLbl>
+  <dgm:styleLbl name="fgImgPlace1">
+    <dgm:fillClrLst>
+      <a:schemeClr val="accent2">
+        <a:tint val="50000"/>
+      </a:schemeClr>
+      <a:schemeClr val="accent3">
+        <a:tint val="50000"/>
+      </a:schemeClr>
+    </dgm:fillClrLst>
+    <dgm:linClrLst meth="repeat">
+      <a:schemeClr val="lt1"/>
+    </dgm:linClrLst>
+    <dgm:effectClrLst/>
+    <dgm:txLinClrLst/>
+    <dgm:txFillClrLst meth="repeat">
+      <a:schemeClr val="lt1"/>
+    </dgm:txFillClrLst>
+    <dgm:txEffectClrLst/>
+  </dgm:styleLbl>
+  <dgm:styleLbl name="alignImgPlace1">
+    <dgm:fillClrLst>
+      <a:schemeClr val="accent2">
+        <a:tint val="50000"/>
+      </a:schemeClr>
+      <a:schemeClr val="accent3">
+        <a:tint val="20000"/>
+      </a:schemeClr>
+    </dgm:fillClrLst>
+    <dgm:linClrLst meth="repeat">
+      <a:schemeClr val="lt1"/>
+    </dgm:linClrLst>
+    <dgm:effectClrLst/>
+    <dgm:txLinClrLst/>
+    <dgm:txFillClrLst meth="repeat">
+      <a:schemeClr val="lt1"/>
+    </dgm:txFillClrLst>
+    <dgm:txEffectClrLst/>
+  </dgm:styleLbl>
+  <dgm:styleLbl name="bgImgPlace1">
+    <dgm:fillClrLst>
+      <a:schemeClr val="accent2">
+        <a:tint val="50000"/>
+      </a:schemeClr>
+      <a:schemeClr val="accent3">
+        <a:tint val="20000"/>
+      </a:schemeClr>
+    </dgm:fillClrLst>
+    <dgm:linClrLst meth="repeat">
+      <a:schemeClr val="lt1"/>
+    </dgm:linClrLst>
+    <dgm:effectClrLst/>
+    <dgm:txLinClrLst/>
+    <dgm:txFillClrLst meth="repeat">
+      <a:schemeClr val="lt1"/>
+    </dgm:txFillClrLst>
+    <dgm:txEffectClrLst/>
+  </dgm:styleLbl>
+  <dgm:styleLbl name="sibTrans2D1">
+    <dgm:fillClrLst>
+      <a:schemeClr val="accent2"/>
+      <a:schemeClr val="accent3"/>
+    </dgm:fillClrLst>
+    <dgm:linClrLst meth="repeat">
+      <a:schemeClr val="lt1"/>
+    </dgm:linClrLst>
+    <dgm:effectClrLst/>
+    <dgm:txLinClrLst/>
+    <dgm:txFillClrLst/>
+    <dgm:txEffectClrLst/>
+  </dgm:styleLbl>
+  <dgm:styleLbl name="fgSibTrans2D1">
+    <dgm:fillClrLst>
+      <a:schemeClr val="accent2"/>
+      <a:schemeClr val="accent3"/>
+    </dgm:fillClrLst>
+    <dgm:linClrLst meth="repeat">
+      <a:schemeClr val="lt1"/>
+    </dgm:linClrLst>
+    <dgm:effectClrLst/>
+    <dgm:txLinClrLst/>
+    <dgm:txFillClrLst meth="repeat">
+      <a:schemeClr val="lt1"/>
+    </dgm:txFillClrLst>
+    <dgm:txEffectClrLst/>
+  </dgm:styleLbl>
+  <dgm:styleLbl name="bgSibTrans2D1">
+    <dgm:fillClrLst>
+      <a:schemeClr val="accent2"/>
+      <a:schemeClr val="accent3"/>
+    </dgm:fillClrLst>
+    <dgm:linClrLst meth="repeat">
+      <a:schemeClr val="lt1"/>
+    </dgm:linClrLst>
+    <dgm:effectClrLst/>
+    <dgm:txLinClrLst/>
+    <dgm:txFillClrLst meth="repeat">
+      <a:schemeClr val="lt1"/>
+    </dgm:txFillClrLst>
+    <dgm:txEffectClrLst/>
+  </dgm:styleLbl>
+  <dgm:styleLbl name="sibTrans1D1">
+    <dgm:fillClrLst/>
+    <dgm:linClrLst>
+      <a:schemeClr val="accent2"/>
+      <a:schemeClr val="accent3"/>
+    </dgm:linClrLst>
+    <dgm:effectClrLst/>
+    <dgm:txLinClrLst/>
+    <dgm:txFillClrLst meth="repeat">
+      <a:schemeClr val="tx1"/>
+    </dgm:txFillClrLst>
+    <dgm:txEffectClrLst/>
+  </dgm:styleLbl>
+  <dgm:styleLbl name="callout">
+    <dgm:fillClrLst meth="repeat">
+      <a:schemeClr val="accent2"/>
+    </dgm:fillClrLst>
+    <dgm:linClrLst meth="repeat">
+      <a:schemeClr val="accent2">
+        <a:tint val="50000"/>
+      </a:schemeClr>
+    </dgm:linClrLst>
+    <dgm:effectClrLst/>
+    <dgm:txLinClrLst/>
+    <dgm:txFillClrLst meth="repeat">
+      <a:schemeClr val="tx1"/>
+    </dgm:txFillClrLst>
+    <dgm:txEffectClrLst/>
+  </dgm:styleLbl>
+  <dgm:styleLbl name="asst0">
+    <dgm:fillClrLst meth="repeat">
+      <a:schemeClr val="accent2"/>
+    </dgm:fillClrLst>
+    <dgm:linClrLst meth="repeat">
+      <a:schemeClr val="lt1">
+        <a:shade val="80000"/>
+      </a:schemeClr>
+    </dgm:linClrLst>
+    <dgm:effectClrLst/>
+    <dgm:txLinClrLst/>
+    <dgm:txFillClrLst/>
+    <dgm:txEffectClrLst/>
+  </dgm:styleLbl>
+  <dgm:styleLbl name="asst1">
+    <dgm:fillClrLst meth="repeat">
+      <a:schemeClr val="accent3"/>
+    </dgm:fillClrLst>
+    <dgm:linClrLst meth="repeat">
+      <a:schemeClr val="lt1">
+        <a:shade val="80000"/>
+      </a:schemeClr>
+    </dgm:linClrLst>
+    <dgm:effectClrLst/>
+    <dgm:txLinClrLst/>
+    <dgm:txFillClrLst/>
+    <dgm:txEffectClrLst/>
+  </dgm:styleLbl>
+  <dgm:styleLbl name="asst2">
+    <dgm:fillClrLst>
+      <a:schemeClr val="accent4"/>
+    </dgm:fillClrLst>
+    <dgm:linClrLst meth="repeat">
+      <a:schemeClr val="lt1"/>
+    </dgm:linClrLst>
+    <dgm:effectClrLst/>
+    <dgm:txLinClrLst/>
+    <dgm:txFillClrLst/>
+    <dgm:txEffectClrLst/>
+  </dgm:styleLbl>
+  <dgm:styleLbl name="asst3">
+    <dgm:fillClrLst>
+      <a:schemeClr val="accent5"/>
+    </dgm:fillClrLst>
+    <dgm:linClrLst meth="repeat">
+      <a:schemeClr val="lt1"/>
+    </dgm:linClrLst>
+    <dgm:effectClrLst/>
+    <dgm:txLinClrLst/>
+    <dgm:txFillClrLst/>
+    <dgm:txEffectClrLst/>
+  </dgm:styleLbl>
+  <dgm:styleLbl name="asst4">
+    <dgm:fillClrLst>
+      <a:schemeClr val="accent6"/>
+    </dgm:fillClrLst>
+    <dgm:linClrLst meth="repeat">
+      <a:schemeClr val="lt1"/>
+    </dgm:linClrLst>
+    <dgm:effectClrLst/>
+    <dgm:txLinClrLst/>
+    <dgm:txFillClrLst/>
+    <dgm:txEffectClrLst/>
+  </dgm:styleLbl>
+  <dgm:styleLbl name="parChTrans2D1">
+    <dgm:fillClrLst meth="repeat">
+      <a:schemeClr val="accent2"/>
+    </dgm:fillClrLst>
+    <dgm:linClrLst meth="repeat">
+      <a:schemeClr val="lt1"/>
+    </dgm:linClrLst>
+    <dgm:effectClrLst/>
+    <dgm:txLinClrLst/>
+    <dgm:txFillClrLst meth="repeat">
+      <a:schemeClr val="lt1"/>
+    </dgm:txFillClrLst>
+    <dgm:txEffectClrLst/>
+  </dgm:styleLbl>
+  <dgm:styleLbl name="parChTrans2D2">
+    <dgm:fillClrLst meth="repeat">
+      <a:schemeClr val="accent3"/>
+    </dgm:fillClrLst>
+    <dgm:linClrLst meth="repeat">
+      <a:schemeClr val="lt1"/>
+    </dgm:linClrLst>
+    <dgm:effectClrLst/>
+    <dgm:txLinClrLst/>
+    <dgm:txFillClrLst/>
+    <dgm:txEffectClrLst/>
+  </dgm:styleLbl>
+  <dgm:styleLbl name="parChTrans2D3">
+    <dgm:fillClrLst meth="repeat">
+      <a:schemeClr val="accent4"/>
+    </dgm:fillClrLst>
+    <dgm:linClrLst meth="repeat">
+      <a:schemeClr val="lt1"/>
+    </dgm:linClrLst>
+    <dgm:effectClrLst/>
+    <dgm:txLinClrLst/>
+    <dgm:txFillClrLst/>
+    <dgm:txEffectClrLst/>
+  </dgm:styleLbl>
+  <dgm:styleLbl name="parChTrans2D4">
+    <dgm:fillClrLst meth="repeat">
+      <a:schemeClr val="accent5"/>
+    </dgm:fillClrLst>
+    <dgm:linClrLst meth="repeat">
+      <a:schemeClr val="lt1"/>
+    </dgm:linClrLst>
+    <dgm:effectClrLst/>
+    <dgm:txLinClrLst/>
+    <dgm:txFillClrLst meth="repeat">
+      <a:schemeClr val="lt1"/>
+    </dgm:txFillClrLst>
+    <dgm:txEffectClrLst/>
+  </dgm:styleLbl>
+  <dgm:styleLbl name="parChTrans1D1">
+    <dgm:fillClrLst meth="repeat">
+      <a:schemeClr val="accent2"/>
+    </dgm:fillClrLst>
+    <dgm:linClrLst meth="repeat">
+      <a:schemeClr val="accent2"/>
+    </dgm:linClrLst>
+    <dgm:effectClrLst/>
+    <dgm:txLinClrLst/>
+    <dgm:txFillClrLst meth="repeat">
+      <a:schemeClr val="tx1"/>
+    </dgm:txFillClrLst>
+    <dgm:txEffectClrLst/>
+  </dgm:styleLbl>
+  <dgm:styleLbl name="parChTrans1D2">
+    <dgm:fillClrLst meth="repeat">
+      <a:schemeClr val="accent2">
+        <a:tint val="90000"/>
+      </a:schemeClr>
+    </dgm:fillClrLst>
+    <dgm:linClrLst meth="repeat">
+      <a:schemeClr val="accent3"/>
+    </dgm:linClrLst>
+    <dgm:effectClrLst/>
+    <dgm:txLinClrLst/>
+    <dgm:txFillClrLst meth="repeat">
+      <a:schemeClr val="tx1"/>
+    </dgm:txFillClrLst>
+    <dgm:txEffectClrLst/>
+  </dgm:styleLbl>
+  <dgm:styleLbl name="parChTrans1D3">
+    <dgm:fillClrLst meth="repeat">
+      <a:schemeClr val="accent2">
+        <a:tint val="70000"/>
+      </a:schemeClr>
+    </dgm:fillClrLst>
+    <dgm:linClrLst meth="repeat">
+      <a:schemeClr val="accent4"/>
+    </dgm:linClrLst>
+    <dgm:effectClrLst/>
+    <dgm:txLinClrLst/>
+    <dgm:txFillClrLst meth="repeat">
+      <a:schemeClr val="tx1"/>
+    </dgm:txFillClrLst>
+    <dgm:txEffectClrLst/>
+  </dgm:styleLbl>
+  <dgm:styleLbl name="parChTrans1D4">
+    <dgm:fillClrLst meth="repeat">
+      <a:schemeClr val="accent2">
+        <a:tint val="50000"/>
+      </a:schemeClr>
+    </dgm:fillClrLst>
+    <dgm:linClrLst meth="repeat">
+      <a:schemeClr val="accent5"/>
+    </dgm:linClrLst>
+    <dgm:effectClrLst/>
+    <dgm:txLinClrLst/>
+    <dgm:txFillClrLst meth="repeat">
+      <a:schemeClr val="tx1"/>
+    </dgm:txFillClrLst>
+    <dgm:txEffectClrLst/>
+  </dgm:styleLbl>
+  <dgm:styleLbl name="fgAcc1">
+    <dgm:fillClrLst meth="repeat">
+      <a:schemeClr val="lt1">
+        <a:alpha val="90000"/>
+      </a:schemeClr>
+    </dgm:fillClrLst>
+    <dgm:linClrLst>
+      <a:schemeClr val="accent2"/>
+      <a:schemeClr val="accent3"/>
+    </dgm:linClrLst>
+    <dgm:effectClrLst/>
+    <dgm:txLinClrLst/>
+    <dgm:txFillClrLst meth="repeat">
+      <a:schemeClr val="dk1"/>
+    </dgm:txFillClrLst>
+    <dgm:txEffectClrLst/>
+  </dgm:styleLbl>
+  <dgm:styleLbl name="conFgAcc1">
+    <dgm:fillClrLst meth="repeat">
+      <a:schemeClr val="lt1">
+        <a:alpha val="90000"/>
+      </a:schemeClr>
+    </dgm:fillClrLst>
+    <dgm:linClrLst>
+      <a:schemeClr val="accent2"/>
+      <a:schemeClr val="accent3"/>
+    </dgm:linClrLst>
+    <dgm:effectClrLst/>
+    <dgm:txLinClrLst/>
+    <dgm:txFillClrLst meth="repeat">
+      <a:schemeClr val="dk1"/>
+    </dgm:txFillClrLst>
+    <dgm:txEffectClrLst/>
+  </dgm:styleLbl>
+  <dgm:styleLbl name="alignAcc1">
+    <dgm:fillClrLst meth="repeat">
+      <a:schemeClr val="lt1">
+        <a:alpha val="90000"/>
+      </a:schemeClr>
+    </dgm:fillClrLst>
+    <dgm:linClrLst>
+      <a:schemeClr val="accent2"/>
+      <a:schemeClr val="accent3"/>
+    </dgm:linClrLst>
+    <dgm:effectClrLst/>
+    <dgm:txLinClrLst/>
+    <dgm:txFillClrLst meth="repeat">
+      <a:schemeClr val="dk1"/>
+    </dgm:txFillClrLst>
+    <dgm:txEffectClrLst/>
+  </dgm:styleLbl>
+  <dgm:styleLbl name="trAlignAcc1">
+    <dgm:fillClrLst meth="repeat">
+      <a:schemeClr val="lt1">
+        <a:alpha val="40000"/>
+      </a:schemeClr>
+    </dgm:fillClrLst>
+    <dgm:linClrLst meth="repeat">
+      <a:schemeClr val="accent2"/>
+    </dgm:linClrLst>
+    <dgm:effectClrLst/>
+    <dgm:txLinClrLst/>
+    <dgm:txFillClrLst meth="repeat">
+      <a:schemeClr val="dk1"/>
+    </dgm:txFillClrLst>
+    <dgm:txEffectClrLst/>
+  </dgm:styleLbl>
+  <dgm:styleLbl name="bgAcc1">
+    <dgm:fillClrLst meth="repeat">
+      <a:schemeClr val="lt1">
+        <a:alpha val="90000"/>
+      </a:schemeClr>
+    </dgm:fillClrLst>
+    <dgm:linClrLst>
+      <a:schemeClr val="accent2"/>
+      <a:schemeClr val="accent3"/>
+    </dgm:linClrLst>
+    <dgm:effectClrLst/>
+    <dgm:txLinClrLst/>
+    <dgm:txFillClrLst meth="repeat">
+      <a:schemeClr val="dk1"/>
+    </dgm:txFillClrLst>
+    <dgm:txEffectClrLst/>
+  </dgm:styleLbl>
+  <dgm:styleLbl name="solidFgAcc1">
+    <dgm:fillClrLst meth="repeat">
+      <a:schemeClr val="lt1"/>
+    </dgm:fillClrLst>
+    <dgm:linClrLst>
+      <a:schemeClr val="accent2"/>
+      <a:schemeClr val="accent3"/>
+    </dgm:linClrLst>
+    <dgm:effectClrLst/>
+    <dgm:txLinClrLst/>
+    <dgm:txFillClrLst meth="repeat">
+      <a:schemeClr val="dk1"/>
+    </dgm:txFillClrLst>
+    <dgm:txEffectClrLst/>
+  </dgm:styleLbl>
+  <dgm:styleLbl name="solidAlignAcc1">
+    <dgm:fillClrLst meth="repeat">
+      <a:schemeClr val="lt1"/>
+    </dgm:fillClrLst>
+    <dgm:linClrLst>
+      <a:schemeClr val="accent2"/>
+      <a:schemeClr val="accent3"/>
+    </dgm:linClrLst>
+    <dgm:effectClrLst/>
+    <dgm:txLinClrLst/>
+    <dgm:txFillClrLst meth="repeat">
+      <a:schemeClr val="dk1"/>
+    </dgm:txFillClrLst>
+    <dgm:txEffectClrLst/>
+  </dgm:styleLbl>
+  <dgm:styleLbl name="solidBgAcc1">
+    <dgm:fillClrLst meth="repeat">
+      <a:schemeClr val="lt1"/>
+    </dgm:fillClrLst>
+    <dgm:linClrLst>
+      <a:schemeClr val="accent2"/>
+      <a:schemeClr val="accent3"/>
+    </dgm:linClrLst>
+    <dgm:effectClrLst/>
+    <dgm:txLinClrLst/>
+    <dgm:txFillClrLst meth="repeat">
+      <a:schemeClr val="dk1"/>
+    </dgm:txFillClrLst>
+    <dgm:txEffectClrLst/>
+  </dgm:styleLbl>
+  <dgm:styleLbl name="fgAccFollowNode1">
+    <dgm:fillClrLst>
+      <a:schemeClr val="accent2">
+        <a:tint val="40000"/>
+        <a:alpha val="90000"/>
+      </a:schemeClr>
+      <a:schemeClr val="accent3">
+        <a:tint val="40000"/>
+        <a:alpha val="90000"/>
+      </a:schemeClr>
+    </dgm:fillClrLst>
+    <dgm:linClrLst>
+      <a:schemeClr val="accent2">
+        <a:tint val="40000"/>
+        <a:alpha val="90000"/>
+      </a:schemeClr>
+      <a:schemeClr val="accent3">
+        <a:tint val="40000"/>
+        <a:alpha val="90000"/>
+      </a:schemeClr>
+    </dgm:linClrLst>
+    <dgm:effectClrLst/>
+    <dgm:txLinClrLst/>
+    <dgm:txFillClrLst meth="repeat">
+      <a:schemeClr val="dk1"/>
+    </dgm:txFillClrLst>
+    <dgm:txEffectClrLst/>
+  </dgm:styleLbl>
+  <dgm:styleLbl name="alignAccFollowNode1">
+    <dgm:fillClrLst>
+      <a:schemeClr val="accent2">
+        <a:tint val="40000"/>
+        <a:alpha val="90000"/>
+      </a:schemeClr>
+      <a:schemeClr val="accent3">
+        <a:tint val="40000"/>
+        <a:alpha val="90000"/>
+      </a:schemeClr>
+    </dgm:fillClrLst>
+    <dgm:linClrLst>
+      <a:schemeClr val="accent2">
+        <a:tint val="40000"/>
+        <a:alpha val="90000"/>
+      </a:schemeClr>
+      <a:schemeClr val="accent3">
+        <a:tint val="40000"/>
+        <a:alpha val="90000"/>
+      </a:schemeClr>
+    </dgm:linClrLst>
+    <dgm:effectClrLst/>
+    <dgm:txLinClrLst/>
+    <dgm:txFillClrLst meth="repeat">
+      <a:schemeClr val="dk1"/>
+    </dgm:txFillClrLst>
+    <dgm:txEffectClrLst/>
+  </dgm:styleLbl>
+  <dgm:styleLbl name="bgAccFollowNode1">
+    <dgm:fillClrLst>
+      <a:schemeClr val="accent2">
+        <a:tint val="40000"/>
+        <a:alpha val="90000"/>
+      </a:schemeClr>
+      <a:schemeClr val="accent3">
+        <a:tint val="40000"/>
+        <a:alpha val="90000"/>
+      </a:schemeClr>
+    </dgm:fillClrLst>
+    <dgm:linClrLst>
+      <a:schemeClr val="accent2">
+        <a:tint val="40000"/>
+        <a:alpha val="90000"/>
+      </a:schemeClr>
+      <a:schemeClr val="accent3">
+        <a:tint val="40000"/>
+        <a:alpha val="90000"/>
+      </a:schemeClr>
+    </dgm:linClrLst>
+    <dgm:effectClrLst/>
+    <dgm:txLinClrLst/>
+    <dgm:txFillClrLst meth="repeat">
+      <a:schemeClr val="dk1"/>
+    </dgm:txFillClrLst>
+    <dgm:txEffectClrLst/>
+  </dgm:styleLbl>
+  <dgm:styleLbl name="fgAcc0">
+    <dgm:fillClrLst meth="repeat">
+      <a:schemeClr val="lt1">
+        <a:alpha val="90000"/>
+      </a:schemeClr>
+    </dgm:fillClrLst>
+    <dgm:linClrLst>
+      <a:schemeClr val="accent1"/>
+    </dgm:linClrLst>
+    <dgm:effectClrLst/>
+    <dgm:txLinClrLst/>
+    <dgm:txFillClrLst meth="repeat">
+      <a:schemeClr val="dk1"/>
+    </dgm:txFillClrLst>
+    <dgm:txEffectClrLst/>
+  </dgm:styleLbl>
+  <dgm:styleLbl name="fgAcc2">
+    <dgm:fillClrLst meth="repeat">
+      <a:schemeClr val="lt1">
+        <a:alpha val="90000"/>
+      </a:schemeClr>
+    </dgm:fillClrLst>
+    <dgm:linClrLst>
+      <a:schemeClr val="accent3"/>
+    </dgm:linClrLst>
+    <dgm:effectClrLst/>
+    <dgm:txLinClrLst/>
+    <dgm:txFillClrLst meth="repeat">
+      <a:schemeClr val="dk1"/>
+    </dgm:txFillClrLst>
+    <dgm:txEffectClrLst/>
+  </dgm:styleLbl>
+  <dgm:styleLbl name="fgAcc3">
+    <dgm:fillClrLst meth="repeat">
+      <a:schemeClr val="lt1">
+        <a:alpha val="90000"/>
+      </a:schemeClr>
+    </dgm:fillClrLst>
+    <dgm:linClrLst>
+      <a:schemeClr val="accent4"/>
+    </dgm:linClrLst>
+    <dgm:effectClrLst/>
+    <dgm:txLinClrLst/>
+    <dgm:txFillClrLst meth="repeat">
+      <a:schemeClr val="dk1"/>
+    </dgm:txFillClrLst>
+    <dgm:txEffectClrLst/>
+  </dgm:styleLbl>
+  <dgm:styleLbl name="fgAcc4">
+    <dgm:fillClrLst meth="repeat">
+      <a:schemeClr val="lt1">
+        <a:alpha val="90000"/>
+      </a:schemeClr>
+    </dgm:fillClrLst>
+    <dgm:linClrLst>
+      <a:schemeClr val="accent5"/>
+    </dgm:linClrLst>
+    <dgm:effectClrLst/>
+    <dgm:txLinClrLst/>
+    <dgm:txFillClrLst meth="repeat">
+      <a:schemeClr val="dk1"/>
+    </dgm:txFillClrLst>
+    <dgm:txEffectClrLst/>
+  </dgm:styleLbl>
+  <dgm:styleLbl name="bgShp">
+    <dgm:fillClrLst meth="repeat">
+      <a:schemeClr val="bg1">
+        <a:lumMod val="95000"/>
+      </a:schemeClr>
+    </dgm:fillClrLst>
+    <dgm:linClrLst meth="repeat">
+      <a:schemeClr val="dk1"/>
+    </dgm:linClrLst>
+    <dgm:effectClrLst/>
+    <dgm:txLinClrLst/>
+    <dgm:txFillClrLst meth="repeat">
+      <a:schemeClr val="dk1"/>
+    </dgm:txFillClrLst>
+    <dgm:txEffectClrLst/>
+  </dgm:styleLbl>
+  <dgm:styleLbl name="dkBgShp">
+    <dgm:fillClrLst meth="repeat">
+      <a:schemeClr val="accent2">
+        <a:shade val="90000"/>
+      </a:schemeClr>
+    </dgm:fillClrLst>
+    <dgm:linClrLst meth="repeat">
+      <a:schemeClr val="dk1"/>
+    </dgm:linClrLst>
+    <dgm:effectClrLst/>
+    <dgm:txLinClrLst/>
+    <dgm:txFillClrLst meth="repeat">
+      <a:schemeClr val="lt1"/>
+    </dgm:txFillClrLst>
+    <dgm:txEffectClrLst/>
+  </dgm:styleLbl>
+  <dgm:styleLbl name="trBgShp">
+    <dgm:fillClrLst meth="repeat">
+      <a:schemeClr val="accent2">
+        <a:tint val="50000"/>
+        <a:alpha val="40000"/>
+      </a:schemeClr>
+    </dgm:fillClrLst>
+    <dgm:linClrLst meth="repeat">
+      <a:schemeClr val="accent2"/>
+    </dgm:linClrLst>
+    <dgm:effectClrLst/>
+    <dgm:txLinClrLst/>
+    <dgm:txFillClrLst meth="repeat">
+      <a:schemeClr val="lt1"/>
+    </dgm:txFillClrLst>
+    <dgm:txEffectClrLst/>
+  </dgm:styleLbl>
+  <dgm:styleLbl name="fgShp">
+    <dgm:fillClrLst meth="repeat">
+      <a:schemeClr val="accent2">
+        <a:tint val="40000"/>
+      </a:schemeClr>
+    </dgm:fillClrLst>
+    <dgm:linClrLst meth="repeat">
+      <a:schemeClr val="lt1"/>
+    </dgm:linClrLst>
+    <dgm:effectClrLst/>
+    <dgm:txLinClrLst/>
+    <dgm:txFillClrLst meth="repeat">
+      <a:schemeClr val="dk1"/>
+    </dgm:txFillClrLst>
+    <dgm:txEffectClrLst/>
+  </dgm:styleLbl>
+  <dgm:styleLbl name="revTx">
+    <dgm:fillClrLst meth="repeat">
+      <a:schemeClr val="lt1">
+        <a:alpha val="0"/>
+      </a:schemeClr>
+    </dgm:fillClrLst>
+    <dgm:linClrLst meth="repeat">
+      <a:schemeClr val="dk1">
+        <a:alpha val="0"/>
+      </a:schemeClr>
+    </dgm:linClrLst>
+    <dgm:effectClrLst/>
+    <dgm:txLinClrLst/>
+    <dgm:txFillClrLst meth="repeat">
+      <a:schemeClr val="tx1"/>
+    </dgm:txFillClrLst>
+    <dgm:txEffectClrLst/>
+  </dgm:styleLbl>
+</dgm:colorsDef>
+</file>
+
 <file path=ppt/diagrams/data1.xml><?xml version="1.0" encoding="utf-8"?>
 <dgm:dataModel xmlns:dgm="http://schemas.openxmlformats.org/drawingml/2006/diagram" xmlns:a="http://schemas.openxmlformats.org/drawingml/2006/main">
   <dgm:ptLst>
     <dgm:pt modelId="{E59309EB-3E80-45AB-A9F9-47F09E41BC72}" type="doc">
-      <dgm:prSet loTypeId="urn:microsoft.com/office/officeart/2008/layout/LinedList" loCatId="list" qsTypeId="urn:microsoft.com/office/officeart/2005/8/quickstyle/simple3" qsCatId="simple" csTypeId="urn:microsoft.com/office/officeart/2005/8/colors/colorful5" csCatId="colorful"/>
+      <dgm:prSet loTypeId="urn:microsoft.com/office/officeart/2008/layout/LinedList" loCatId="list" qsTypeId="urn:microsoft.com/office/officeart/2005/8/quickstyle/simple3" qsCatId="simple" csTypeId="urn:microsoft.com/office/officeart/2005/8/colors/colorful5" csCatId="colorful" phldr="1"/>
       <dgm:spPr/>
       <dgm:t>
         <a:bodyPr/>
@@ -1987,8 +2807,16 @@
         <a:lstStyle/>
         <a:p>
           <a:r>
-            <a:rPr lang="en-US"/>
-            <a:t>Each empty ShapeFile still take disk space and four files. An empty layer in GeoPackage has negligible</a:t>
+            <a:rPr lang="en-US" dirty="0"/>
+            <a:t>Each empty </a:t>
+          </a:r>
+          <a:r>
+            <a:rPr lang="en-US" dirty="0" err="1"/>
+            <a:t>ShapeFile</a:t>
+          </a:r>
+          <a:r>
+            <a:rPr lang="en-US" dirty="0"/>
+            <a:t> still take disk space and four files. An empty layer in GeoPackage has negligible.</a:t>
           </a:r>
         </a:p>
       </dgm:t>
@@ -2059,8 +2887,8 @@
         <a:lstStyle/>
         <a:p>
           <a:r>
-            <a:rPr lang="en-US"/>
-            <a:t>None of the test took advantage of spatial indexing for queries. Spatial filters may offer additional performance and functionality capabilities</a:t>
+            <a:rPr lang="en-US" dirty="0"/>
+            <a:t>None of the test took advantage of spatial indexing for queries. Spatial filters may offer additional performance and functionality capabilities.</a:t>
           </a:r>
         </a:p>
       </dgm:t>
@@ -2166,6 +2994,438 @@
     <dgm:cxn modelId="{AE102195-D2EF-48F9-9BB2-8DE538ED9AAE}" type="presParOf" srcId="{FA6E0FC1-AFD8-423A-8576-5EB2D68F2955}" destId="{B99DEB79-46A1-4EF2-8500-E1A2DDAF8E9B}" srcOrd="5" destOrd="0" presId="urn:microsoft.com/office/officeart/2008/layout/LinedList"/>
     <dgm:cxn modelId="{0C9A9177-F9D2-4E1E-A090-C50093984C4D}" type="presParOf" srcId="{B99DEB79-46A1-4EF2-8500-E1A2DDAF8E9B}" destId="{90479B8B-4C84-4781-8D18-C073D5C16D77}" srcOrd="0" destOrd="0" presId="urn:microsoft.com/office/officeart/2008/layout/LinedList"/>
     <dgm:cxn modelId="{6629333D-25B5-413C-A10B-364C75D14C46}" type="presParOf" srcId="{B99DEB79-46A1-4EF2-8500-E1A2DDAF8E9B}" destId="{6081C77E-E1D4-4119-ACDD-C7DF8E11902D}" srcOrd="1" destOrd="0" presId="urn:microsoft.com/office/officeart/2008/layout/LinedList"/>
+  </dgm:cxnLst>
+  <dgm:bg/>
+  <dgm:whole/>
+  <dgm:extLst>
+    <a:ext uri="http://schemas.microsoft.com/office/drawing/2008/diagram">
+      <dsp:dataModelExt xmlns:dsp="http://schemas.microsoft.com/office/drawing/2008/diagram" relId="rId6" minVer="http://schemas.openxmlformats.org/drawingml/2006/diagram"/>
+    </a:ext>
+  </dgm:extLst>
+</dgm:dataModel>
+</file>
+
+<file path=ppt/diagrams/data2.xml><?xml version="1.0" encoding="utf-8"?>
+<dgm:dataModel xmlns:dgm="http://schemas.openxmlformats.org/drawingml/2006/diagram" xmlns:a="http://schemas.openxmlformats.org/drawingml/2006/main">
+  <dgm:ptLst>
+    <dgm:pt modelId="{DF7F83FC-BBB0-4714-8A41-68AABF8595AE}" type="doc">
+      <dgm:prSet loTypeId="urn:microsoft.com/office/officeart/2018/2/layout/IconLabelDescriptionList" loCatId="icon" qsTypeId="urn:microsoft.com/office/officeart/2005/8/quickstyle/simple1" qsCatId="simple" csTypeId="urn:microsoft.com/office/officeart/2018/5/colors/Iconchunking_neutralbg_colorful2" csCatId="colorful" phldr="1"/>
+      <dgm:spPr/>
+      <dgm:t>
+        <a:bodyPr/>
+        <a:lstStyle/>
+        <a:p>
+          <a:endParaRPr lang="en-US"/>
+        </a:p>
+      </dgm:t>
+    </dgm:pt>
+    <dgm:pt modelId="{B6DD7BA2-67E8-424E-8242-3AB15DFCD2FD}">
+      <dgm:prSet/>
+      <dgm:spPr/>
+      <dgm:t>
+        <a:bodyPr/>
+        <a:lstStyle/>
+        <a:p>
+          <a:pPr>
+            <a:defRPr b="1"/>
+          </a:pPr>
+          <a:r>
+            <a:rPr lang="en-US" dirty="0"/>
+            <a:t>Prototype tools to convert an existing CDB to GeoCDB are being published on GitHub:</a:t>
+          </a:r>
+        </a:p>
+      </dgm:t>
+    </dgm:pt>
+    <dgm:pt modelId="{B3465C2E-760C-457D-AAA0-E5DB22AB51FF}" type="parTrans" cxnId="{154BA21A-5C6B-425F-8552-76F96C6AE3C6}">
+      <dgm:prSet/>
+      <dgm:spPr/>
+      <dgm:t>
+        <a:bodyPr/>
+        <a:lstStyle/>
+        <a:p>
+          <a:endParaRPr lang="en-US"/>
+        </a:p>
+      </dgm:t>
+    </dgm:pt>
+    <dgm:pt modelId="{3CCEF5DD-9D9A-4DF7-8DEC-5DDC3E64BE2E}" type="sibTrans" cxnId="{154BA21A-5C6B-425F-8552-76F96C6AE3C6}">
+      <dgm:prSet/>
+      <dgm:spPr/>
+      <dgm:t>
+        <a:bodyPr/>
+        <a:lstStyle/>
+        <a:p>
+          <a:endParaRPr lang="en-US"/>
+        </a:p>
+      </dgm:t>
+    </dgm:pt>
+    <dgm:pt modelId="{B41CC07D-2AC1-4150-8DB8-0574CFE6A627}">
+      <dgm:prSet custT="1"/>
+      <dgm:spPr/>
+      <dgm:t>
+        <a:bodyPr/>
+        <a:lstStyle/>
+        <a:p>
+          <a:r>
+            <a:rPr lang="en-US" sz="1400" dirty="0">
+              <a:hlinkClick xmlns:r="http://schemas.openxmlformats.org/officeDocument/2006/relationships" r:id="rId1"/>
+            </a:rPr>
+            <a:t>https://github.com/Cognitics/GeoCDB</a:t>
+          </a:r>
+          <a:endParaRPr lang="en-US" sz="1400" dirty="0"/>
+        </a:p>
+      </dgm:t>
+    </dgm:pt>
+    <dgm:pt modelId="{1F4836B7-FC88-47E0-9238-1A7A0AFEB902}" type="parTrans" cxnId="{1A516966-56D7-47C2-811A-A6F23D493024}">
+      <dgm:prSet/>
+      <dgm:spPr/>
+      <dgm:t>
+        <a:bodyPr/>
+        <a:lstStyle/>
+        <a:p>
+          <a:endParaRPr lang="en-US"/>
+        </a:p>
+      </dgm:t>
+    </dgm:pt>
+    <dgm:pt modelId="{8B974615-A34E-4A88-ABED-34468D305C42}" type="sibTrans" cxnId="{1A516966-56D7-47C2-811A-A6F23D493024}">
+      <dgm:prSet/>
+      <dgm:spPr/>
+      <dgm:t>
+        <a:bodyPr/>
+        <a:lstStyle/>
+        <a:p>
+          <a:endParaRPr lang="en-US"/>
+        </a:p>
+      </dgm:t>
+    </dgm:pt>
+    <dgm:pt modelId="{6EE1C1D8-6C08-4671-88AE-BA2125C6B89D}">
+      <dgm:prSet custT="1"/>
+      <dgm:spPr/>
+      <dgm:t>
+        <a:bodyPr/>
+        <a:lstStyle/>
+        <a:p>
+          <a:r>
+            <a:rPr lang="en-US" sz="1400" dirty="0"/>
+            <a:t>Existing Prototype tools have been developed in Python using GDAL, other languages/environments are planned.</a:t>
+          </a:r>
+        </a:p>
+      </dgm:t>
+    </dgm:pt>
+    <dgm:pt modelId="{A79BC65F-96C7-4DC7-8EEC-E3163C51E636}" type="parTrans" cxnId="{359F0A6B-47D4-4B2C-98FD-730E3C8EF0C4}">
+      <dgm:prSet/>
+      <dgm:spPr/>
+      <dgm:t>
+        <a:bodyPr/>
+        <a:lstStyle/>
+        <a:p>
+          <a:endParaRPr lang="en-US"/>
+        </a:p>
+      </dgm:t>
+    </dgm:pt>
+    <dgm:pt modelId="{02712FEA-DF67-4FC5-BB88-E2F5BB2F437A}" type="sibTrans" cxnId="{359F0A6B-47D4-4B2C-98FD-730E3C8EF0C4}">
+      <dgm:prSet/>
+      <dgm:spPr/>
+      <dgm:t>
+        <a:bodyPr/>
+        <a:lstStyle/>
+        <a:p>
+          <a:endParaRPr lang="en-US"/>
+        </a:p>
+      </dgm:t>
+    </dgm:pt>
+    <dgm:pt modelId="{C695E6EA-C55D-47D0-AD30-838E37BC2ED8}">
+      <dgm:prSet/>
+      <dgm:spPr/>
+      <dgm:t>
+        <a:bodyPr/>
+        <a:lstStyle/>
+        <a:p>
+          <a:pPr>
+            <a:defRPr b="1"/>
+          </a:pPr>
+          <a:r>
+            <a:rPr lang="en-US" dirty="0"/>
+            <a:t>Additional tools and performance analysis are continuing to be developed and updated on GitHub.</a:t>
+          </a:r>
+        </a:p>
+      </dgm:t>
+    </dgm:pt>
+    <dgm:pt modelId="{155A95F7-78C7-4DD3-8F5A-9D491D4313D2}" type="parTrans" cxnId="{9C8E5D12-0F37-44FD-9C08-264D28460276}">
+      <dgm:prSet/>
+      <dgm:spPr/>
+      <dgm:t>
+        <a:bodyPr/>
+        <a:lstStyle/>
+        <a:p>
+          <a:endParaRPr lang="en-US"/>
+        </a:p>
+      </dgm:t>
+    </dgm:pt>
+    <dgm:pt modelId="{30073993-4698-4476-9C4F-2F73DA6AC66D}" type="sibTrans" cxnId="{9C8E5D12-0F37-44FD-9C08-264D28460276}">
+      <dgm:prSet/>
+      <dgm:spPr/>
+      <dgm:t>
+        <a:bodyPr/>
+        <a:lstStyle/>
+        <a:p>
+          <a:endParaRPr lang="en-US"/>
+        </a:p>
+      </dgm:t>
+    </dgm:pt>
+    <dgm:pt modelId="{036FD251-237E-4A8E-BC14-EF66F2DA48B8}">
+      <dgm:prSet/>
+      <dgm:spPr/>
+      <dgm:t>
+        <a:bodyPr/>
+        <a:lstStyle/>
+        <a:p>
+          <a:pPr>
+            <a:defRPr b="1"/>
+          </a:pPr>
+          <a:r>
+            <a:rPr lang="en-US" dirty="0"/>
+            <a:t>Contributions and pull requests are welcome.</a:t>
+          </a:r>
+        </a:p>
+      </dgm:t>
+    </dgm:pt>
+    <dgm:pt modelId="{69B0E868-7CE7-4673-B293-D4A740B8BF3A}" type="parTrans" cxnId="{9E9724BB-76A8-4B19-B8B5-6A46A3F6D7FC}">
+      <dgm:prSet/>
+      <dgm:spPr/>
+      <dgm:t>
+        <a:bodyPr/>
+        <a:lstStyle/>
+        <a:p>
+          <a:endParaRPr lang="en-US"/>
+        </a:p>
+      </dgm:t>
+    </dgm:pt>
+    <dgm:pt modelId="{AAC9225E-6DCD-473E-A155-C947F783DC89}" type="sibTrans" cxnId="{9E9724BB-76A8-4B19-B8B5-6A46A3F6D7FC}">
+      <dgm:prSet/>
+      <dgm:spPr/>
+      <dgm:t>
+        <a:bodyPr/>
+        <a:lstStyle/>
+        <a:p>
+          <a:endParaRPr lang="en-US"/>
+        </a:p>
+      </dgm:t>
+    </dgm:pt>
+    <dgm:pt modelId="{ACABA4BF-D7C4-49C2-B296-9A2F58CF07C2}" type="pres">
+      <dgm:prSet presAssocID="{DF7F83FC-BBB0-4714-8A41-68AABF8595AE}" presName="root" presStyleCnt="0">
+        <dgm:presLayoutVars>
+          <dgm:dir/>
+          <dgm:resizeHandles val="exact"/>
+        </dgm:presLayoutVars>
+      </dgm:prSet>
+      <dgm:spPr/>
+    </dgm:pt>
+    <dgm:pt modelId="{5346663F-C5F0-4419-BB8A-38929A0DE21D}" type="pres">
+      <dgm:prSet presAssocID="{B6DD7BA2-67E8-424E-8242-3AB15DFCD2FD}" presName="compNode" presStyleCnt="0"/>
+      <dgm:spPr/>
+    </dgm:pt>
+    <dgm:pt modelId="{7C006ADF-6D18-4668-8C58-0B12EC0849EC}" type="pres">
+      <dgm:prSet presAssocID="{B6DD7BA2-67E8-424E-8242-3AB15DFCD2FD}" presName="iconRect" presStyleLbl="node1" presStyleIdx="0" presStyleCnt="3"/>
+      <dgm:spPr>
+        <a:blipFill>
+          <a:blip xmlns:r="http://schemas.openxmlformats.org/officeDocument/2006/relationships" r:embed="rId2">
+            <a:extLst>
+              <a:ext uri="{28A0092B-C50C-407E-A947-70E740481C1C}">
+                <a14:useLocalDpi xmlns:a14="http://schemas.microsoft.com/office/drawing/2010/main" val="0"/>
+              </a:ext>
+              <a:ext uri="{96DAC541-7B7A-43D3-8B79-37D633B846F1}">
+                <asvg:svgBlip xmlns:asvg="http://schemas.microsoft.com/office/drawing/2016/SVG/main" r:embed="rId3"/>
+              </a:ext>
+            </a:extLst>
+          </a:blip>
+          <a:stretch>
+            <a:fillRect/>
+          </a:stretch>
+        </a:blipFill>
+        <a:ln>
+          <a:noFill/>
+        </a:ln>
+      </dgm:spPr>
+      <dgm:extLst>
+        <a:ext uri="{E40237B7-FDA0-4F09-8148-C483321AD2D9}">
+          <dgm14:cNvPr xmlns:dgm14="http://schemas.microsoft.com/office/drawing/2010/diagram" id="0" name="" descr="Hammer"/>
+        </a:ext>
+      </dgm:extLst>
+    </dgm:pt>
+    <dgm:pt modelId="{EB59B531-2247-4A93-A048-63273D40944E}" type="pres">
+      <dgm:prSet presAssocID="{B6DD7BA2-67E8-424E-8242-3AB15DFCD2FD}" presName="iconSpace" presStyleCnt="0"/>
+      <dgm:spPr/>
+    </dgm:pt>
+    <dgm:pt modelId="{0AE99A94-43E1-4F0E-A59F-CE938AA2C162}" type="pres">
+      <dgm:prSet presAssocID="{B6DD7BA2-67E8-424E-8242-3AB15DFCD2FD}" presName="parTx" presStyleLbl="revTx" presStyleIdx="0" presStyleCnt="6">
+        <dgm:presLayoutVars>
+          <dgm:chMax val="0"/>
+          <dgm:chPref val="0"/>
+        </dgm:presLayoutVars>
+      </dgm:prSet>
+      <dgm:spPr/>
+    </dgm:pt>
+    <dgm:pt modelId="{117ECEB4-5E22-4ABD-B6ED-7B0C6EFAE5B5}" type="pres">
+      <dgm:prSet presAssocID="{B6DD7BA2-67E8-424E-8242-3AB15DFCD2FD}" presName="txSpace" presStyleCnt="0"/>
+      <dgm:spPr/>
+    </dgm:pt>
+    <dgm:pt modelId="{C041A96E-7D65-4D14-B233-0FC35E3099B3}" type="pres">
+      <dgm:prSet presAssocID="{B6DD7BA2-67E8-424E-8242-3AB15DFCD2FD}" presName="desTx" presStyleLbl="revTx" presStyleIdx="1" presStyleCnt="6" custLinFactNeighborY="-19429">
+        <dgm:presLayoutVars/>
+      </dgm:prSet>
+      <dgm:spPr/>
+    </dgm:pt>
+    <dgm:pt modelId="{97507BB0-308D-4F5A-80B8-5FA7194A7913}" type="pres">
+      <dgm:prSet presAssocID="{3CCEF5DD-9D9A-4DF7-8DEC-5DDC3E64BE2E}" presName="sibTrans" presStyleCnt="0"/>
+      <dgm:spPr/>
+    </dgm:pt>
+    <dgm:pt modelId="{6860C664-26F8-4C21-AC9D-0F82CC7AC523}" type="pres">
+      <dgm:prSet presAssocID="{C695E6EA-C55D-47D0-AD30-838E37BC2ED8}" presName="compNode" presStyleCnt="0"/>
+      <dgm:spPr/>
+    </dgm:pt>
+    <dgm:pt modelId="{0A48867C-D143-4D15-AF45-03285283983F}" type="pres">
+      <dgm:prSet presAssocID="{C695E6EA-C55D-47D0-AD30-838E37BC2ED8}" presName="iconRect" presStyleLbl="node1" presStyleIdx="1" presStyleCnt="3"/>
+      <dgm:spPr>
+        <a:blipFill>
+          <a:blip xmlns:r="http://schemas.openxmlformats.org/officeDocument/2006/relationships" r:embed="rId4">
+            <a:extLst>
+              <a:ext uri="{28A0092B-C50C-407E-A947-70E740481C1C}">
+                <a14:useLocalDpi xmlns:a14="http://schemas.microsoft.com/office/drawing/2010/main" val="0"/>
+              </a:ext>
+              <a:ext uri="{96DAC541-7B7A-43D3-8B79-37D633B846F1}">
+                <asvg:svgBlip xmlns:asvg="http://schemas.microsoft.com/office/drawing/2016/SVG/main" r:embed="rId5"/>
+              </a:ext>
+            </a:extLst>
+          </a:blip>
+          <a:stretch>
+            <a:fillRect/>
+          </a:stretch>
+        </a:blipFill>
+        <a:ln>
+          <a:noFill/>
+        </a:ln>
+      </dgm:spPr>
+      <dgm:extLst>
+        <a:ext uri="{E40237B7-FDA0-4F09-8148-C483321AD2D9}">
+          <dgm14:cNvPr xmlns:dgm14="http://schemas.microsoft.com/office/drawing/2010/diagram" id="0" name="" descr="Mining Tools"/>
+        </a:ext>
+      </dgm:extLst>
+    </dgm:pt>
+    <dgm:pt modelId="{D1CD1DDF-0967-4133-AB5A-62CE0D4BE136}" type="pres">
+      <dgm:prSet presAssocID="{C695E6EA-C55D-47D0-AD30-838E37BC2ED8}" presName="iconSpace" presStyleCnt="0"/>
+      <dgm:spPr/>
+    </dgm:pt>
+    <dgm:pt modelId="{CDCFB828-BAF8-4793-8905-8C74334BD306}" type="pres">
+      <dgm:prSet presAssocID="{C695E6EA-C55D-47D0-AD30-838E37BC2ED8}" presName="parTx" presStyleLbl="revTx" presStyleIdx="2" presStyleCnt="6">
+        <dgm:presLayoutVars>
+          <dgm:chMax val="0"/>
+          <dgm:chPref val="0"/>
+        </dgm:presLayoutVars>
+      </dgm:prSet>
+      <dgm:spPr/>
+    </dgm:pt>
+    <dgm:pt modelId="{D84ECA16-89B8-4408-A4B3-2F8DDCFD2DEE}" type="pres">
+      <dgm:prSet presAssocID="{C695E6EA-C55D-47D0-AD30-838E37BC2ED8}" presName="txSpace" presStyleCnt="0"/>
+      <dgm:spPr/>
+    </dgm:pt>
+    <dgm:pt modelId="{B995C06C-6F2A-4CA0-9CEB-4D47D418558E}" type="pres">
+      <dgm:prSet presAssocID="{C695E6EA-C55D-47D0-AD30-838E37BC2ED8}" presName="desTx" presStyleLbl="revTx" presStyleIdx="3" presStyleCnt="6">
+        <dgm:presLayoutVars/>
+      </dgm:prSet>
+      <dgm:spPr/>
+    </dgm:pt>
+    <dgm:pt modelId="{AC1BE407-0F6A-4CBE-B04A-F3523BD49B5F}" type="pres">
+      <dgm:prSet presAssocID="{30073993-4698-4476-9C4F-2F73DA6AC66D}" presName="sibTrans" presStyleCnt="0"/>
+      <dgm:spPr/>
+    </dgm:pt>
+    <dgm:pt modelId="{9D22D4C2-60EA-4EDC-B772-A9A3E8318E35}" type="pres">
+      <dgm:prSet presAssocID="{036FD251-237E-4A8E-BC14-EF66F2DA48B8}" presName="compNode" presStyleCnt="0"/>
+      <dgm:spPr/>
+    </dgm:pt>
+    <dgm:pt modelId="{0C125D6D-2860-4A34-8D31-B6E72DB68C1D}" type="pres">
+      <dgm:prSet presAssocID="{036FD251-237E-4A8E-BC14-EF66F2DA48B8}" presName="iconRect" presStyleLbl="node1" presStyleIdx="2" presStyleCnt="3"/>
+      <dgm:spPr>
+        <a:blipFill>
+          <a:blip xmlns:r="http://schemas.openxmlformats.org/officeDocument/2006/relationships" r:embed="rId6">
+            <a:extLst>
+              <a:ext uri="{28A0092B-C50C-407E-A947-70E740481C1C}">
+                <a14:useLocalDpi xmlns:a14="http://schemas.microsoft.com/office/drawing/2010/main" val="0"/>
+              </a:ext>
+              <a:ext uri="{96DAC541-7B7A-43D3-8B79-37D633B846F1}">
+                <asvg:svgBlip xmlns:asvg="http://schemas.microsoft.com/office/drawing/2016/SVG/main" r:embed="rId7"/>
+              </a:ext>
+            </a:extLst>
+          </a:blip>
+          <a:stretch>
+            <a:fillRect/>
+          </a:stretch>
+        </a:blipFill>
+        <a:ln>
+          <a:noFill/>
+        </a:ln>
+      </dgm:spPr>
+      <dgm:extLst>
+        <a:ext uri="{E40237B7-FDA0-4F09-8148-C483321AD2D9}">
+          <dgm14:cNvPr xmlns:dgm14="http://schemas.microsoft.com/office/drawing/2010/diagram" id="0" name="" descr="List"/>
+        </a:ext>
+      </dgm:extLst>
+    </dgm:pt>
+    <dgm:pt modelId="{203ED8AF-94E6-4C61-A62B-E6B4077D04ED}" type="pres">
+      <dgm:prSet presAssocID="{036FD251-237E-4A8E-BC14-EF66F2DA48B8}" presName="iconSpace" presStyleCnt="0"/>
+      <dgm:spPr/>
+    </dgm:pt>
+    <dgm:pt modelId="{995D9819-4DF8-4F24-995A-781E572FF7F0}" type="pres">
+      <dgm:prSet presAssocID="{036FD251-237E-4A8E-BC14-EF66F2DA48B8}" presName="parTx" presStyleLbl="revTx" presStyleIdx="4" presStyleCnt="6">
+        <dgm:presLayoutVars>
+          <dgm:chMax val="0"/>
+          <dgm:chPref val="0"/>
+        </dgm:presLayoutVars>
+      </dgm:prSet>
+      <dgm:spPr/>
+    </dgm:pt>
+    <dgm:pt modelId="{835A282C-FAE5-4D5A-863B-7AB9AE8E7D0E}" type="pres">
+      <dgm:prSet presAssocID="{036FD251-237E-4A8E-BC14-EF66F2DA48B8}" presName="txSpace" presStyleCnt="0"/>
+      <dgm:spPr/>
+    </dgm:pt>
+    <dgm:pt modelId="{37DDB693-75C3-420D-8BA5-A82559155EC5}" type="pres">
+      <dgm:prSet presAssocID="{036FD251-237E-4A8E-BC14-EF66F2DA48B8}" presName="desTx" presStyleLbl="revTx" presStyleIdx="5" presStyleCnt="6">
+        <dgm:presLayoutVars/>
+      </dgm:prSet>
+      <dgm:spPr/>
+    </dgm:pt>
+  </dgm:ptLst>
+  <dgm:cxnLst>
+    <dgm:cxn modelId="{9C8E5D12-0F37-44FD-9C08-264D28460276}" srcId="{DF7F83FC-BBB0-4714-8A41-68AABF8595AE}" destId="{C695E6EA-C55D-47D0-AD30-838E37BC2ED8}" srcOrd="1" destOrd="0" parTransId="{155A95F7-78C7-4DD3-8F5A-9D491D4313D2}" sibTransId="{30073993-4698-4476-9C4F-2F73DA6AC66D}"/>
+    <dgm:cxn modelId="{154BA21A-5C6B-425F-8552-76F96C6AE3C6}" srcId="{DF7F83FC-BBB0-4714-8A41-68AABF8595AE}" destId="{B6DD7BA2-67E8-424E-8242-3AB15DFCD2FD}" srcOrd="0" destOrd="0" parTransId="{B3465C2E-760C-457D-AAA0-E5DB22AB51FF}" sibTransId="{3CCEF5DD-9D9A-4DF7-8DEC-5DDC3E64BE2E}"/>
+    <dgm:cxn modelId="{0B366523-6D7E-4C02-A394-A5AF7B7D411D}" type="presOf" srcId="{C695E6EA-C55D-47D0-AD30-838E37BC2ED8}" destId="{CDCFB828-BAF8-4793-8905-8C74334BD306}" srcOrd="0" destOrd="0" presId="urn:microsoft.com/office/officeart/2018/2/layout/IconLabelDescriptionList"/>
+    <dgm:cxn modelId="{8CC60B42-0DD8-4250-AF11-A68F4D63E4BD}" type="presOf" srcId="{6EE1C1D8-6C08-4671-88AE-BA2125C6B89D}" destId="{C041A96E-7D65-4D14-B233-0FC35E3099B3}" srcOrd="0" destOrd="1" presId="urn:microsoft.com/office/officeart/2018/2/layout/IconLabelDescriptionList"/>
+    <dgm:cxn modelId="{1A516966-56D7-47C2-811A-A6F23D493024}" srcId="{B6DD7BA2-67E8-424E-8242-3AB15DFCD2FD}" destId="{B41CC07D-2AC1-4150-8DB8-0574CFE6A627}" srcOrd="0" destOrd="0" parTransId="{1F4836B7-FC88-47E0-9238-1A7A0AFEB902}" sibTransId="{8B974615-A34E-4A88-ABED-34468D305C42}"/>
+    <dgm:cxn modelId="{359F0A6B-47D4-4B2C-98FD-730E3C8EF0C4}" srcId="{B6DD7BA2-67E8-424E-8242-3AB15DFCD2FD}" destId="{6EE1C1D8-6C08-4671-88AE-BA2125C6B89D}" srcOrd="1" destOrd="0" parTransId="{A79BC65F-96C7-4DC7-8EEC-E3163C51E636}" sibTransId="{02712FEA-DF67-4FC5-BB88-E2F5BB2F437A}"/>
+    <dgm:cxn modelId="{7D32BB7B-8F5D-4032-A683-F150D6209C83}" type="presOf" srcId="{DF7F83FC-BBB0-4714-8A41-68AABF8595AE}" destId="{ACABA4BF-D7C4-49C2-B296-9A2F58CF07C2}" srcOrd="0" destOrd="0" presId="urn:microsoft.com/office/officeart/2018/2/layout/IconLabelDescriptionList"/>
+    <dgm:cxn modelId="{8B63CB85-6D79-44B2-9404-5664AD9749DE}" type="presOf" srcId="{036FD251-237E-4A8E-BC14-EF66F2DA48B8}" destId="{995D9819-4DF8-4F24-995A-781E572FF7F0}" srcOrd="0" destOrd="0" presId="urn:microsoft.com/office/officeart/2018/2/layout/IconLabelDescriptionList"/>
+    <dgm:cxn modelId="{579CF4A2-5610-4569-B64C-BD791D4B74CF}" type="presOf" srcId="{B6DD7BA2-67E8-424E-8242-3AB15DFCD2FD}" destId="{0AE99A94-43E1-4F0E-A59F-CE938AA2C162}" srcOrd="0" destOrd="0" presId="urn:microsoft.com/office/officeart/2018/2/layout/IconLabelDescriptionList"/>
+    <dgm:cxn modelId="{9E9724BB-76A8-4B19-B8B5-6A46A3F6D7FC}" srcId="{DF7F83FC-BBB0-4714-8A41-68AABF8595AE}" destId="{036FD251-237E-4A8E-BC14-EF66F2DA48B8}" srcOrd="2" destOrd="0" parTransId="{69B0E868-7CE7-4673-B293-D4A740B8BF3A}" sibTransId="{AAC9225E-6DCD-473E-A155-C947F783DC89}"/>
+    <dgm:cxn modelId="{1D04FFDF-EB2E-4411-AECC-633E138E4EDF}" type="presOf" srcId="{B41CC07D-2AC1-4150-8DB8-0574CFE6A627}" destId="{C041A96E-7D65-4D14-B233-0FC35E3099B3}" srcOrd="0" destOrd="0" presId="urn:microsoft.com/office/officeart/2018/2/layout/IconLabelDescriptionList"/>
+    <dgm:cxn modelId="{523DF5B9-8090-4BBC-8819-DEBC5E97E4D0}" type="presParOf" srcId="{ACABA4BF-D7C4-49C2-B296-9A2F58CF07C2}" destId="{5346663F-C5F0-4419-BB8A-38929A0DE21D}" srcOrd="0" destOrd="0" presId="urn:microsoft.com/office/officeart/2018/2/layout/IconLabelDescriptionList"/>
+    <dgm:cxn modelId="{552CC774-575F-446B-B128-990CDA6D9F42}" type="presParOf" srcId="{5346663F-C5F0-4419-BB8A-38929A0DE21D}" destId="{7C006ADF-6D18-4668-8C58-0B12EC0849EC}" srcOrd="0" destOrd="0" presId="urn:microsoft.com/office/officeart/2018/2/layout/IconLabelDescriptionList"/>
+    <dgm:cxn modelId="{6BB74652-BCDA-44FC-8A67-BDEE20BB3379}" type="presParOf" srcId="{5346663F-C5F0-4419-BB8A-38929A0DE21D}" destId="{EB59B531-2247-4A93-A048-63273D40944E}" srcOrd="1" destOrd="0" presId="urn:microsoft.com/office/officeart/2018/2/layout/IconLabelDescriptionList"/>
+    <dgm:cxn modelId="{0CB67F34-E025-491D-AF4E-3263F768AC34}" type="presParOf" srcId="{5346663F-C5F0-4419-BB8A-38929A0DE21D}" destId="{0AE99A94-43E1-4F0E-A59F-CE938AA2C162}" srcOrd="2" destOrd="0" presId="urn:microsoft.com/office/officeart/2018/2/layout/IconLabelDescriptionList"/>
+    <dgm:cxn modelId="{2B12CE32-8C18-49C3-A33E-1B0A00F9F742}" type="presParOf" srcId="{5346663F-C5F0-4419-BB8A-38929A0DE21D}" destId="{117ECEB4-5E22-4ABD-B6ED-7B0C6EFAE5B5}" srcOrd="3" destOrd="0" presId="urn:microsoft.com/office/officeart/2018/2/layout/IconLabelDescriptionList"/>
+    <dgm:cxn modelId="{00B055E6-7DFF-4DA8-8FF6-625DA8595FF6}" type="presParOf" srcId="{5346663F-C5F0-4419-BB8A-38929A0DE21D}" destId="{C041A96E-7D65-4D14-B233-0FC35E3099B3}" srcOrd="4" destOrd="0" presId="urn:microsoft.com/office/officeart/2018/2/layout/IconLabelDescriptionList"/>
+    <dgm:cxn modelId="{C5E730FF-D7CD-4BB5-8451-EBA7A14B9490}" type="presParOf" srcId="{ACABA4BF-D7C4-49C2-B296-9A2F58CF07C2}" destId="{97507BB0-308D-4F5A-80B8-5FA7194A7913}" srcOrd="1" destOrd="0" presId="urn:microsoft.com/office/officeart/2018/2/layout/IconLabelDescriptionList"/>
+    <dgm:cxn modelId="{A088A64B-7C8D-4D02-84BF-0B67CF3DE85F}" type="presParOf" srcId="{ACABA4BF-D7C4-49C2-B296-9A2F58CF07C2}" destId="{6860C664-26F8-4C21-AC9D-0F82CC7AC523}" srcOrd="2" destOrd="0" presId="urn:microsoft.com/office/officeart/2018/2/layout/IconLabelDescriptionList"/>
+    <dgm:cxn modelId="{B706BCA4-81A1-4DF1-A5B7-C2E31835F44D}" type="presParOf" srcId="{6860C664-26F8-4C21-AC9D-0F82CC7AC523}" destId="{0A48867C-D143-4D15-AF45-03285283983F}" srcOrd="0" destOrd="0" presId="urn:microsoft.com/office/officeart/2018/2/layout/IconLabelDescriptionList"/>
+    <dgm:cxn modelId="{A66F20E4-4FF4-4FDA-AA7C-2A2AF0729377}" type="presParOf" srcId="{6860C664-26F8-4C21-AC9D-0F82CC7AC523}" destId="{D1CD1DDF-0967-4133-AB5A-62CE0D4BE136}" srcOrd="1" destOrd="0" presId="urn:microsoft.com/office/officeart/2018/2/layout/IconLabelDescriptionList"/>
+    <dgm:cxn modelId="{C2907FB8-CD0E-44E0-A448-E1D3B0408BE8}" type="presParOf" srcId="{6860C664-26F8-4C21-AC9D-0F82CC7AC523}" destId="{CDCFB828-BAF8-4793-8905-8C74334BD306}" srcOrd="2" destOrd="0" presId="urn:microsoft.com/office/officeart/2018/2/layout/IconLabelDescriptionList"/>
+    <dgm:cxn modelId="{84C700CC-F953-4742-80E5-28F5767F366A}" type="presParOf" srcId="{6860C664-26F8-4C21-AC9D-0F82CC7AC523}" destId="{D84ECA16-89B8-4408-A4B3-2F8DDCFD2DEE}" srcOrd="3" destOrd="0" presId="urn:microsoft.com/office/officeart/2018/2/layout/IconLabelDescriptionList"/>
+    <dgm:cxn modelId="{0D620AB0-AD28-4762-AB0C-697F6D1E67F3}" type="presParOf" srcId="{6860C664-26F8-4C21-AC9D-0F82CC7AC523}" destId="{B995C06C-6F2A-4CA0-9CEB-4D47D418558E}" srcOrd="4" destOrd="0" presId="urn:microsoft.com/office/officeart/2018/2/layout/IconLabelDescriptionList"/>
+    <dgm:cxn modelId="{69672752-1929-47CB-B20A-D26E17F2EAB6}" type="presParOf" srcId="{ACABA4BF-D7C4-49C2-B296-9A2F58CF07C2}" destId="{AC1BE407-0F6A-4CBE-B04A-F3523BD49B5F}" srcOrd="3" destOrd="0" presId="urn:microsoft.com/office/officeart/2018/2/layout/IconLabelDescriptionList"/>
+    <dgm:cxn modelId="{8A79F413-D4C2-47E4-BE27-9E17E36B0477}" type="presParOf" srcId="{ACABA4BF-D7C4-49C2-B296-9A2F58CF07C2}" destId="{9D22D4C2-60EA-4EDC-B772-A9A3E8318E35}" srcOrd="4" destOrd="0" presId="urn:microsoft.com/office/officeart/2018/2/layout/IconLabelDescriptionList"/>
+    <dgm:cxn modelId="{39EC2C0B-FCB0-45A4-8914-A7292DDBE1DF}" type="presParOf" srcId="{9D22D4C2-60EA-4EDC-B772-A9A3E8318E35}" destId="{0C125D6D-2860-4A34-8D31-B6E72DB68C1D}" srcOrd="0" destOrd="0" presId="urn:microsoft.com/office/officeart/2018/2/layout/IconLabelDescriptionList"/>
+    <dgm:cxn modelId="{357D0DF7-E5B8-498D-93D4-B4D38D4581E7}" type="presParOf" srcId="{9D22D4C2-60EA-4EDC-B772-A9A3E8318E35}" destId="{203ED8AF-94E6-4C61-A62B-E6B4077D04ED}" srcOrd="1" destOrd="0" presId="urn:microsoft.com/office/officeart/2018/2/layout/IconLabelDescriptionList"/>
+    <dgm:cxn modelId="{0E34EB43-1FED-4142-BA9B-25F27B35F60A}" type="presParOf" srcId="{9D22D4C2-60EA-4EDC-B772-A9A3E8318E35}" destId="{995D9819-4DF8-4F24-995A-781E572FF7F0}" srcOrd="2" destOrd="0" presId="urn:microsoft.com/office/officeart/2018/2/layout/IconLabelDescriptionList"/>
+    <dgm:cxn modelId="{9664F5CD-1CAD-4B37-B276-1EDF1874D7CC}" type="presParOf" srcId="{9D22D4C2-60EA-4EDC-B772-A9A3E8318E35}" destId="{835A282C-FAE5-4D5A-863B-7AB9AE8E7D0E}" srcOrd="3" destOrd="0" presId="urn:microsoft.com/office/officeart/2018/2/layout/IconLabelDescriptionList"/>
+    <dgm:cxn modelId="{1CA93FC7-EF2F-41CC-B5DE-9F2962F72570}" type="presParOf" srcId="{9D22D4C2-60EA-4EDC-B772-A9A3E8318E35}" destId="{37DDB693-75C3-420D-8BA5-A82559155EC5}" srcOrd="4" destOrd="0" presId="urn:microsoft.com/office/officeart/2018/2/layout/IconLabelDescriptionList"/>
   </dgm:cxnLst>
   <dgm:bg/>
   <dgm:whole/>
@@ -2315,8 +3575,16 @@
             <a:buNone/>
           </a:pPr>
           <a:r>
-            <a:rPr lang="en-US" sz="2800" kern="1200"/>
-            <a:t>Each empty ShapeFile still take disk space and four files. An empty layer in GeoPackage has negligible</a:t>
+            <a:rPr lang="en-US" sz="2800" kern="1200" dirty="0"/>
+            <a:t>Each empty </a:t>
+          </a:r>
+          <a:r>
+            <a:rPr lang="en-US" sz="2800" kern="1200" dirty="0" err="1"/>
+            <a:t>ShapeFile</a:t>
+          </a:r>
+          <a:r>
+            <a:rPr lang="en-US" sz="2800" kern="1200" dirty="0"/>
+            <a:t> still take disk space and four files. An empty layer in GeoPackage has negligible.</a:t>
           </a:r>
         </a:p>
       </dsp:txBody>
@@ -2595,8 +3863,8 @@
             <a:buNone/>
           </a:pPr>
           <a:r>
-            <a:rPr lang="en-US" sz="2800" kern="1200"/>
-            <a:t>None of the test took advantage of spatial indexing for queries. Spatial filters may offer additional performance and functionality capabilities</a:t>
+            <a:rPr lang="en-US" sz="2800" kern="1200" dirty="0"/>
+            <a:t>None of the test took advantage of spatial indexing for queries. Spatial filters may offer additional performance and functionality capabilities.</a:t>
           </a:r>
         </a:p>
       </dsp:txBody>
@@ -2604,6 +3872,496 @@
         <a:off x="0" y="2304487"/>
         <a:ext cx="10515600" cy="1151399"/>
       </dsp:txXfrm>
+    </dsp:sp>
+  </dsp:spTree>
+</dsp:drawing>
+</file>
+
+<file path=ppt/diagrams/drawing2.xml><?xml version="1.0" encoding="utf-8"?>
+<dsp:drawing xmlns:dgm="http://schemas.openxmlformats.org/drawingml/2006/diagram" xmlns:dsp="http://schemas.microsoft.com/office/drawing/2008/diagram" xmlns:a="http://schemas.openxmlformats.org/drawingml/2006/main">
+  <dsp:spTree>
+    <dsp:nvGrpSpPr>
+      <dsp:cNvPr id="0" name=""/>
+      <dsp:cNvGrpSpPr/>
+    </dsp:nvGrpSpPr>
+    <dsp:grpSpPr/>
+    <dsp:sp modelId="{7C006ADF-6D18-4668-8C58-0B12EC0849EC}">
+      <dsp:nvSpPr>
+        <dsp:cNvPr id="0" name=""/>
+        <dsp:cNvSpPr/>
+      </dsp:nvSpPr>
+      <dsp:spPr>
+        <a:xfrm>
+          <a:off x="393" y="365349"/>
+          <a:ext cx="1098562" cy="1098562"/>
+        </a:xfrm>
+        <a:prstGeom prst="rect">
+          <a:avLst/>
+        </a:prstGeom>
+        <a:blipFill>
+          <a:blip xmlns:r="http://schemas.openxmlformats.org/officeDocument/2006/relationships" r:embed="rId1">
+            <a:extLst>
+              <a:ext uri="{28A0092B-C50C-407E-A947-70E740481C1C}">
+                <a14:useLocalDpi xmlns:a14="http://schemas.microsoft.com/office/drawing/2010/main" val="0"/>
+              </a:ext>
+              <a:ext uri="{96DAC541-7B7A-43D3-8B79-37D633B846F1}">
+                <asvg:svgBlip xmlns:asvg="http://schemas.microsoft.com/office/drawing/2016/SVG/main" r:embed="rId2"/>
+              </a:ext>
+            </a:extLst>
+          </a:blip>
+          <a:stretch>
+            <a:fillRect/>
+          </a:stretch>
+        </a:blipFill>
+        <a:ln w="12700" cap="flat" cmpd="sng" algn="ctr">
+          <a:noFill/>
+          <a:prstDash val="solid"/>
+          <a:miter lim="800000"/>
+        </a:ln>
+        <a:effectLst/>
+      </dsp:spPr>
+      <dsp:style>
+        <a:lnRef idx="2">
+          <a:scrgbClr r="0" g="0" b="0"/>
+        </a:lnRef>
+        <a:fillRef idx="1">
+          <a:scrgbClr r="0" g="0" b="0"/>
+        </a:fillRef>
+        <a:effectRef idx="0">
+          <a:scrgbClr r="0" g="0" b="0"/>
+        </a:effectRef>
+        <a:fontRef idx="minor">
+          <a:schemeClr val="lt1"/>
+        </a:fontRef>
+      </dsp:style>
+    </dsp:sp>
+    <dsp:sp modelId="{0AE99A94-43E1-4F0E-A59F-CE938AA2C162}">
+      <dsp:nvSpPr>
+        <dsp:cNvPr id="0" name=""/>
+        <dsp:cNvSpPr/>
+      </dsp:nvSpPr>
+      <dsp:spPr>
+        <a:xfrm>
+          <a:off x="393" y="1581167"/>
+          <a:ext cx="3138750" cy="588515"/>
+        </a:xfrm>
+        <a:prstGeom prst="rect">
+          <a:avLst/>
+        </a:prstGeom>
+        <a:noFill/>
+        <a:ln>
+          <a:noFill/>
+        </a:ln>
+        <a:effectLst/>
+      </dsp:spPr>
+      <dsp:style>
+        <a:lnRef idx="0">
+          <a:scrgbClr r="0" g="0" b="0"/>
+        </a:lnRef>
+        <a:fillRef idx="0">
+          <a:scrgbClr r="0" g="0" b="0"/>
+        </a:fillRef>
+        <a:effectRef idx="0">
+          <a:scrgbClr r="0" g="0" b="0"/>
+        </a:effectRef>
+        <a:fontRef idx="minor"/>
+      </dsp:style>
+      <dsp:txBody>
+        <a:bodyPr spcFirstLastPara="0" vert="horz" wrap="square" lIns="0" tIns="0" rIns="0" bIns="0" numCol="1" spcCol="1270" anchor="t" anchorCtr="0">
+          <a:noAutofit/>
+        </a:bodyPr>
+        <a:lstStyle/>
+        <a:p>
+          <a:pPr marL="0" lvl="0" indent="0" algn="l" defTabSz="622300">
+            <a:lnSpc>
+              <a:spcPct val="90000"/>
+            </a:lnSpc>
+            <a:spcBef>
+              <a:spcPct val="0"/>
+            </a:spcBef>
+            <a:spcAft>
+              <a:spcPct val="35000"/>
+            </a:spcAft>
+            <a:buNone/>
+            <a:defRPr b="1"/>
+          </a:pPr>
+          <a:r>
+            <a:rPr lang="en-US" sz="1400" kern="1200" dirty="0"/>
+            <a:t>Prototype tools to convert an existing CDB to GeoCDB are being published on GitHub:</a:t>
+          </a:r>
+        </a:p>
+      </dsp:txBody>
+      <dsp:txXfrm>
+        <a:off x="393" y="1581167"/>
+        <a:ext cx="3138750" cy="588515"/>
+      </dsp:txXfrm>
+    </dsp:sp>
+    <dsp:sp modelId="{C041A96E-7D65-4D14-B233-0FC35E3099B3}">
+      <dsp:nvSpPr>
+        <dsp:cNvPr id="0" name=""/>
+        <dsp:cNvSpPr/>
+      </dsp:nvSpPr>
+      <dsp:spPr>
+        <a:xfrm>
+          <a:off x="393" y="2055575"/>
+          <a:ext cx="3138750" cy="868004"/>
+        </a:xfrm>
+        <a:prstGeom prst="rect">
+          <a:avLst/>
+        </a:prstGeom>
+        <a:noFill/>
+        <a:ln>
+          <a:noFill/>
+        </a:ln>
+        <a:effectLst/>
+      </dsp:spPr>
+      <dsp:style>
+        <a:lnRef idx="0">
+          <a:scrgbClr r="0" g="0" b="0"/>
+        </a:lnRef>
+        <a:fillRef idx="0">
+          <a:scrgbClr r="0" g="0" b="0"/>
+        </a:fillRef>
+        <a:effectRef idx="0">
+          <a:scrgbClr r="0" g="0" b="0"/>
+        </a:effectRef>
+        <a:fontRef idx="minor"/>
+      </dsp:style>
+      <dsp:txBody>
+        <a:bodyPr spcFirstLastPara="0" vert="horz" wrap="square" lIns="0" tIns="0" rIns="0" bIns="0" numCol="1" spcCol="1270" anchor="t" anchorCtr="0">
+          <a:noAutofit/>
+        </a:bodyPr>
+        <a:lstStyle/>
+        <a:p>
+          <a:pPr marL="0" lvl="0" indent="0" algn="l" defTabSz="622300">
+            <a:lnSpc>
+              <a:spcPct val="90000"/>
+            </a:lnSpc>
+            <a:spcBef>
+              <a:spcPct val="0"/>
+            </a:spcBef>
+            <a:spcAft>
+              <a:spcPct val="35000"/>
+            </a:spcAft>
+            <a:buNone/>
+          </a:pPr>
+          <a:r>
+            <a:rPr lang="en-US" sz="1400" kern="1200" dirty="0">
+              <a:hlinkClick xmlns:r="http://schemas.openxmlformats.org/officeDocument/2006/relationships" r:id="rId3"/>
+            </a:rPr>
+            <a:t>https://github.com/Cognitics/GeoCDB</a:t>
+          </a:r>
+          <a:endParaRPr lang="en-US" sz="1400" kern="1200" dirty="0"/>
+        </a:p>
+        <a:p>
+          <a:pPr marL="0" lvl="0" indent="0" algn="l" defTabSz="622300">
+            <a:lnSpc>
+              <a:spcPct val="90000"/>
+            </a:lnSpc>
+            <a:spcBef>
+              <a:spcPct val="0"/>
+            </a:spcBef>
+            <a:spcAft>
+              <a:spcPct val="35000"/>
+            </a:spcAft>
+            <a:buNone/>
+          </a:pPr>
+          <a:r>
+            <a:rPr lang="en-US" sz="1400" kern="1200" dirty="0"/>
+            <a:t>Existing Prototype tools have been developed in Python using GDAL, other languages/environments are planned.</a:t>
+          </a:r>
+        </a:p>
+      </dsp:txBody>
+      <dsp:txXfrm>
+        <a:off x="393" y="2055575"/>
+        <a:ext cx="3138750" cy="868004"/>
+      </dsp:txXfrm>
+    </dsp:sp>
+    <dsp:sp modelId="{0A48867C-D143-4D15-AF45-03285283983F}">
+      <dsp:nvSpPr>
+        <dsp:cNvPr id="0" name=""/>
+        <dsp:cNvSpPr/>
+      </dsp:nvSpPr>
+      <dsp:spPr>
+        <a:xfrm>
+          <a:off x="3688425" y="365349"/>
+          <a:ext cx="1098562" cy="1098562"/>
+        </a:xfrm>
+        <a:prstGeom prst="rect">
+          <a:avLst/>
+        </a:prstGeom>
+        <a:blipFill>
+          <a:blip xmlns:r="http://schemas.openxmlformats.org/officeDocument/2006/relationships" r:embed="rId4">
+            <a:extLst>
+              <a:ext uri="{28A0092B-C50C-407E-A947-70E740481C1C}">
+                <a14:useLocalDpi xmlns:a14="http://schemas.microsoft.com/office/drawing/2010/main" val="0"/>
+              </a:ext>
+              <a:ext uri="{96DAC541-7B7A-43D3-8B79-37D633B846F1}">
+                <asvg:svgBlip xmlns:asvg="http://schemas.microsoft.com/office/drawing/2016/SVG/main" r:embed="rId5"/>
+              </a:ext>
+            </a:extLst>
+          </a:blip>
+          <a:stretch>
+            <a:fillRect/>
+          </a:stretch>
+        </a:blipFill>
+        <a:ln w="12700" cap="flat" cmpd="sng" algn="ctr">
+          <a:noFill/>
+          <a:prstDash val="solid"/>
+          <a:miter lim="800000"/>
+        </a:ln>
+        <a:effectLst/>
+      </dsp:spPr>
+      <dsp:style>
+        <a:lnRef idx="2">
+          <a:scrgbClr r="0" g="0" b="0"/>
+        </a:lnRef>
+        <a:fillRef idx="1">
+          <a:scrgbClr r="0" g="0" b="0"/>
+        </a:fillRef>
+        <a:effectRef idx="0">
+          <a:scrgbClr r="0" g="0" b="0"/>
+        </a:effectRef>
+        <a:fontRef idx="minor">
+          <a:schemeClr val="lt1"/>
+        </a:fontRef>
+      </dsp:style>
+    </dsp:sp>
+    <dsp:sp modelId="{CDCFB828-BAF8-4793-8905-8C74334BD306}">
+      <dsp:nvSpPr>
+        <dsp:cNvPr id="0" name=""/>
+        <dsp:cNvSpPr/>
+      </dsp:nvSpPr>
+      <dsp:spPr>
+        <a:xfrm>
+          <a:off x="3688425" y="1581167"/>
+          <a:ext cx="3138750" cy="588515"/>
+        </a:xfrm>
+        <a:prstGeom prst="rect">
+          <a:avLst/>
+        </a:prstGeom>
+        <a:noFill/>
+        <a:ln>
+          <a:noFill/>
+        </a:ln>
+        <a:effectLst/>
+      </dsp:spPr>
+      <dsp:style>
+        <a:lnRef idx="0">
+          <a:scrgbClr r="0" g="0" b="0"/>
+        </a:lnRef>
+        <a:fillRef idx="0">
+          <a:scrgbClr r="0" g="0" b="0"/>
+        </a:fillRef>
+        <a:effectRef idx="0">
+          <a:scrgbClr r="0" g="0" b="0"/>
+        </a:effectRef>
+        <a:fontRef idx="minor"/>
+      </dsp:style>
+      <dsp:txBody>
+        <a:bodyPr spcFirstLastPara="0" vert="horz" wrap="square" lIns="0" tIns="0" rIns="0" bIns="0" numCol="1" spcCol="1270" anchor="t" anchorCtr="0">
+          <a:noAutofit/>
+        </a:bodyPr>
+        <a:lstStyle/>
+        <a:p>
+          <a:pPr marL="0" lvl="0" indent="0" algn="l" defTabSz="622300">
+            <a:lnSpc>
+              <a:spcPct val="90000"/>
+            </a:lnSpc>
+            <a:spcBef>
+              <a:spcPct val="0"/>
+            </a:spcBef>
+            <a:spcAft>
+              <a:spcPct val="35000"/>
+            </a:spcAft>
+            <a:buNone/>
+            <a:defRPr b="1"/>
+          </a:pPr>
+          <a:r>
+            <a:rPr lang="en-US" sz="1400" kern="1200" dirty="0"/>
+            <a:t>Additional tools and performance analysis are continuing to be developed and updated on GitHub.</a:t>
+          </a:r>
+        </a:p>
+      </dsp:txBody>
+      <dsp:txXfrm>
+        <a:off x="3688425" y="1581167"/>
+        <a:ext cx="3138750" cy="588515"/>
+      </dsp:txXfrm>
+    </dsp:sp>
+    <dsp:sp modelId="{B995C06C-6F2A-4CA0-9CEB-4D47D418558E}">
+      <dsp:nvSpPr>
+        <dsp:cNvPr id="0" name=""/>
+        <dsp:cNvSpPr/>
+      </dsp:nvSpPr>
+      <dsp:spPr>
+        <a:xfrm>
+          <a:off x="3688425" y="2224220"/>
+          <a:ext cx="3138750" cy="868004"/>
+        </a:xfrm>
+        <a:prstGeom prst="rect">
+          <a:avLst/>
+        </a:prstGeom>
+        <a:noFill/>
+        <a:ln>
+          <a:noFill/>
+        </a:ln>
+        <a:effectLst/>
+      </dsp:spPr>
+      <dsp:style>
+        <a:lnRef idx="0">
+          <a:scrgbClr r="0" g="0" b="0"/>
+        </a:lnRef>
+        <a:fillRef idx="0">
+          <a:scrgbClr r="0" g="0" b="0"/>
+        </a:fillRef>
+        <a:effectRef idx="0">
+          <a:scrgbClr r="0" g="0" b="0"/>
+        </a:effectRef>
+        <a:fontRef idx="minor"/>
+      </dsp:style>
+    </dsp:sp>
+    <dsp:sp modelId="{0C125D6D-2860-4A34-8D31-B6E72DB68C1D}">
+      <dsp:nvSpPr>
+        <dsp:cNvPr id="0" name=""/>
+        <dsp:cNvSpPr/>
+      </dsp:nvSpPr>
+      <dsp:spPr>
+        <a:xfrm>
+          <a:off x="7376456" y="365349"/>
+          <a:ext cx="1098562" cy="1098562"/>
+        </a:xfrm>
+        <a:prstGeom prst="rect">
+          <a:avLst/>
+        </a:prstGeom>
+        <a:blipFill>
+          <a:blip xmlns:r="http://schemas.openxmlformats.org/officeDocument/2006/relationships" r:embed="rId6">
+            <a:extLst>
+              <a:ext uri="{28A0092B-C50C-407E-A947-70E740481C1C}">
+                <a14:useLocalDpi xmlns:a14="http://schemas.microsoft.com/office/drawing/2010/main" val="0"/>
+              </a:ext>
+              <a:ext uri="{96DAC541-7B7A-43D3-8B79-37D633B846F1}">
+                <asvg:svgBlip xmlns:asvg="http://schemas.microsoft.com/office/drawing/2016/SVG/main" r:embed="rId7"/>
+              </a:ext>
+            </a:extLst>
+          </a:blip>
+          <a:stretch>
+            <a:fillRect/>
+          </a:stretch>
+        </a:blipFill>
+        <a:ln w="12700" cap="flat" cmpd="sng" algn="ctr">
+          <a:noFill/>
+          <a:prstDash val="solid"/>
+          <a:miter lim="800000"/>
+        </a:ln>
+        <a:effectLst/>
+      </dsp:spPr>
+      <dsp:style>
+        <a:lnRef idx="2">
+          <a:scrgbClr r="0" g="0" b="0"/>
+        </a:lnRef>
+        <a:fillRef idx="1">
+          <a:scrgbClr r="0" g="0" b="0"/>
+        </a:fillRef>
+        <a:effectRef idx="0">
+          <a:scrgbClr r="0" g="0" b="0"/>
+        </a:effectRef>
+        <a:fontRef idx="minor">
+          <a:schemeClr val="lt1"/>
+        </a:fontRef>
+      </dsp:style>
+    </dsp:sp>
+    <dsp:sp modelId="{995D9819-4DF8-4F24-995A-781E572FF7F0}">
+      <dsp:nvSpPr>
+        <dsp:cNvPr id="0" name=""/>
+        <dsp:cNvSpPr/>
+      </dsp:nvSpPr>
+      <dsp:spPr>
+        <a:xfrm>
+          <a:off x="7376456" y="1581167"/>
+          <a:ext cx="3138750" cy="588515"/>
+        </a:xfrm>
+        <a:prstGeom prst="rect">
+          <a:avLst/>
+        </a:prstGeom>
+        <a:noFill/>
+        <a:ln>
+          <a:noFill/>
+        </a:ln>
+        <a:effectLst/>
+      </dsp:spPr>
+      <dsp:style>
+        <a:lnRef idx="0">
+          <a:scrgbClr r="0" g="0" b="0"/>
+        </a:lnRef>
+        <a:fillRef idx="0">
+          <a:scrgbClr r="0" g="0" b="0"/>
+        </a:fillRef>
+        <a:effectRef idx="0">
+          <a:scrgbClr r="0" g="0" b="0"/>
+        </a:effectRef>
+        <a:fontRef idx="minor"/>
+      </dsp:style>
+      <dsp:txBody>
+        <a:bodyPr spcFirstLastPara="0" vert="horz" wrap="square" lIns="0" tIns="0" rIns="0" bIns="0" numCol="1" spcCol="1270" anchor="t" anchorCtr="0">
+          <a:noAutofit/>
+        </a:bodyPr>
+        <a:lstStyle/>
+        <a:p>
+          <a:pPr marL="0" lvl="0" indent="0" algn="l" defTabSz="622300">
+            <a:lnSpc>
+              <a:spcPct val="90000"/>
+            </a:lnSpc>
+            <a:spcBef>
+              <a:spcPct val="0"/>
+            </a:spcBef>
+            <a:spcAft>
+              <a:spcPct val="35000"/>
+            </a:spcAft>
+            <a:buNone/>
+            <a:defRPr b="1"/>
+          </a:pPr>
+          <a:r>
+            <a:rPr lang="en-US" sz="1400" kern="1200" dirty="0"/>
+            <a:t>Contributions and pull requests are welcome.</a:t>
+          </a:r>
+        </a:p>
+      </dsp:txBody>
+      <dsp:txXfrm>
+        <a:off x="7376456" y="1581167"/>
+        <a:ext cx="3138750" cy="588515"/>
+      </dsp:txXfrm>
+    </dsp:sp>
+    <dsp:sp modelId="{37DDB693-75C3-420D-8BA5-A82559155EC5}">
+      <dsp:nvSpPr>
+        <dsp:cNvPr id="0" name=""/>
+        <dsp:cNvSpPr/>
+      </dsp:nvSpPr>
+      <dsp:spPr>
+        <a:xfrm>
+          <a:off x="7376456" y="2224220"/>
+          <a:ext cx="3138750" cy="868004"/>
+        </a:xfrm>
+        <a:prstGeom prst="rect">
+          <a:avLst/>
+        </a:prstGeom>
+        <a:noFill/>
+        <a:ln>
+          <a:noFill/>
+        </a:ln>
+        <a:effectLst/>
+      </dsp:spPr>
+      <dsp:style>
+        <a:lnRef idx="0">
+          <a:scrgbClr r="0" g="0" b="0"/>
+        </a:lnRef>
+        <a:fillRef idx="0">
+          <a:scrgbClr r="0" g="0" b="0"/>
+        </a:fillRef>
+        <a:effectRef idx="0">
+          <a:scrgbClr r="0" g="0" b="0"/>
+        </a:effectRef>
+        <a:fontRef idx="minor"/>
+      </dsp:style>
     </dsp:sp>
   </dsp:spTree>
 </dsp:drawing>
@@ -3075,6 +4833,215 @@
 </dgm:layoutDef>
 </file>
 
+<file path=ppt/diagrams/layout2.xml><?xml version="1.0" encoding="utf-8"?>
+<dgm:layoutDef xmlns:dgm="http://schemas.openxmlformats.org/drawingml/2006/diagram" xmlns:a="http://schemas.openxmlformats.org/drawingml/2006/main" uniqueId="urn:microsoft.com/office/officeart/2018/2/layout/IconLabelDescriptionList">
+  <dgm:title val="Icon Label Description List"/>
+  <dgm:desc val="Use to show non-sequential or grouped chunks of information. The placeholder holds an icon or small picture, and corresponding text boxes show Level 1 and Level 2 text respectively. Works well for minimal Level 1 text accompanied by lengthier Level two text."/>
+  <dgm:catLst>
+    <dgm:cat type="icon" pri="500"/>
+  </dgm:catLst>
+  <dgm:sampData useDef="1">
+    <dgm:dataModel>
+      <dgm:ptLst/>
+      <dgm:bg/>
+      <dgm:whole/>
+    </dgm:dataModel>
+  </dgm:sampData>
+  <dgm:styleData useDef="1">
+    <dgm:dataModel>
+      <dgm:ptLst/>
+      <dgm:bg/>
+      <dgm:whole/>
+    </dgm:dataModel>
+  </dgm:styleData>
+  <dgm:clrData useDef="1">
+    <dgm:dataModel>
+      <dgm:ptLst/>
+      <dgm:bg/>
+      <dgm:whole/>
+    </dgm:dataModel>
+  </dgm:clrData>
+  <dgm:layoutNode name="root">
+    <dgm:varLst>
+      <dgm:dir/>
+      <dgm:resizeHandles val="exact"/>
+    </dgm:varLst>
+    <dgm:choose name="Name0">
+      <dgm:if name="Name1" axis="self" func="var" arg="dir" op="equ" val="norm">
+        <dgm:alg type="lin"/>
+      </dgm:if>
+      <dgm:else name="Name2">
+        <dgm:alg type="lin">
+          <dgm:param type="linDir" val="fromR"/>
+        </dgm:alg>
+      </dgm:else>
+    </dgm:choose>
+    <dgm:shape xmlns:r="http://schemas.openxmlformats.org/officeDocument/2006/relationships" r:blip="">
+      <dgm:adjLst/>
+    </dgm:shape>
+    <dgm:presOf/>
+    <dgm:constrLst>
+      <dgm:constr type="h" for="ch" forName="compNode" refType="h" fact="0.45"/>
+      <dgm:constr type="w" for="ch" forName="compNode" val="120"/>
+      <dgm:constr type="w" for="ch" forName="sibTrans" refType="w" refFor="ch" refForName="compNode" fact="0.175"/>
+      <dgm:constr type="primFontSz" for="des" forName="parTx" val="36"/>
+      <dgm:constr type="primFontSz" for="des" forName="desTx" refType="primFontSz" refFor="des" refForName="parTx" op="lte" fact="0.75"/>
+      <dgm:constr type="h" for="des" forName="compNode" op="equ"/>
+      <dgm:constr type="h" for="des" forName="iconRect" op="equ"/>
+      <dgm:constr type="w" for="des" forName="iconRect" op="equ"/>
+      <dgm:constr type="h" for="des" forName="iconSpace" op="equ"/>
+      <dgm:constr type="h" for="des" forName="parTx" op="equ"/>
+      <dgm:constr type="h" for="des" forName="txSpace" op="equ"/>
+      <dgm:constr type="h" for="des" forName="desTx" op="equ"/>
+    </dgm:constrLst>
+    <dgm:ruleLst>
+      <dgm:rule type="w" for="ch" forName="compNode" val="0" fact="NaN" max="NaN"/>
+    </dgm:ruleLst>
+    <dgm:forEach name="Name3" axis="ch" ptType="node">
+      <dgm:layoutNode name="compNode">
+        <dgm:alg type="composite"/>
+        <dgm:shape xmlns:r="http://schemas.openxmlformats.org/officeDocument/2006/relationships" r:blip="">
+          <dgm:adjLst/>
+        </dgm:shape>
+        <dgm:presOf axis="self"/>
+        <dgm:constrLst>
+          <dgm:constr type="w" for="ch" forName="iconRect" refType="w" fact="0.35"/>
+          <dgm:constr type="h" for="ch" forName="iconRect" refType="w" refFor="ch" refForName="iconRect"/>
+          <dgm:constr type="l" for="ch" forName="iconRect"/>
+          <dgm:constr type="t" for="ch" forName="iconRect"/>
+          <dgm:constr type="w" for="ch" forName="iconSpace" refType="w"/>
+          <dgm:constr type="h" for="ch" forName="iconSpace" refType="h" fact="0.043"/>
+          <dgm:constr type="l" for="ch" forName="iconSpace"/>
+          <dgm:constr type="t" for="ch" forName="iconSpace" refType="b" refFor="ch" refForName="iconRect"/>
+          <dgm:constr type="w" for="ch" forName="parTx" refType="w"/>
+          <dgm:constr type="h" for="ch" forName="parTx" refType="w" fact="0.15"/>
+          <dgm:constr type="l" for="ch" forName="parTx"/>
+          <dgm:constr type="t" for="ch" forName="parTx" refType="b" refFor="ch" refForName="iconSpace"/>
+          <dgm:constr type="h" for="ch" forName="txSpace" refType="h" fact="0.02"/>
+          <dgm:constr type="w" for="ch" forName="txSpace" refType="w"/>
+          <dgm:constr type="l" for="ch" forName="txSpace"/>
+          <dgm:constr type="t" for="ch" forName="txSpace" refType="b" refFor="ch" refForName="parTx"/>
+          <dgm:constr type="w" for="ch" forName="desTx" refType="w"/>
+          <dgm:constr type="l" for="ch" forName="desTx"/>
+          <dgm:constr type="t" for="ch" forName="desTx" refType="b" refFor="ch" refForName="txSpace"/>
+        </dgm:constrLst>
+        <dgm:ruleLst>
+          <dgm:rule type="h" val="INF" fact="NaN" max="NaN"/>
+        </dgm:ruleLst>
+        <dgm:layoutNode name="iconRect" styleLbl="node1">
+          <dgm:alg type="sp"/>
+          <dgm:shape xmlns:r="http://schemas.openxmlformats.org/officeDocument/2006/relationships" type="rect" r:blip="" blipPhldr="1">
+            <dgm:adjLst/>
+          </dgm:shape>
+          <dgm:presOf/>
+          <dgm:constrLst/>
+          <dgm:ruleLst/>
+        </dgm:layoutNode>
+        <dgm:layoutNode name="iconSpace">
+          <dgm:alg type="sp"/>
+          <dgm:shape xmlns:r="http://schemas.openxmlformats.org/officeDocument/2006/relationships" r:blip="">
+            <dgm:adjLst/>
+          </dgm:shape>
+          <dgm:presOf/>
+          <dgm:constrLst/>
+          <dgm:ruleLst/>
+        </dgm:layoutNode>
+        <dgm:layoutNode name="parTx" styleLbl="revTx">
+          <dgm:varLst>
+            <dgm:chMax val="0"/>
+            <dgm:chPref val="0"/>
+          </dgm:varLst>
+          <dgm:alg type="tx">
+            <dgm:param type="txAnchorVert" val="t"/>
+            <dgm:param type="parTxLTRAlign" val="l"/>
+            <dgm:param type="shpTxLTRAlignCh" val="l"/>
+            <dgm:param type="parTxRTLAlign" val="r"/>
+            <dgm:param type="shpTxRTLAlignCh" val="r"/>
+          </dgm:alg>
+          <dgm:shape xmlns:r="http://schemas.openxmlformats.org/officeDocument/2006/relationships" type="rect" r:blip="">
+            <dgm:adjLst/>
+          </dgm:shape>
+          <dgm:presOf axis="self" ptType="node"/>
+          <dgm:constrLst>
+            <dgm:constr type="lMarg"/>
+            <dgm:constr type="rMarg"/>
+            <dgm:constr type="tMarg"/>
+            <dgm:constr type="bMarg"/>
+          </dgm:constrLst>
+          <dgm:ruleLst>
+            <dgm:rule type="primFontSz" val="14" fact="NaN" max="NaN"/>
+            <dgm:rule type="h" val="INF" fact="NaN" max="NaN"/>
+          </dgm:ruleLst>
+        </dgm:layoutNode>
+        <dgm:layoutNode name="txSpace">
+          <dgm:alg type="sp"/>
+          <dgm:shape xmlns:r="http://schemas.openxmlformats.org/officeDocument/2006/relationships" r:blip="">
+            <dgm:adjLst/>
+          </dgm:shape>
+          <dgm:presOf/>
+          <dgm:constrLst/>
+          <dgm:ruleLst/>
+        </dgm:layoutNode>
+        <dgm:layoutNode name="desTx" styleLbl="revTx">
+          <dgm:varLst/>
+          <dgm:alg type="tx">
+            <dgm:param type="stBulletLvl" val="0"/>
+            <dgm:param type="txAnchorVert" val="t"/>
+            <dgm:param type="parTxLTRAlign" val="l"/>
+            <dgm:param type="shpTxLTRAlignCh" val="l"/>
+            <dgm:param type="parTxRTLAlign" val="r"/>
+            <dgm:param type="shpTxRTLAlignCh" val="r"/>
+          </dgm:alg>
+          <dgm:shape xmlns:r="http://schemas.openxmlformats.org/officeDocument/2006/relationships" type="rect" r:blip="">
+            <dgm:adjLst/>
+          </dgm:shape>
+          <dgm:presOf axis="des" ptType="node"/>
+          <dgm:constrLst>
+            <dgm:constr type="secFontSz" refType="primFontSz"/>
+            <dgm:constr type="lMarg"/>
+            <dgm:constr type="rMarg"/>
+            <dgm:constr type="tMarg"/>
+            <dgm:constr type="bMarg"/>
+          </dgm:constrLst>
+          <dgm:ruleLst>
+            <dgm:rule type="primFontSz" val="NaN" fact="NaN" max="17"/>
+            <dgm:rule type="h" val="INF" fact="NaN" max="NaN"/>
+          </dgm:ruleLst>
+        </dgm:layoutNode>
+      </dgm:layoutNode>
+      <dgm:forEach name="Name4" axis="followSib" ptType="sibTrans" cnt="1">
+        <dgm:layoutNode name="sibTrans">
+          <dgm:alg type="sp"/>
+          <dgm:shape xmlns:r="http://schemas.openxmlformats.org/officeDocument/2006/relationships" r:blip="">
+            <dgm:adjLst/>
+          </dgm:shape>
+          <dgm:presOf axis="self"/>
+          <dgm:constrLst/>
+          <dgm:ruleLst/>
+        </dgm:layoutNode>
+      </dgm:forEach>
+    </dgm:forEach>
+  </dgm:layoutNode>
+  <dgm:extLst>
+    <a:ext uri="{68A01E43-0DF5-4B5B-8FA6-DAF915123BFB}">
+      <dgm1612:lstStyle xmlns:dgm1612="http://schemas.microsoft.com/office/drawing/2016/12/diagram">
+        <a:lvl1pPr>
+          <a:lnSpc>
+            <a:spcPct val="100000"/>
+          </a:lnSpc>
+          <a:defRPr b="1"/>
+        </a:lvl1pPr>
+        <a:lvl2pPr>
+          <a:lnSpc>
+            <a:spcPct val="100000"/>
+          </a:lnSpc>
+        </a:lvl2pPr>
+      </dgm1612:lstStyle>
+    </a:ext>
+  </dgm:extLst>
+</dgm:layoutDef>
+</file>
+
 <file path=ppt/diagrams/quickStyle1.xml><?xml version="1.0" encoding="utf-8"?>
 <dgm:styleDef xmlns:dgm="http://schemas.openxmlformats.org/drawingml/2006/diagram" xmlns:a="http://schemas.openxmlformats.org/drawingml/2006/main" uniqueId="urn:microsoft.com/office/officeart/2005/8/quickstyle/simple3">
   <dgm:title val=""/>
@@ -4107,6 +6074,1040 @@
         <a:scrgbClr r="0" g="0" b="0"/>
       </a:fillRef>
       <a:effectRef idx="1">
+        <a:scrgbClr r="0" g="0" b="0"/>
+      </a:effectRef>
+      <a:fontRef idx="minor"/>
+    </dgm:style>
+  </dgm:styleLbl>
+  <dgm:styleLbl name="revTx">
+    <dgm:scene3d>
+      <a:camera prst="orthographicFront"/>
+      <a:lightRig rig="threePt" dir="t"/>
+    </dgm:scene3d>
+    <dgm:sp3d/>
+    <dgm:txPr/>
+    <dgm:style>
+      <a:lnRef idx="0">
+        <a:scrgbClr r="0" g="0" b="0"/>
+      </a:lnRef>
+      <a:fillRef idx="0">
+        <a:scrgbClr r="0" g="0" b="0"/>
+      </a:fillRef>
+      <a:effectRef idx="0">
+        <a:scrgbClr r="0" g="0" b="0"/>
+      </a:effectRef>
+      <a:fontRef idx="minor"/>
+    </dgm:style>
+  </dgm:styleLbl>
+</dgm:styleDef>
+</file>
+
+<file path=ppt/diagrams/quickStyle2.xml><?xml version="1.0" encoding="utf-8"?>
+<dgm:styleDef xmlns:dgm="http://schemas.openxmlformats.org/drawingml/2006/diagram" xmlns:a="http://schemas.openxmlformats.org/drawingml/2006/main" uniqueId="urn:microsoft.com/office/officeart/2005/8/quickstyle/simple1">
+  <dgm:title val=""/>
+  <dgm:desc val=""/>
+  <dgm:catLst>
+    <dgm:cat type="simple" pri="10100"/>
+  </dgm:catLst>
+  <dgm:scene3d>
+    <a:camera prst="orthographicFront"/>
+    <a:lightRig rig="threePt" dir="t"/>
+  </dgm:scene3d>
+  <dgm:styleLbl name="node0">
+    <dgm:scene3d>
+      <a:camera prst="orthographicFront"/>
+      <a:lightRig rig="threePt" dir="t"/>
+    </dgm:scene3d>
+    <dgm:sp3d/>
+    <dgm:txPr/>
+    <dgm:style>
+      <a:lnRef idx="2">
+        <a:scrgbClr r="0" g="0" b="0"/>
+      </a:lnRef>
+      <a:fillRef idx="1">
+        <a:scrgbClr r="0" g="0" b="0"/>
+      </a:fillRef>
+      <a:effectRef idx="0">
+        <a:scrgbClr r="0" g="0" b="0"/>
+      </a:effectRef>
+      <a:fontRef idx="minor">
+        <a:schemeClr val="lt1"/>
+      </a:fontRef>
+    </dgm:style>
+  </dgm:styleLbl>
+  <dgm:styleLbl name="lnNode1">
+    <dgm:scene3d>
+      <a:camera prst="orthographicFront"/>
+      <a:lightRig rig="threePt" dir="t"/>
+    </dgm:scene3d>
+    <dgm:sp3d/>
+    <dgm:txPr/>
+    <dgm:style>
+      <a:lnRef idx="2">
+        <a:scrgbClr r="0" g="0" b="0"/>
+      </a:lnRef>
+      <a:fillRef idx="1">
+        <a:scrgbClr r="0" g="0" b="0"/>
+      </a:fillRef>
+      <a:effectRef idx="0">
+        <a:scrgbClr r="0" g="0" b="0"/>
+      </a:effectRef>
+      <a:fontRef idx="minor">
+        <a:schemeClr val="lt1"/>
+      </a:fontRef>
+    </dgm:style>
+  </dgm:styleLbl>
+  <dgm:styleLbl name="vennNode1">
+    <dgm:scene3d>
+      <a:camera prst="orthographicFront"/>
+      <a:lightRig rig="threePt" dir="t"/>
+    </dgm:scene3d>
+    <dgm:sp3d/>
+    <dgm:txPr/>
+    <dgm:style>
+      <a:lnRef idx="2">
+        <a:scrgbClr r="0" g="0" b="0"/>
+      </a:lnRef>
+      <a:fillRef idx="1">
+        <a:scrgbClr r="0" g="0" b="0"/>
+      </a:fillRef>
+      <a:effectRef idx="0">
+        <a:scrgbClr r="0" g="0" b="0"/>
+      </a:effectRef>
+      <a:fontRef idx="minor">
+        <a:schemeClr val="tx1"/>
+      </a:fontRef>
+    </dgm:style>
+  </dgm:styleLbl>
+  <dgm:styleLbl name="alignNode1">
+    <dgm:scene3d>
+      <a:camera prst="orthographicFront"/>
+      <a:lightRig rig="threePt" dir="t"/>
+    </dgm:scene3d>
+    <dgm:sp3d/>
+    <dgm:txPr/>
+    <dgm:style>
+      <a:lnRef idx="2">
+        <a:scrgbClr r="0" g="0" b="0"/>
+      </a:lnRef>
+      <a:fillRef idx="1">
+        <a:scrgbClr r="0" g="0" b="0"/>
+      </a:fillRef>
+      <a:effectRef idx="0">
+        <a:scrgbClr r="0" g="0" b="0"/>
+      </a:effectRef>
+      <a:fontRef idx="minor">
+        <a:schemeClr val="lt1"/>
+      </a:fontRef>
+    </dgm:style>
+  </dgm:styleLbl>
+  <dgm:styleLbl name="node1">
+    <dgm:scene3d>
+      <a:camera prst="orthographicFront"/>
+      <a:lightRig rig="threePt" dir="t"/>
+    </dgm:scene3d>
+    <dgm:sp3d/>
+    <dgm:txPr/>
+    <dgm:style>
+      <a:lnRef idx="2">
+        <a:scrgbClr r="0" g="0" b="0"/>
+      </a:lnRef>
+      <a:fillRef idx="1">
+        <a:scrgbClr r="0" g="0" b="0"/>
+      </a:fillRef>
+      <a:effectRef idx="0">
+        <a:scrgbClr r="0" g="0" b="0"/>
+      </a:effectRef>
+      <a:fontRef idx="minor">
+        <a:schemeClr val="lt1"/>
+      </a:fontRef>
+    </dgm:style>
+  </dgm:styleLbl>
+  <dgm:styleLbl name="node2">
+    <dgm:scene3d>
+      <a:camera prst="orthographicFront"/>
+      <a:lightRig rig="threePt" dir="t"/>
+    </dgm:scene3d>
+    <dgm:sp3d/>
+    <dgm:txPr/>
+    <dgm:style>
+      <a:lnRef idx="2">
+        <a:scrgbClr r="0" g="0" b="0"/>
+      </a:lnRef>
+      <a:fillRef idx="1">
+        <a:scrgbClr r="0" g="0" b="0"/>
+      </a:fillRef>
+      <a:effectRef idx="0">
+        <a:scrgbClr r="0" g="0" b="0"/>
+      </a:effectRef>
+      <a:fontRef idx="minor">
+        <a:schemeClr val="lt1"/>
+      </a:fontRef>
+    </dgm:style>
+  </dgm:styleLbl>
+  <dgm:styleLbl name="node3">
+    <dgm:scene3d>
+      <a:camera prst="orthographicFront"/>
+      <a:lightRig rig="threePt" dir="t"/>
+    </dgm:scene3d>
+    <dgm:sp3d/>
+    <dgm:txPr/>
+    <dgm:style>
+      <a:lnRef idx="2">
+        <a:scrgbClr r="0" g="0" b="0"/>
+      </a:lnRef>
+      <a:fillRef idx="1">
+        <a:scrgbClr r="0" g="0" b="0"/>
+      </a:fillRef>
+      <a:effectRef idx="0">
+        <a:scrgbClr r="0" g="0" b="0"/>
+      </a:effectRef>
+      <a:fontRef idx="minor">
+        <a:schemeClr val="lt1"/>
+      </a:fontRef>
+    </dgm:style>
+  </dgm:styleLbl>
+  <dgm:styleLbl name="node4">
+    <dgm:scene3d>
+      <a:camera prst="orthographicFront"/>
+      <a:lightRig rig="threePt" dir="t"/>
+    </dgm:scene3d>
+    <dgm:sp3d/>
+    <dgm:txPr/>
+    <dgm:style>
+      <a:lnRef idx="2">
+        <a:scrgbClr r="0" g="0" b="0"/>
+      </a:lnRef>
+      <a:fillRef idx="1">
+        <a:scrgbClr r="0" g="0" b="0"/>
+      </a:fillRef>
+      <a:effectRef idx="0">
+        <a:scrgbClr r="0" g="0" b="0"/>
+      </a:effectRef>
+      <a:fontRef idx="minor">
+        <a:schemeClr val="lt1"/>
+      </a:fontRef>
+    </dgm:style>
+  </dgm:styleLbl>
+  <dgm:styleLbl name="fgImgPlace1">
+    <dgm:scene3d>
+      <a:camera prst="orthographicFront"/>
+      <a:lightRig rig="threePt" dir="t"/>
+    </dgm:scene3d>
+    <dgm:sp3d/>
+    <dgm:txPr/>
+    <dgm:style>
+      <a:lnRef idx="2">
+        <a:scrgbClr r="0" g="0" b="0"/>
+      </a:lnRef>
+      <a:fillRef idx="1">
+        <a:scrgbClr r="0" g="0" b="0"/>
+      </a:fillRef>
+      <a:effectRef idx="0">
+        <a:scrgbClr r="0" g="0" b="0"/>
+      </a:effectRef>
+      <a:fontRef idx="minor"/>
+    </dgm:style>
+  </dgm:styleLbl>
+  <dgm:styleLbl name="alignImgPlace1">
+    <dgm:scene3d>
+      <a:camera prst="orthographicFront"/>
+      <a:lightRig rig="threePt" dir="t"/>
+    </dgm:scene3d>
+    <dgm:sp3d/>
+    <dgm:txPr/>
+    <dgm:style>
+      <a:lnRef idx="2">
+        <a:scrgbClr r="0" g="0" b="0"/>
+      </a:lnRef>
+      <a:fillRef idx="1">
+        <a:scrgbClr r="0" g="0" b="0"/>
+      </a:fillRef>
+      <a:effectRef idx="0">
+        <a:scrgbClr r="0" g="0" b="0"/>
+      </a:effectRef>
+      <a:fontRef idx="minor"/>
+    </dgm:style>
+  </dgm:styleLbl>
+  <dgm:styleLbl name="bgImgPlace1">
+    <dgm:scene3d>
+      <a:camera prst="orthographicFront"/>
+      <a:lightRig rig="threePt" dir="t"/>
+    </dgm:scene3d>
+    <dgm:sp3d/>
+    <dgm:txPr/>
+    <dgm:style>
+      <a:lnRef idx="2">
+        <a:scrgbClr r="0" g="0" b="0"/>
+      </a:lnRef>
+      <a:fillRef idx="1">
+        <a:scrgbClr r="0" g="0" b="0"/>
+      </a:fillRef>
+      <a:effectRef idx="0">
+        <a:scrgbClr r="0" g="0" b="0"/>
+      </a:effectRef>
+      <a:fontRef idx="minor"/>
+    </dgm:style>
+  </dgm:styleLbl>
+  <dgm:styleLbl name="sibTrans2D1">
+    <dgm:scene3d>
+      <a:camera prst="orthographicFront"/>
+      <a:lightRig rig="threePt" dir="t"/>
+    </dgm:scene3d>
+    <dgm:sp3d/>
+    <dgm:txPr/>
+    <dgm:style>
+      <a:lnRef idx="0">
+        <a:scrgbClr r="0" g="0" b="0"/>
+      </a:lnRef>
+      <a:fillRef idx="1">
+        <a:scrgbClr r="0" g="0" b="0"/>
+      </a:fillRef>
+      <a:effectRef idx="0">
+        <a:scrgbClr r="0" g="0" b="0"/>
+      </a:effectRef>
+      <a:fontRef idx="minor">
+        <a:schemeClr val="lt1"/>
+      </a:fontRef>
+    </dgm:style>
+  </dgm:styleLbl>
+  <dgm:styleLbl name="fgSibTrans2D1">
+    <dgm:scene3d>
+      <a:camera prst="orthographicFront"/>
+      <a:lightRig rig="threePt" dir="t"/>
+    </dgm:scene3d>
+    <dgm:sp3d/>
+    <dgm:txPr/>
+    <dgm:style>
+      <a:lnRef idx="0">
+        <a:scrgbClr r="0" g="0" b="0"/>
+      </a:lnRef>
+      <a:fillRef idx="1">
+        <a:scrgbClr r="0" g="0" b="0"/>
+      </a:fillRef>
+      <a:effectRef idx="0">
+        <a:scrgbClr r="0" g="0" b="0"/>
+      </a:effectRef>
+      <a:fontRef idx="minor">
+        <a:schemeClr val="lt1"/>
+      </a:fontRef>
+    </dgm:style>
+  </dgm:styleLbl>
+  <dgm:styleLbl name="bgSibTrans2D1">
+    <dgm:scene3d>
+      <a:camera prst="orthographicFront"/>
+      <a:lightRig rig="threePt" dir="t"/>
+    </dgm:scene3d>
+    <dgm:sp3d/>
+    <dgm:txPr/>
+    <dgm:style>
+      <a:lnRef idx="0">
+        <a:scrgbClr r="0" g="0" b="0"/>
+      </a:lnRef>
+      <a:fillRef idx="1">
+        <a:scrgbClr r="0" g="0" b="0"/>
+      </a:fillRef>
+      <a:effectRef idx="0">
+        <a:scrgbClr r="0" g="0" b="0"/>
+      </a:effectRef>
+      <a:fontRef idx="minor">
+        <a:schemeClr val="lt1"/>
+      </a:fontRef>
+    </dgm:style>
+  </dgm:styleLbl>
+  <dgm:styleLbl name="sibTrans1D1">
+    <dgm:scene3d>
+      <a:camera prst="orthographicFront"/>
+      <a:lightRig rig="threePt" dir="t"/>
+    </dgm:scene3d>
+    <dgm:sp3d/>
+    <dgm:txPr/>
+    <dgm:style>
+      <a:lnRef idx="1">
+        <a:scrgbClr r="0" g="0" b="0"/>
+      </a:lnRef>
+      <a:fillRef idx="0">
+        <a:scrgbClr r="0" g="0" b="0"/>
+      </a:fillRef>
+      <a:effectRef idx="0">
+        <a:scrgbClr r="0" g="0" b="0"/>
+      </a:effectRef>
+      <a:fontRef idx="minor"/>
+    </dgm:style>
+  </dgm:styleLbl>
+  <dgm:styleLbl name="callout">
+    <dgm:scene3d>
+      <a:camera prst="orthographicFront"/>
+      <a:lightRig rig="threePt" dir="t"/>
+    </dgm:scene3d>
+    <dgm:sp3d/>
+    <dgm:txPr/>
+    <dgm:style>
+      <a:lnRef idx="2">
+        <a:scrgbClr r="0" g="0" b="0"/>
+      </a:lnRef>
+      <a:fillRef idx="1">
+        <a:scrgbClr r="0" g="0" b="0"/>
+      </a:fillRef>
+      <a:effectRef idx="0">
+        <a:scrgbClr r="0" g="0" b="0"/>
+      </a:effectRef>
+      <a:fontRef idx="minor"/>
+    </dgm:style>
+  </dgm:styleLbl>
+  <dgm:styleLbl name="asst0">
+    <dgm:scene3d>
+      <a:camera prst="orthographicFront"/>
+      <a:lightRig rig="threePt" dir="t"/>
+    </dgm:scene3d>
+    <dgm:sp3d/>
+    <dgm:txPr/>
+    <dgm:style>
+      <a:lnRef idx="2">
+        <a:scrgbClr r="0" g="0" b="0"/>
+      </a:lnRef>
+      <a:fillRef idx="1">
+        <a:scrgbClr r="0" g="0" b="0"/>
+      </a:fillRef>
+      <a:effectRef idx="0">
+        <a:scrgbClr r="0" g="0" b="0"/>
+      </a:effectRef>
+      <a:fontRef idx="minor">
+        <a:schemeClr val="lt1"/>
+      </a:fontRef>
+    </dgm:style>
+  </dgm:styleLbl>
+  <dgm:styleLbl name="asst1">
+    <dgm:scene3d>
+      <a:camera prst="orthographicFront"/>
+      <a:lightRig rig="threePt" dir="t"/>
+    </dgm:scene3d>
+    <dgm:sp3d/>
+    <dgm:txPr/>
+    <dgm:style>
+      <a:lnRef idx="2">
+        <a:scrgbClr r="0" g="0" b="0"/>
+      </a:lnRef>
+      <a:fillRef idx="1">
+        <a:scrgbClr r="0" g="0" b="0"/>
+      </a:fillRef>
+      <a:effectRef idx="0">
+        <a:scrgbClr r="0" g="0" b="0"/>
+      </a:effectRef>
+      <a:fontRef idx="minor">
+        <a:schemeClr val="lt1"/>
+      </a:fontRef>
+    </dgm:style>
+  </dgm:styleLbl>
+  <dgm:styleLbl name="asst2">
+    <dgm:scene3d>
+      <a:camera prst="orthographicFront"/>
+      <a:lightRig rig="threePt" dir="t"/>
+    </dgm:scene3d>
+    <dgm:sp3d/>
+    <dgm:txPr/>
+    <dgm:style>
+      <a:lnRef idx="2">
+        <a:scrgbClr r="0" g="0" b="0"/>
+      </a:lnRef>
+      <a:fillRef idx="1">
+        <a:scrgbClr r="0" g="0" b="0"/>
+      </a:fillRef>
+      <a:effectRef idx="0">
+        <a:scrgbClr r="0" g="0" b="0"/>
+      </a:effectRef>
+      <a:fontRef idx="minor">
+        <a:schemeClr val="lt1"/>
+      </a:fontRef>
+    </dgm:style>
+  </dgm:styleLbl>
+  <dgm:styleLbl name="asst3">
+    <dgm:scene3d>
+      <a:camera prst="orthographicFront"/>
+      <a:lightRig rig="threePt" dir="t"/>
+    </dgm:scene3d>
+    <dgm:sp3d/>
+    <dgm:txPr/>
+    <dgm:style>
+      <a:lnRef idx="2">
+        <a:scrgbClr r="0" g="0" b="0"/>
+      </a:lnRef>
+      <a:fillRef idx="1">
+        <a:scrgbClr r="0" g="0" b="0"/>
+      </a:fillRef>
+      <a:effectRef idx="0">
+        <a:scrgbClr r="0" g="0" b="0"/>
+      </a:effectRef>
+      <a:fontRef idx="minor">
+        <a:schemeClr val="lt1"/>
+      </a:fontRef>
+    </dgm:style>
+  </dgm:styleLbl>
+  <dgm:styleLbl name="asst4">
+    <dgm:scene3d>
+      <a:camera prst="orthographicFront"/>
+      <a:lightRig rig="threePt" dir="t"/>
+    </dgm:scene3d>
+    <dgm:sp3d/>
+    <dgm:txPr/>
+    <dgm:style>
+      <a:lnRef idx="2">
+        <a:scrgbClr r="0" g="0" b="0"/>
+      </a:lnRef>
+      <a:fillRef idx="1">
+        <a:scrgbClr r="0" g="0" b="0"/>
+      </a:fillRef>
+      <a:effectRef idx="0">
+        <a:scrgbClr r="0" g="0" b="0"/>
+      </a:effectRef>
+      <a:fontRef idx="minor">
+        <a:schemeClr val="lt1"/>
+      </a:fontRef>
+    </dgm:style>
+  </dgm:styleLbl>
+  <dgm:styleLbl name="parChTrans2D1">
+    <dgm:scene3d>
+      <a:camera prst="orthographicFront"/>
+      <a:lightRig rig="threePt" dir="t"/>
+    </dgm:scene3d>
+    <dgm:sp3d/>
+    <dgm:txPr/>
+    <dgm:style>
+      <a:lnRef idx="2">
+        <a:scrgbClr r="0" g="0" b="0"/>
+      </a:lnRef>
+      <a:fillRef idx="1">
+        <a:scrgbClr r="0" g="0" b="0"/>
+      </a:fillRef>
+      <a:effectRef idx="0">
+        <a:scrgbClr r="0" g="0" b="0"/>
+      </a:effectRef>
+      <a:fontRef idx="minor">
+        <a:schemeClr val="lt1"/>
+      </a:fontRef>
+    </dgm:style>
+  </dgm:styleLbl>
+  <dgm:styleLbl name="parChTrans2D2">
+    <dgm:scene3d>
+      <a:camera prst="orthographicFront"/>
+      <a:lightRig rig="threePt" dir="t"/>
+    </dgm:scene3d>
+    <dgm:sp3d/>
+    <dgm:txPr/>
+    <dgm:style>
+      <a:lnRef idx="2">
+        <a:scrgbClr r="0" g="0" b="0"/>
+      </a:lnRef>
+      <a:fillRef idx="1">
+        <a:scrgbClr r="0" g="0" b="0"/>
+      </a:fillRef>
+      <a:effectRef idx="0">
+        <a:scrgbClr r="0" g="0" b="0"/>
+      </a:effectRef>
+      <a:fontRef idx="minor">
+        <a:schemeClr val="lt1"/>
+      </a:fontRef>
+    </dgm:style>
+  </dgm:styleLbl>
+  <dgm:styleLbl name="parChTrans2D3">
+    <dgm:scene3d>
+      <a:camera prst="orthographicFront"/>
+      <a:lightRig rig="threePt" dir="t"/>
+    </dgm:scene3d>
+    <dgm:sp3d/>
+    <dgm:txPr/>
+    <dgm:style>
+      <a:lnRef idx="2">
+        <a:scrgbClr r="0" g="0" b="0"/>
+      </a:lnRef>
+      <a:fillRef idx="1">
+        <a:scrgbClr r="0" g="0" b="0"/>
+      </a:fillRef>
+      <a:effectRef idx="0">
+        <a:scrgbClr r="0" g="0" b="0"/>
+      </a:effectRef>
+      <a:fontRef idx="minor">
+        <a:schemeClr val="lt1"/>
+      </a:fontRef>
+    </dgm:style>
+  </dgm:styleLbl>
+  <dgm:styleLbl name="parChTrans2D4">
+    <dgm:scene3d>
+      <a:camera prst="orthographicFront"/>
+      <a:lightRig rig="threePt" dir="t"/>
+    </dgm:scene3d>
+    <dgm:sp3d/>
+    <dgm:txPr/>
+    <dgm:style>
+      <a:lnRef idx="2">
+        <a:scrgbClr r="0" g="0" b="0"/>
+      </a:lnRef>
+      <a:fillRef idx="1">
+        <a:scrgbClr r="0" g="0" b="0"/>
+      </a:fillRef>
+      <a:effectRef idx="0">
+        <a:scrgbClr r="0" g="0" b="0"/>
+      </a:effectRef>
+      <a:fontRef idx="minor">
+        <a:schemeClr val="lt1"/>
+      </a:fontRef>
+    </dgm:style>
+  </dgm:styleLbl>
+  <dgm:styleLbl name="parChTrans1D1">
+    <dgm:scene3d>
+      <a:camera prst="orthographicFront"/>
+      <a:lightRig rig="threePt" dir="t"/>
+    </dgm:scene3d>
+    <dgm:sp3d/>
+    <dgm:txPr/>
+    <dgm:style>
+      <a:lnRef idx="2">
+        <a:scrgbClr r="0" g="0" b="0"/>
+      </a:lnRef>
+      <a:fillRef idx="0">
+        <a:scrgbClr r="0" g="0" b="0"/>
+      </a:fillRef>
+      <a:effectRef idx="0">
+        <a:scrgbClr r="0" g="0" b="0"/>
+      </a:effectRef>
+      <a:fontRef idx="minor"/>
+    </dgm:style>
+  </dgm:styleLbl>
+  <dgm:styleLbl name="parChTrans1D2">
+    <dgm:scene3d>
+      <a:camera prst="orthographicFront"/>
+      <a:lightRig rig="threePt" dir="t"/>
+    </dgm:scene3d>
+    <dgm:sp3d/>
+    <dgm:txPr/>
+    <dgm:style>
+      <a:lnRef idx="2">
+        <a:scrgbClr r="0" g="0" b="0"/>
+      </a:lnRef>
+      <a:fillRef idx="0">
+        <a:scrgbClr r="0" g="0" b="0"/>
+      </a:fillRef>
+      <a:effectRef idx="0">
+        <a:scrgbClr r="0" g="0" b="0"/>
+      </a:effectRef>
+      <a:fontRef idx="minor"/>
+    </dgm:style>
+  </dgm:styleLbl>
+  <dgm:styleLbl name="parChTrans1D3">
+    <dgm:scene3d>
+      <a:camera prst="orthographicFront"/>
+      <a:lightRig rig="threePt" dir="t"/>
+    </dgm:scene3d>
+    <dgm:sp3d/>
+    <dgm:txPr/>
+    <dgm:style>
+      <a:lnRef idx="2">
+        <a:scrgbClr r="0" g="0" b="0"/>
+      </a:lnRef>
+      <a:fillRef idx="0">
+        <a:scrgbClr r="0" g="0" b="0"/>
+      </a:fillRef>
+      <a:effectRef idx="0">
+        <a:scrgbClr r="0" g="0" b="0"/>
+      </a:effectRef>
+      <a:fontRef idx="minor"/>
+    </dgm:style>
+  </dgm:styleLbl>
+  <dgm:styleLbl name="parChTrans1D4">
+    <dgm:scene3d>
+      <a:camera prst="orthographicFront"/>
+      <a:lightRig rig="threePt" dir="t"/>
+    </dgm:scene3d>
+    <dgm:sp3d/>
+    <dgm:txPr/>
+    <dgm:style>
+      <a:lnRef idx="2">
+        <a:scrgbClr r="0" g="0" b="0"/>
+      </a:lnRef>
+      <a:fillRef idx="0">
+        <a:scrgbClr r="0" g="0" b="0"/>
+      </a:fillRef>
+      <a:effectRef idx="0">
+        <a:scrgbClr r="0" g="0" b="0"/>
+      </a:effectRef>
+      <a:fontRef idx="minor"/>
+    </dgm:style>
+  </dgm:styleLbl>
+  <dgm:styleLbl name="fgAcc1">
+    <dgm:scene3d>
+      <a:camera prst="orthographicFront"/>
+      <a:lightRig rig="threePt" dir="t"/>
+    </dgm:scene3d>
+    <dgm:sp3d/>
+    <dgm:txPr/>
+    <dgm:style>
+      <a:lnRef idx="2">
+        <a:scrgbClr r="0" g="0" b="0"/>
+      </a:lnRef>
+      <a:fillRef idx="1">
+        <a:scrgbClr r="0" g="0" b="0"/>
+      </a:fillRef>
+      <a:effectRef idx="0">
+        <a:scrgbClr r="0" g="0" b="0"/>
+      </a:effectRef>
+      <a:fontRef idx="minor"/>
+    </dgm:style>
+  </dgm:styleLbl>
+  <dgm:styleLbl name="conFgAcc1">
+    <dgm:scene3d>
+      <a:camera prst="orthographicFront"/>
+      <a:lightRig rig="threePt" dir="t"/>
+    </dgm:scene3d>
+    <dgm:sp3d/>
+    <dgm:txPr/>
+    <dgm:style>
+      <a:lnRef idx="2">
+        <a:scrgbClr r="0" g="0" b="0"/>
+      </a:lnRef>
+      <a:fillRef idx="1">
+        <a:scrgbClr r="0" g="0" b="0"/>
+      </a:fillRef>
+      <a:effectRef idx="0">
+        <a:scrgbClr r="0" g="0" b="0"/>
+      </a:effectRef>
+      <a:fontRef idx="minor"/>
+    </dgm:style>
+  </dgm:styleLbl>
+  <dgm:styleLbl name="alignAcc1">
+    <dgm:scene3d>
+      <a:camera prst="orthographicFront"/>
+      <a:lightRig rig="threePt" dir="t"/>
+    </dgm:scene3d>
+    <dgm:sp3d/>
+    <dgm:txPr/>
+    <dgm:style>
+      <a:lnRef idx="2">
+        <a:scrgbClr r="0" g="0" b="0"/>
+      </a:lnRef>
+      <a:fillRef idx="1">
+        <a:scrgbClr r="0" g="0" b="0"/>
+      </a:fillRef>
+      <a:effectRef idx="0">
+        <a:scrgbClr r="0" g="0" b="0"/>
+      </a:effectRef>
+      <a:fontRef idx="minor"/>
+    </dgm:style>
+  </dgm:styleLbl>
+  <dgm:styleLbl name="trAlignAcc1">
+    <dgm:scene3d>
+      <a:camera prst="orthographicFront"/>
+      <a:lightRig rig="threePt" dir="t"/>
+    </dgm:scene3d>
+    <dgm:sp3d/>
+    <dgm:txPr/>
+    <dgm:style>
+      <a:lnRef idx="1">
+        <a:scrgbClr r="0" g="0" b="0"/>
+      </a:lnRef>
+      <a:fillRef idx="1">
+        <a:scrgbClr r="0" g="0" b="0"/>
+      </a:fillRef>
+      <a:effectRef idx="0">
+        <a:scrgbClr r="0" g="0" b="0"/>
+      </a:effectRef>
+      <a:fontRef idx="minor"/>
+    </dgm:style>
+  </dgm:styleLbl>
+  <dgm:styleLbl name="bgAcc1">
+    <dgm:scene3d>
+      <a:camera prst="orthographicFront"/>
+      <a:lightRig rig="threePt" dir="t"/>
+    </dgm:scene3d>
+    <dgm:sp3d/>
+    <dgm:txPr/>
+    <dgm:style>
+      <a:lnRef idx="2">
+        <a:scrgbClr r="0" g="0" b="0"/>
+      </a:lnRef>
+      <a:fillRef idx="1">
+        <a:scrgbClr r="0" g="0" b="0"/>
+      </a:fillRef>
+      <a:effectRef idx="0">
+        <a:scrgbClr r="0" g="0" b="0"/>
+      </a:effectRef>
+      <a:fontRef idx="minor"/>
+    </dgm:style>
+  </dgm:styleLbl>
+  <dgm:styleLbl name="solidFgAcc1">
+    <dgm:scene3d>
+      <a:camera prst="orthographicFront"/>
+      <a:lightRig rig="threePt" dir="t"/>
+    </dgm:scene3d>
+    <dgm:sp3d/>
+    <dgm:txPr/>
+    <dgm:style>
+      <a:lnRef idx="2">
+        <a:scrgbClr r="0" g="0" b="0"/>
+      </a:lnRef>
+      <a:fillRef idx="1">
+        <a:scrgbClr r="0" g="0" b="0"/>
+      </a:fillRef>
+      <a:effectRef idx="0">
+        <a:scrgbClr r="0" g="0" b="0"/>
+      </a:effectRef>
+      <a:fontRef idx="minor"/>
+    </dgm:style>
+  </dgm:styleLbl>
+  <dgm:styleLbl name="solidAlignAcc1">
+    <dgm:scene3d>
+      <a:camera prst="orthographicFront"/>
+      <a:lightRig rig="threePt" dir="t"/>
+    </dgm:scene3d>
+    <dgm:sp3d/>
+    <dgm:txPr/>
+    <dgm:style>
+      <a:lnRef idx="2">
+        <a:scrgbClr r="0" g="0" b="0"/>
+      </a:lnRef>
+      <a:fillRef idx="1">
+        <a:scrgbClr r="0" g="0" b="0"/>
+      </a:fillRef>
+      <a:effectRef idx="0">
+        <a:scrgbClr r="0" g="0" b="0"/>
+      </a:effectRef>
+      <a:fontRef idx="minor"/>
+    </dgm:style>
+  </dgm:styleLbl>
+  <dgm:styleLbl name="solidBgAcc1">
+    <dgm:scene3d>
+      <a:camera prst="orthographicFront"/>
+      <a:lightRig rig="threePt" dir="t"/>
+    </dgm:scene3d>
+    <dgm:sp3d/>
+    <dgm:txPr/>
+    <dgm:style>
+      <a:lnRef idx="2">
+        <a:scrgbClr r="0" g="0" b="0"/>
+      </a:lnRef>
+      <a:fillRef idx="1">
+        <a:scrgbClr r="0" g="0" b="0"/>
+      </a:fillRef>
+      <a:effectRef idx="0">
+        <a:scrgbClr r="0" g="0" b="0"/>
+      </a:effectRef>
+      <a:fontRef idx="minor"/>
+    </dgm:style>
+  </dgm:styleLbl>
+  <dgm:styleLbl name="fgAccFollowNode1">
+    <dgm:scene3d>
+      <a:camera prst="orthographicFront"/>
+      <a:lightRig rig="threePt" dir="t"/>
+    </dgm:scene3d>
+    <dgm:sp3d/>
+    <dgm:txPr/>
+    <dgm:style>
+      <a:lnRef idx="2">
+        <a:scrgbClr r="0" g="0" b="0"/>
+      </a:lnRef>
+      <a:fillRef idx="1">
+        <a:scrgbClr r="0" g="0" b="0"/>
+      </a:fillRef>
+      <a:effectRef idx="0">
+        <a:scrgbClr r="0" g="0" b="0"/>
+      </a:effectRef>
+      <a:fontRef idx="minor"/>
+    </dgm:style>
+  </dgm:styleLbl>
+  <dgm:styleLbl name="alignAccFollowNode1">
+    <dgm:scene3d>
+      <a:camera prst="orthographicFront"/>
+      <a:lightRig rig="threePt" dir="t"/>
+    </dgm:scene3d>
+    <dgm:sp3d/>
+    <dgm:txPr/>
+    <dgm:style>
+      <a:lnRef idx="2">
+        <a:scrgbClr r="0" g="0" b="0"/>
+      </a:lnRef>
+      <a:fillRef idx="1">
+        <a:scrgbClr r="0" g="0" b="0"/>
+      </a:fillRef>
+      <a:effectRef idx="0">
+        <a:scrgbClr r="0" g="0" b="0"/>
+      </a:effectRef>
+      <a:fontRef idx="minor"/>
+    </dgm:style>
+  </dgm:styleLbl>
+  <dgm:styleLbl name="bgAccFollowNode1">
+    <dgm:scene3d>
+      <a:camera prst="orthographicFront"/>
+      <a:lightRig rig="threePt" dir="t"/>
+    </dgm:scene3d>
+    <dgm:sp3d/>
+    <dgm:txPr/>
+    <dgm:style>
+      <a:lnRef idx="2">
+        <a:scrgbClr r="0" g="0" b="0"/>
+      </a:lnRef>
+      <a:fillRef idx="1">
+        <a:scrgbClr r="0" g="0" b="0"/>
+      </a:fillRef>
+      <a:effectRef idx="0">
+        <a:scrgbClr r="0" g="0" b="0"/>
+      </a:effectRef>
+      <a:fontRef idx="minor"/>
+    </dgm:style>
+  </dgm:styleLbl>
+  <dgm:styleLbl name="fgAcc0">
+    <dgm:scene3d>
+      <a:camera prst="orthographicFront"/>
+      <a:lightRig rig="threePt" dir="t"/>
+    </dgm:scene3d>
+    <dgm:sp3d/>
+    <dgm:txPr/>
+    <dgm:style>
+      <a:lnRef idx="2">
+        <a:scrgbClr r="0" g="0" b="0"/>
+      </a:lnRef>
+      <a:fillRef idx="1">
+        <a:scrgbClr r="0" g="0" b="0"/>
+      </a:fillRef>
+      <a:effectRef idx="0">
+        <a:scrgbClr r="0" g="0" b="0"/>
+      </a:effectRef>
+      <a:fontRef idx="minor"/>
+    </dgm:style>
+  </dgm:styleLbl>
+  <dgm:styleLbl name="fgAcc2">
+    <dgm:scene3d>
+      <a:camera prst="orthographicFront"/>
+      <a:lightRig rig="threePt" dir="t"/>
+    </dgm:scene3d>
+    <dgm:sp3d/>
+    <dgm:txPr/>
+    <dgm:style>
+      <a:lnRef idx="2">
+        <a:scrgbClr r="0" g="0" b="0"/>
+      </a:lnRef>
+      <a:fillRef idx="1">
+        <a:scrgbClr r="0" g="0" b="0"/>
+      </a:fillRef>
+      <a:effectRef idx="0">
+        <a:scrgbClr r="0" g="0" b="0"/>
+      </a:effectRef>
+      <a:fontRef idx="minor"/>
+    </dgm:style>
+  </dgm:styleLbl>
+  <dgm:styleLbl name="fgAcc3">
+    <dgm:scene3d>
+      <a:camera prst="orthographicFront"/>
+      <a:lightRig rig="threePt" dir="t"/>
+    </dgm:scene3d>
+    <dgm:sp3d/>
+    <dgm:txPr/>
+    <dgm:style>
+      <a:lnRef idx="2">
+        <a:scrgbClr r="0" g="0" b="0"/>
+      </a:lnRef>
+      <a:fillRef idx="1">
+        <a:scrgbClr r="0" g="0" b="0"/>
+      </a:fillRef>
+      <a:effectRef idx="0">
+        <a:scrgbClr r="0" g="0" b="0"/>
+      </a:effectRef>
+      <a:fontRef idx="minor"/>
+    </dgm:style>
+  </dgm:styleLbl>
+  <dgm:styleLbl name="fgAcc4">
+    <dgm:scene3d>
+      <a:camera prst="orthographicFront"/>
+      <a:lightRig rig="threePt" dir="t"/>
+    </dgm:scene3d>
+    <dgm:sp3d/>
+    <dgm:txPr/>
+    <dgm:style>
+      <a:lnRef idx="2">
+        <a:scrgbClr r="0" g="0" b="0"/>
+      </a:lnRef>
+      <a:fillRef idx="1">
+        <a:scrgbClr r="0" g="0" b="0"/>
+      </a:fillRef>
+      <a:effectRef idx="0">
+        <a:scrgbClr r="0" g="0" b="0"/>
+      </a:effectRef>
+      <a:fontRef idx="minor"/>
+    </dgm:style>
+  </dgm:styleLbl>
+  <dgm:styleLbl name="bgShp">
+    <dgm:scene3d>
+      <a:camera prst="orthographicFront"/>
+      <a:lightRig rig="threePt" dir="t"/>
+    </dgm:scene3d>
+    <dgm:sp3d/>
+    <dgm:txPr/>
+    <dgm:style>
+      <a:lnRef idx="0">
+        <a:scrgbClr r="0" g="0" b="0"/>
+      </a:lnRef>
+      <a:fillRef idx="1">
+        <a:scrgbClr r="0" g="0" b="0"/>
+      </a:fillRef>
+      <a:effectRef idx="0">
+        <a:scrgbClr r="0" g="0" b="0"/>
+      </a:effectRef>
+      <a:fontRef idx="minor"/>
+    </dgm:style>
+  </dgm:styleLbl>
+  <dgm:styleLbl name="dkBgShp">
+    <dgm:scene3d>
+      <a:camera prst="orthographicFront"/>
+      <a:lightRig rig="threePt" dir="t"/>
+    </dgm:scene3d>
+    <dgm:sp3d/>
+    <dgm:txPr/>
+    <dgm:style>
+      <a:lnRef idx="0">
+        <a:scrgbClr r="0" g="0" b="0"/>
+      </a:lnRef>
+      <a:fillRef idx="1">
+        <a:scrgbClr r="0" g="0" b="0"/>
+      </a:fillRef>
+      <a:effectRef idx="0">
+        <a:scrgbClr r="0" g="0" b="0"/>
+      </a:effectRef>
+      <a:fontRef idx="minor"/>
+    </dgm:style>
+  </dgm:styleLbl>
+  <dgm:styleLbl name="trBgShp">
+    <dgm:scene3d>
+      <a:camera prst="orthographicFront"/>
+      <a:lightRig rig="threePt" dir="t"/>
+    </dgm:scene3d>
+    <dgm:sp3d/>
+    <dgm:txPr/>
+    <dgm:style>
+      <a:lnRef idx="0">
+        <a:scrgbClr r="0" g="0" b="0"/>
+      </a:lnRef>
+      <a:fillRef idx="1">
+        <a:scrgbClr r="0" g="0" b="0"/>
+      </a:fillRef>
+      <a:effectRef idx="0">
+        <a:scrgbClr r="0" g="0" b="0"/>
+      </a:effectRef>
+      <a:fontRef idx="minor"/>
+    </dgm:style>
+  </dgm:styleLbl>
+  <dgm:styleLbl name="fgShp">
+    <dgm:scene3d>
+      <a:camera prst="orthographicFront"/>
+      <a:lightRig rig="threePt" dir="t"/>
+    </dgm:scene3d>
+    <dgm:sp3d/>
+    <dgm:txPr/>
+    <dgm:style>
+      <a:lnRef idx="2">
+        <a:scrgbClr r="0" g="0" b="0"/>
+      </a:lnRef>
+      <a:fillRef idx="1">
+        <a:scrgbClr r="0" g="0" b="0"/>
+      </a:fillRef>
+      <a:effectRef idx="0">
         <a:scrgbClr r="0" g="0" b="0"/>
       </a:effectRef>
       <a:fontRef idx="minor"/>
@@ -4282,7 +7283,7 @@
           <a:p>
             <a:fld id="{15645B76-FD1E-4095-8D27-058AA1C0D806}" type="datetimeFigureOut">
               <a:rPr lang="en-US" smtClean="0"/>
-              <a:t>9/5/2018</a:t>
+              <a:t>9/6/2018</a:t>
             </a:fld>
             <a:endParaRPr lang="en-US"/>
           </a:p>
@@ -4480,7 +7481,7 @@
           <a:p>
             <a:fld id="{15645B76-FD1E-4095-8D27-058AA1C0D806}" type="datetimeFigureOut">
               <a:rPr lang="en-US" smtClean="0"/>
-              <a:t>9/5/2018</a:t>
+              <a:t>9/6/2018</a:t>
             </a:fld>
             <a:endParaRPr lang="en-US"/>
           </a:p>
@@ -4688,7 +7689,7 @@
           <a:p>
             <a:fld id="{15645B76-FD1E-4095-8D27-058AA1C0D806}" type="datetimeFigureOut">
               <a:rPr lang="en-US" smtClean="0"/>
-              <a:t>9/5/2018</a:t>
+              <a:t>9/6/2018</a:t>
             </a:fld>
             <a:endParaRPr lang="en-US"/>
           </a:p>
@@ -4886,7 +7887,7 @@
           <a:p>
             <a:fld id="{15645B76-FD1E-4095-8D27-058AA1C0D806}" type="datetimeFigureOut">
               <a:rPr lang="en-US" smtClean="0"/>
-              <a:t>9/5/2018</a:t>
+              <a:t>9/6/2018</a:t>
             </a:fld>
             <a:endParaRPr lang="en-US"/>
           </a:p>
@@ -5161,7 +8162,7 @@
           <a:p>
             <a:fld id="{15645B76-FD1E-4095-8D27-058AA1C0D806}" type="datetimeFigureOut">
               <a:rPr lang="en-US" smtClean="0"/>
-              <a:t>9/5/2018</a:t>
+              <a:t>9/6/2018</a:t>
             </a:fld>
             <a:endParaRPr lang="en-US"/>
           </a:p>
@@ -5426,7 +8427,7 @@
           <a:p>
             <a:fld id="{15645B76-FD1E-4095-8D27-058AA1C0D806}" type="datetimeFigureOut">
               <a:rPr lang="en-US" smtClean="0"/>
-              <a:t>9/5/2018</a:t>
+              <a:t>9/6/2018</a:t>
             </a:fld>
             <a:endParaRPr lang="en-US"/>
           </a:p>
@@ -5838,7 +8839,7 @@
           <a:p>
             <a:fld id="{15645B76-FD1E-4095-8D27-058AA1C0D806}" type="datetimeFigureOut">
               <a:rPr lang="en-US" smtClean="0"/>
-              <a:t>9/5/2018</a:t>
+              <a:t>9/6/2018</a:t>
             </a:fld>
             <a:endParaRPr lang="en-US"/>
           </a:p>
@@ -5979,7 +8980,7 @@
           <a:p>
             <a:fld id="{15645B76-FD1E-4095-8D27-058AA1C0D806}" type="datetimeFigureOut">
               <a:rPr lang="en-US" smtClean="0"/>
-              <a:t>9/5/2018</a:t>
+              <a:t>9/6/2018</a:t>
             </a:fld>
             <a:endParaRPr lang="en-US"/>
           </a:p>
@@ -6092,7 +9093,7 @@
           <a:p>
             <a:fld id="{15645B76-FD1E-4095-8D27-058AA1C0D806}" type="datetimeFigureOut">
               <a:rPr lang="en-US" smtClean="0"/>
-              <a:t>9/5/2018</a:t>
+              <a:t>9/6/2018</a:t>
             </a:fld>
             <a:endParaRPr lang="en-US"/>
           </a:p>
@@ -6403,7 +9404,7 @@
           <a:p>
             <a:fld id="{15645B76-FD1E-4095-8D27-058AA1C0D806}" type="datetimeFigureOut">
               <a:rPr lang="en-US" smtClean="0"/>
-              <a:t>9/5/2018</a:t>
+              <a:t>9/6/2018</a:t>
             </a:fld>
             <a:endParaRPr lang="en-US"/>
           </a:p>
@@ -6691,7 +9692,7 @@
           <a:p>
             <a:fld id="{15645B76-FD1E-4095-8D27-058AA1C0D806}" type="datetimeFigureOut">
               <a:rPr lang="en-US" smtClean="0"/>
-              <a:t>9/5/2018</a:t>
+              <a:t>9/6/2018</a:t>
             </a:fld>
             <a:endParaRPr lang="en-US"/>
           </a:p>
@@ -6932,7 +9933,7 @@
           <a:p>
             <a:fld id="{15645B76-FD1E-4095-8D27-058AA1C0D806}" type="datetimeFigureOut">
               <a:rPr lang="en-US" smtClean="0"/>
-              <a:t>9/5/2018</a:t>
+              <a:t>9/6/2018</a:t>
             </a:fld>
             <a:endParaRPr lang="en-US"/>
           </a:p>
@@ -7335,6 +10336,14 @@
 <file path=ppt/slides/slide1.xml><?xml version="1.0" encoding="utf-8"?>
 <p:sld xmlns:a="http://schemas.openxmlformats.org/drawingml/2006/main" xmlns:r="http://schemas.openxmlformats.org/officeDocument/2006/relationships" xmlns:p="http://schemas.openxmlformats.org/presentationml/2006/main">
   <p:cSld>
+    <p:bg>
+      <p:bgPr>
+        <a:solidFill>
+          <a:schemeClr val="bg1"/>
+        </a:solidFill>
+        <a:effectLst/>
+      </p:bgPr>
+    </p:bg>
     <p:spTree>
       <p:nvGrpSpPr>
         <p:cNvPr id="1" name=""/>
@@ -7351,6 +10360,180 @@
       </p:grpSpPr>
       <p:sp>
         <p:nvSpPr>
+          <p:cNvPr id="8" name="Rectangle 7">
+            <a:extLst>
+              <a:ext uri="{FF2B5EF4-FFF2-40B4-BE49-F238E27FC236}">
+                <a16:creationId xmlns:a16="http://schemas.microsoft.com/office/drawing/2014/main" id="{86197D16-FE75-4A0E-A0C9-28C0F04A43DF}"/>
+              </a:ext>
+              <a:ext uri="{C183D7F6-B498-43B3-948B-1728B52AA6E4}">
+                <adec:decorative xmlns:adec="http://schemas.microsoft.com/office/drawing/2017/decorative" val="1"/>
+              </a:ext>
+            </a:extLst>
+          </p:cNvPr>
+          <p:cNvSpPr>
+            <a:spLocks noGrp="1" noRot="1" noChangeAspect="1" noMove="1" noResize="1" noEditPoints="1" noAdjustHandles="1" noChangeArrowheads="1" noChangeShapeType="1" noTextEdit="1"/>
+          </p:cNvSpPr>
+          <p:nvPr>
+            <p:extLst>
+              <p:ext uri="{386F3935-93C4-4BCD-93E2-E3B085C9AB24}">
+                <p16:designElem xmlns:p16="http://schemas.microsoft.com/office/powerpoint/2015/main" val="1"/>
+              </p:ext>
+            </p:extLst>
+          </p:nvPr>
+        </p:nvSpPr>
+        <p:spPr>
+          <a:xfrm>
+            <a:off x="0" y="0"/>
+            <a:ext cx="12192000" cy="5570220"/>
+          </a:xfrm>
+          <a:prstGeom prst="rect">
+            <a:avLst/>
+          </a:prstGeom>
+          <a:gradFill>
+            <a:gsLst>
+              <a:gs pos="0">
+                <a:schemeClr val="accent1">
+                  <a:lumMod val="90000"/>
+                </a:schemeClr>
+              </a:gs>
+              <a:gs pos="25000">
+                <a:schemeClr val="accent1">
+                  <a:lumMod val="90000"/>
+                </a:schemeClr>
+              </a:gs>
+              <a:gs pos="94000">
+                <a:schemeClr val="bg2">
+                  <a:lumMod val="25000"/>
+                </a:schemeClr>
+              </a:gs>
+              <a:gs pos="100000">
+                <a:schemeClr val="bg2">
+                  <a:lumMod val="25000"/>
+                </a:schemeClr>
+              </a:gs>
+            </a:gsLst>
+            <a:lin ang="4200000" scaled="0"/>
+          </a:gradFill>
+          <a:ln>
+            <a:noFill/>
+          </a:ln>
+        </p:spPr>
+        <p:style>
+          <a:lnRef idx="2">
+            <a:schemeClr val="accent1">
+              <a:shade val="50000"/>
+            </a:schemeClr>
+          </a:lnRef>
+          <a:fillRef idx="1">
+            <a:schemeClr val="accent1"/>
+          </a:fillRef>
+          <a:effectRef idx="0">
+            <a:schemeClr val="accent1"/>
+          </a:effectRef>
+          <a:fontRef idx="minor">
+            <a:schemeClr val="lt1"/>
+          </a:fontRef>
+        </p:style>
+        <p:txBody>
+          <a:bodyPr rtlCol="0" anchor="ctr"/>
+          <a:lstStyle/>
+          <a:p>
+            <a:pPr algn="ctr"/>
+            <a:endParaRPr lang="en-US"/>
+          </a:p>
+        </p:txBody>
+      </p:sp>
+      <p:pic>
+        <p:nvPicPr>
+          <p:cNvPr id="10" name="Picture 9">
+            <a:extLst>
+              <a:ext uri="{FF2B5EF4-FFF2-40B4-BE49-F238E27FC236}">
+                <a16:creationId xmlns:a16="http://schemas.microsoft.com/office/drawing/2014/main" id="{FA8FCEC6-4B30-4FF2-8B32-504BEAEA3A16}"/>
+              </a:ext>
+              <a:ext uri="{C183D7F6-B498-43B3-948B-1728B52AA6E4}">
+                <adec:decorative xmlns:adec="http://schemas.microsoft.com/office/drawing/2017/decorative" val="1"/>
+              </a:ext>
+            </a:extLst>
+          </p:cNvPr>
+          <p:cNvPicPr>
+            <a:picLocks noGrp="1" noRot="1" noChangeAspect="1" noMove="1" noResize="1" noEditPoints="1" noAdjustHandles="1" noChangeArrowheads="1" noChangeShapeType="1" noCrop="1"/>
+          </p:cNvPicPr>
+          <p:nvPr>
+            <p:extLst>
+              <p:ext uri="{386F3935-93C4-4BCD-93E2-E3B085C9AB24}">
+                <p16:designElem xmlns:p16="http://schemas.microsoft.com/office/powerpoint/2015/main" val="1"/>
+              </p:ext>
+            </p:extLst>
+          </p:nvPr>
+        </p:nvPicPr>
+        <p:blipFill>
+          <a:blip r:embed="rId2">
+            <a:extLst>
+              <a:ext uri="{28A0092B-C50C-407E-A947-70E740481C1C}">
+                <a14:useLocalDpi xmlns:a14="http://schemas.microsoft.com/office/drawing/2010/main" val="0"/>
+              </a:ext>
+            </a:extLst>
+          </a:blip>
+          <a:srcRect t="45716" b="9820"/>
+          <a:stretch>
+            <a:fillRect/>
+          </a:stretch>
+        </p:blipFill>
+        <p:spPr>
+          <a:xfrm>
+            <a:off x="0" y="3808676"/>
+            <a:ext cx="12192000" cy="3049325"/>
+          </a:xfrm>
+          <a:custGeom>
+            <a:avLst/>
+            <a:gdLst>
+              <a:gd name="connsiteX0" fmla="*/ 0 w 12192000"/>
+              <a:gd name="connsiteY0" fmla="*/ 0 h 3049325"/>
+              <a:gd name="connsiteX1" fmla="*/ 12192000 w 12192000"/>
+              <a:gd name="connsiteY1" fmla="*/ 0 h 3049325"/>
+              <a:gd name="connsiteX2" fmla="*/ 12192000 w 12192000"/>
+              <a:gd name="connsiteY2" fmla="*/ 3049325 h 3049325"/>
+              <a:gd name="connsiteX3" fmla="*/ 0 w 12192000"/>
+              <a:gd name="connsiteY3" fmla="*/ 3049325 h 3049325"/>
+            </a:gdLst>
+            <a:ahLst/>
+            <a:cxnLst>
+              <a:cxn ang="0">
+                <a:pos x="connsiteX0" y="connsiteY0"/>
+              </a:cxn>
+              <a:cxn ang="0">
+                <a:pos x="connsiteX1" y="connsiteY1"/>
+              </a:cxn>
+              <a:cxn ang="0">
+                <a:pos x="connsiteX2" y="connsiteY2"/>
+              </a:cxn>
+              <a:cxn ang="0">
+                <a:pos x="connsiteX3" y="connsiteY3"/>
+              </a:cxn>
+            </a:cxnLst>
+            <a:rect l="l" t="t" r="r" b="b"/>
+            <a:pathLst>
+              <a:path w="12192000" h="3049325">
+                <a:moveTo>
+                  <a:pt x="0" y="0"/>
+                </a:moveTo>
+                <a:lnTo>
+                  <a:pt x="12192000" y="0"/>
+                </a:lnTo>
+                <a:lnTo>
+                  <a:pt x="12192000" y="3049325"/>
+                </a:lnTo>
+                <a:lnTo>
+                  <a:pt x="0" y="3049325"/>
+                </a:lnTo>
+                <a:close/>
+              </a:path>
+            </a:pathLst>
+          </a:custGeom>
+        </p:spPr>
+      </p:pic>
+      <p:sp>
+        <p:nvSpPr>
           <p:cNvPr id="2" name="Title 1">
             <a:extLst>
               <a:ext uri="{FF2B5EF4-FFF2-40B4-BE49-F238E27FC236}">
@@ -7365,13 +10548,25 @@
             <p:ph type="ctrTitle"/>
           </p:nvPr>
         </p:nvSpPr>
-        <p:spPr/>
+        <p:spPr>
+          <a:xfrm>
+            <a:off x="804484" y="1191796"/>
+            <a:ext cx="10021446" cy="2976344"/>
+          </a:xfrm>
+        </p:spPr>
         <p:txBody>
-          <a:bodyPr/>
+          <a:bodyPr anchor="ctr">
+            <a:normAutofit/>
+          </a:bodyPr>
           <a:lstStyle/>
           <a:p>
+            <a:pPr algn="l"/>
             <a:r>
-              <a:rPr lang="en-US" dirty="0"/>
+              <a:rPr lang="en-US" sz="6600" dirty="0">
+                <a:solidFill>
+                  <a:srgbClr val="FFFFFF"/>
+                </a:solidFill>
+              </a:rPr>
               <a:t>GeoCDB Statistics</a:t>
             </a:r>
           </a:p>
@@ -7393,12 +10588,27 @@
             <p:ph type="subTitle" idx="1"/>
           </p:nvPr>
         </p:nvSpPr>
-        <p:spPr/>
+        <p:spPr>
+          <a:xfrm>
+            <a:off x="804788" y="5318990"/>
+            <a:ext cx="9416898" cy="723670"/>
+          </a:xfrm>
+        </p:spPr>
         <p:txBody>
-          <a:bodyPr/>
+          <a:bodyPr anchor="t">
+            <a:normAutofit/>
+          </a:bodyPr>
           <a:lstStyle/>
           <a:p>
-            <a:endParaRPr lang="en-US"/>
+            <a:pPr algn="l"/>
+            <a:r>
+              <a:rPr lang="en-US" i="1" dirty="0">
+                <a:solidFill>
+                  <a:srgbClr val="000000"/>
+                </a:solidFill>
+              </a:rPr>
+              <a:t>Analysis on Proposed Options on a Large CDB Dataset</a:t>
+            </a:r>
           </a:p>
         </p:txBody>
       </p:sp>
@@ -7714,69 +10924,6 @@
       </p:grpSpPr>
       <p:sp>
         <p:nvSpPr>
-          <p:cNvPr id="9" name="Rectangle 8">
-            <a:extLst>
-              <a:ext uri="{FF2B5EF4-FFF2-40B4-BE49-F238E27FC236}">
-                <a16:creationId xmlns:a16="http://schemas.microsoft.com/office/drawing/2014/main" id="{A4AC5506-6312-4701-8D3C-40187889A947}"/>
-              </a:ext>
-              <a:ext uri="{C183D7F6-B498-43B3-948B-1728B52AA6E4}">
-                <adec:decorative xmlns:adec="http://schemas.microsoft.com/office/drawing/2017/decorative" val="1"/>
-              </a:ext>
-            </a:extLst>
-          </p:cNvPr>
-          <p:cNvSpPr>
-            <a:spLocks noGrp="1" noRot="1" noChangeAspect="1" noMove="1" noResize="1" noEditPoints="1" noAdjustHandles="1" noChangeArrowheads="1" noChangeShapeType="1" noTextEdit="1"/>
-          </p:cNvSpPr>
-          <p:nvPr>
-            <p:extLst>
-              <p:ext uri="{386F3935-93C4-4BCD-93E2-E3B085C9AB24}">
-                <p16:designElem xmlns:p16="http://schemas.microsoft.com/office/powerpoint/2015/main" val="1"/>
-              </p:ext>
-            </p:extLst>
-          </p:nvPr>
-        </p:nvSpPr>
-        <p:spPr>
-          <a:xfrm>
-            <a:off x="0" y="5330432"/>
-            <a:ext cx="12192000" cy="736551"/>
-          </a:xfrm>
-          <a:prstGeom prst="rect">
-            <a:avLst/>
-          </a:prstGeom>
-          <a:solidFill>
-            <a:schemeClr val="tx1"/>
-          </a:solidFill>
-          <a:ln>
-            <a:noFill/>
-          </a:ln>
-        </p:spPr>
-        <p:style>
-          <a:lnRef idx="2">
-            <a:schemeClr val="accent1">
-              <a:shade val="50000"/>
-            </a:schemeClr>
-          </a:lnRef>
-          <a:fillRef idx="1">
-            <a:schemeClr val="accent1"/>
-          </a:fillRef>
-          <a:effectRef idx="0">
-            <a:schemeClr val="accent1"/>
-          </a:effectRef>
-          <a:fontRef idx="minor">
-            <a:schemeClr val="lt1"/>
-          </a:fontRef>
-        </p:style>
-        <p:txBody>
-          <a:bodyPr rtlCol="0" anchor="ctr"/>
-          <a:lstStyle/>
-          <a:p>
-            <a:pPr algn="ctr"/>
-            <a:endParaRPr lang="en-US"/>
-          </a:p>
-        </p:txBody>
-      </p:sp>
-      <p:sp>
-        <p:nvSpPr>
           <p:cNvPr id="2" name="Title 1">
             <a:extLst>
               <a:ext uri="{FF2B5EF4-FFF2-40B4-BE49-F238E27FC236}">
@@ -7791,12 +10938,7 @@
             <p:ph type="title"/>
           </p:nvPr>
         </p:nvSpPr>
-        <p:spPr>
-          <a:xfrm>
-            <a:off x="556532" y="5322147"/>
-            <a:ext cx="11210925" cy="744836"/>
-          </a:xfrm>
-        </p:spPr>
+        <p:spPr/>
         <p:txBody>
           <a:bodyPr vert="horz" lIns="91440" tIns="45720" rIns="91440" bIns="45720" rtlCol="0" anchor="ctr">
             <a:normAutofit/>
@@ -7834,14 +10976,14 @@
             <p:ph idx="1"/>
             <p:extLst>
               <p:ext uri="{D42A27DB-BD31-4B8C-83A1-F6EECF244321}">
-                <p14:modId xmlns:p14="http://schemas.microsoft.com/office/powerpoint/2010/main" val="75365886"/>
+                <p14:modId xmlns:p14="http://schemas.microsoft.com/office/powerpoint/2010/main" val="1202365910"/>
               </p:ext>
             </p:extLst>
           </p:nvPr>
         </p:nvGraphicFramePr>
         <p:xfrm>
-          <a:off x="1502092" y="707169"/>
-          <a:ext cx="9187815" cy="3709035"/>
+          <a:off x="5180437" y="2057400"/>
+          <a:ext cx="6171775" cy="3709035"/>
         </p:xfrm>
         <a:graphic>
           <a:graphicData uri="http://schemas.openxmlformats.org/drawingml/2006/table">
@@ -7850,21 +10992,21 @@
                 <a:tableStyleId>{5C22544A-7EE6-4342-B048-85BDC9FD1C3A}</a:tableStyleId>
               </a:tblPr>
               <a:tblGrid>
-                <a:gridCol w="1834515">
+                <a:gridCol w="1779674">
                   <a:extLst>
                     <a:ext uri="{9D8B030D-6E8A-4147-A177-3AD203B41FA5}">
                       <a16:colId xmlns:a16="http://schemas.microsoft.com/office/drawing/2014/main" val="2804451495"/>
                     </a:ext>
                   </a:extLst>
                 </a:gridCol>
-                <a:gridCol w="2857500">
+                <a:gridCol w="2181138">
                   <a:extLst>
                     <a:ext uri="{9D8B030D-6E8A-4147-A177-3AD203B41FA5}">
                       <a16:colId xmlns:a16="http://schemas.microsoft.com/office/drawing/2014/main" val="1842142206"/>
                     </a:ext>
                   </a:extLst>
                 </a:gridCol>
-                <a:gridCol w="4495800">
+                <a:gridCol w="2210963">
                   <a:extLst>
                     <a:ext uri="{9D8B030D-6E8A-4147-A177-3AD203B41FA5}">
                       <a16:colId xmlns:a16="http://schemas.microsoft.com/office/drawing/2014/main" val="4275450323"/>
@@ -7880,12 +11022,12 @@
                     <a:p>
                       <a:pPr algn="l" fontAlgn="b"/>
                       <a:r>
-                        <a:rPr lang="en-US" sz="3300" u="none" strike="noStrike">
+                        <a:rPr lang="en-US" sz="3300" u="none" strike="noStrike" dirty="0">
                           <a:effectLst/>
                         </a:rPr>
                         <a:t> </a:t>
                       </a:r>
-                      <a:endParaRPr lang="en-US" sz="3300" b="0" i="0" u="none" strike="noStrike">
+                      <a:endParaRPr lang="en-US" sz="3300" b="0" i="0" u="none" strike="noStrike" dirty="0">
                         <a:solidFill>
                           <a:srgbClr val="000000"/>
                         </a:solidFill>
@@ -7894,7 +11036,7 @@
                       </a:endParaRPr>
                     </a:p>
                   </a:txBody>
-                  <a:tcPr marL="28575" marR="28575" marT="28575" marB="0" anchor="b"/>
+                  <a:tcPr marL="19195" marR="19195" marT="28575" marB="0" anchor="b"/>
                 </a:tc>
                 <a:tc>
                   <a:txBody>
@@ -7903,12 +11045,12 @@
                     <a:p>
                       <a:pPr algn="l" fontAlgn="b"/>
                       <a:r>
-                        <a:rPr lang="en-US" sz="3300" u="none" strike="noStrike">
+                        <a:rPr lang="en-US" sz="3300" u="none" strike="noStrike" dirty="0">
                           <a:effectLst/>
                         </a:rPr>
                         <a:t>File Count Reduction</a:t>
                       </a:r>
-                      <a:endParaRPr lang="en-US" sz="3300" b="1" i="0" u="none" strike="noStrike">
+                      <a:endParaRPr lang="en-US" sz="3300" b="1" i="0" u="none" strike="noStrike" dirty="0">
                         <a:solidFill>
                           <a:srgbClr val="000000"/>
                         </a:solidFill>
@@ -7917,7 +11059,7 @@
                       </a:endParaRPr>
                     </a:p>
                   </a:txBody>
-                  <a:tcPr marL="28575" marR="28575" marT="28575" marB="0" anchor="b"/>
+                  <a:tcPr marL="19195" marR="19195" marT="28575" marB="0" anchor="b"/>
                 </a:tc>
                 <a:tc>
                   <a:txBody>
@@ -7940,7 +11082,7 @@
                       </a:endParaRPr>
                     </a:p>
                   </a:txBody>
-                  <a:tcPr marL="28575" marR="28575" marT="28575" marB="0" anchor="b"/>
+                  <a:tcPr marL="19195" marR="19195" marT="28575" marB="0" anchor="b"/>
                 </a:tc>
                 <a:extLst>
                   <a:ext uri="{0D108BD9-81ED-4DB2-BD59-A6C34878D82A}">
@@ -7970,7 +11112,7 @@
                       </a:endParaRPr>
                     </a:p>
                   </a:txBody>
-                  <a:tcPr marL="28575" marR="28575" marT="28575" marB="0" anchor="b"/>
+                  <a:tcPr marL="19195" marR="19195" marT="28575" marB="0" anchor="b"/>
                 </a:tc>
                 <a:tc>
                   <a:txBody>
@@ -7993,7 +11135,7 @@
                       </a:endParaRPr>
                     </a:p>
                   </a:txBody>
-                  <a:tcPr marL="28575" marR="28575" marT="28575" marB="0" anchor="b"/>
+                  <a:tcPr marL="19195" marR="19195" marT="28575" marB="0" anchor="b"/>
                 </a:tc>
                 <a:tc>
                   <a:txBody>
@@ -8016,7 +11158,7 @@
                       </a:endParaRPr>
                     </a:p>
                   </a:txBody>
-                  <a:tcPr marL="28575" marR="28575" marT="28575" marB="0" anchor="b"/>
+                  <a:tcPr marL="19195" marR="19195" marT="28575" marB="0" anchor="b"/>
                 </a:tc>
                 <a:extLst>
                   <a:ext uri="{0D108BD9-81ED-4DB2-BD59-A6C34878D82A}">
@@ -8046,7 +11188,7 @@
                       </a:endParaRPr>
                     </a:p>
                   </a:txBody>
-                  <a:tcPr marL="28575" marR="28575" marT="28575" marB="0" anchor="b"/>
+                  <a:tcPr marL="19195" marR="19195" marT="28575" marB="0" anchor="b"/>
                 </a:tc>
                 <a:tc>
                   <a:txBody>
@@ -8069,7 +11211,7 @@
                       </a:endParaRPr>
                     </a:p>
                   </a:txBody>
-                  <a:tcPr marL="28575" marR="28575" marT="28575" marB="0" anchor="b"/>
+                  <a:tcPr marL="19195" marR="19195" marT="28575" marB="0" anchor="b"/>
                 </a:tc>
                 <a:tc>
                   <a:txBody>
@@ -8092,7 +11234,7 @@
                       </a:endParaRPr>
                     </a:p>
                   </a:txBody>
-                  <a:tcPr marL="28575" marR="28575" marT="28575" marB="0" anchor="b"/>
+                  <a:tcPr marL="19195" marR="19195" marT="28575" marB="0" anchor="b"/>
                 </a:tc>
                 <a:extLst>
                   <a:ext uri="{0D108BD9-81ED-4DB2-BD59-A6C34878D82A}">
@@ -8122,7 +11264,7 @@
                       </a:endParaRPr>
                     </a:p>
                   </a:txBody>
-                  <a:tcPr marL="28575" marR="28575" marT="28575" marB="0" anchor="b"/>
+                  <a:tcPr marL="19195" marR="19195" marT="28575" marB="0" anchor="b"/>
                 </a:tc>
                 <a:tc>
                   <a:txBody>
@@ -8145,7 +11287,7 @@
                       </a:endParaRPr>
                     </a:p>
                   </a:txBody>
-                  <a:tcPr marL="28575" marR="28575" marT="28575" marB="0" anchor="b"/>
+                  <a:tcPr marL="19195" marR="19195" marT="28575" marB="0" anchor="b"/>
                 </a:tc>
                 <a:tc>
                   <a:txBody>
@@ -8168,7 +11310,7 @@
                       </a:endParaRPr>
                     </a:p>
                   </a:txBody>
-                  <a:tcPr marL="28575" marR="28575" marT="28575" marB="0" anchor="b"/>
+                  <a:tcPr marL="19195" marR="19195" marT="28575" marB="0" anchor="b"/>
                 </a:tc>
                 <a:extLst>
                   <a:ext uri="{0D108BD9-81ED-4DB2-BD59-A6C34878D82A}">
@@ -8198,7 +11340,7 @@
                       </a:endParaRPr>
                     </a:p>
                   </a:txBody>
-                  <a:tcPr marL="28575" marR="28575" marT="28575" marB="0" anchor="b"/>
+                  <a:tcPr marL="19195" marR="19195" marT="28575" marB="0" anchor="b"/>
                 </a:tc>
                 <a:tc>
                   <a:txBody>
@@ -8221,7 +11363,7 @@
                       </a:endParaRPr>
                     </a:p>
                   </a:txBody>
-                  <a:tcPr marL="28575" marR="28575" marT="28575" marB="0" anchor="b"/>
+                  <a:tcPr marL="19195" marR="19195" marT="28575" marB="0" anchor="b"/>
                 </a:tc>
                 <a:tc>
                   <a:txBody>
@@ -8244,7 +11386,7 @@
                       </a:endParaRPr>
                     </a:p>
                   </a:txBody>
-                  <a:tcPr marL="28575" marR="28575" marT="28575" marB="0" anchor="b"/>
+                  <a:tcPr marL="19195" marR="19195" marT="28575" marB="0" anchor="b"/>
                 </a:tc>
                 <a:extLst>
                   <a:ext uri="{0D108BD9-81ED-4DB2-BD59-A6C34878D82A}">
@@ -8256,6 +11398,120 @@
           </a:graphicData>
         </a:graphic>
       </p:graphicFrame>
+      <p:sp>
+        <p:nvSpPr>
+          <p:cNvPr id="5" name="Text Placeholder 4">
+            <a:extLst>
+              <a:ext uri="{FF2B5EF4-FFF2-40B4-BE49-F238E27FC236}">
+                <a16:creationId xmlns:a16="http://schemas.microsoft.com/office/drawing/2014/main" id="{F23DDA5D-B8F2-4790-9C7E-082CC0032E10}"/>
+              </a:ext>
+            </a:extLst>
+          </p:cNvPr>
+          <p:cNvSpPr>
+            <a:spLocks noGrp="1"/>
+          </p:cNvSpPr>
+          <p:nvPr>
+            <p:ph type="body" sz="half" idx="2"/>
+          </p:nvPr>
+        </p:nvSpPr>
+        <p:spPr/>
+        <p:txBody>
+          <a:bodyPr anchor="ctr">
+            <a:normAutofit lnSpcReduction="10000"/>
+          </a:bodyPr>
+          <a:lstStyle/>
+          <a:p>
+            <a:pPr marL="285750" indent="-285750">
+              <a:buFont typeface="Arial" panose="020B0604020202020204" pitchFamily="34" charset="0"/>
+              <a:buChar char="•"/>
+            </a:pPr>
+            <a:r>
+              <a:rPr lang="en-US" sz="2800" dirty="0"/>
+              <a:t>A Reduction in the number of files and the total disk space used by the entire CDB is seen with each option.</a:t>
+            </a:r>
+          </a:p>
+          <a:p>
+            <a:pPr marL="285750" indent="-285750">
+              <a:buFont typeface="Arial" panose="020B0604020202020204" pitchFamily="34" charset="0"/>
+              <a:buChar char="•"/>
+            </a:pPr>
+            <a:r>
+              <a:rPr lang="en-US" sz="2800" dirty="0"/>
+              <a:t>CDB Raster layers are unchanged, these benefits are entirely due to replacing </a:t>
+            </a:r>
+            <a:r>
+              <a:rPr lang="en-US" sz="2800" dirty="0" err="1"/>
+              <a:t>ShapeFiles</a:t>
+            </a:r>
+            <a:r>
+              <a:rPr lang="en-US" sz="2800" dirty="0"/>
+              <a:t>.</a:t>
+            </a:r>
+          </a:p>
+        </p:txBody>
+      </p:sp>
+      <p:sp>
+        <p:nvSpPr>
+          <p:cNvPr id="7" name="Title 1">
+            <a:extLst>
+              <a:ext uri="{FF2B5EF4-FFF2-40B4-BE49-F238E27FC236}">
+                <a16:creationId xmlns:a16="http://schemas.microsoft.com/office/drawing/2014/main" id="{A6807A16-D326-4A9A-BFCB-160EC76B776C}"/>
+              </a:ext>
+            </a:extLst>
+          </p:cNvPr>
+          <p:cNvSpPr txBox="1">
+            <a:spLocks/>
+          </p:cNvSpPr>
+          <p:nvPr/>
+        </p:nvSpPr>
+        <p:spPr>
+          <a:xfrm>
+            <a:off x="0" y="672747"/>
+            <a:ext cx="12192000" cy="715556"/>
+          </a:xfrm>
+          <a:prstGeom prst="rect">
+            <a:avLst/>
+          </a:prstGeom>
+          <a:solidFill>
+            <a:schemeClr val="tx1"/>
+          </a:solidFill>
+        </p:spPr>
+        <p:txBody>
+          <a:bodyPr vert="horz" lIns="91440" tIns="45720" rIns="91440" bIns="45720" rtlCol="0" anchor="ctr">
+            <a:normAutofit/>
+          </a:bodyPr>
+          <a:lstStyle>
+            <a:lvl1pPr algn="l" defTabSz="914400" rtl="0" eaLnBrk="1" latinLnBrk="0" hangingPunct="1">
+              <a:lnSpc>
+                <a:spcPct val="90000"/>
+              </a:lnSpc>
+              <a:spcBef>
+                <a:spcPct val="0"/>
+              </a:spcBef>
+              <a:buNone/>
+              <a:defRPr sz="4400" kern="1200">
+                <a:solidFill>
+                  <a:schemeClr val="tx1"/>
+                </a:solidFill>
+                <a:latin typeface="+mj-lt"/>
+                <a:ea typeface="+mj-ea"/>
+                <a:cs typeface="+mj-cs"/>
+              </a:defRPr>
+            </a:lvl1pPr>
+          </a:lstStyle>
+          <a:p>
+            <a:pPr algn="ctr"/>
+            <a:r>
+              <a:rPr lang="en-US" sz="3200" dirty="0">
+                <a:solidFill>
+                  <a:schemeClr val="bg1"/>
+                </a:solidFill>
+              </a:rPr>
+              <a:t>Benefits</a:t>
+            </a:r>
+          </a:p>
+        </p:txBody>
+      </p:sp>
     </p:spTree>
     <p:extLst>
       <p:ext uri="{BB962C8B-B14F-4D97-AF65-F5344CB8AC3E}">
@@ -8442,13 +11698,13 @@
             <p:ph idx="1"/>
             <p:extLst>
               <p:ext uri="{D42A27DB-BD31-4B8C-83A1-F6EECF244321}">
-                <p14:modId xmlns:p14="http://schemas.microsoft.com/office/powerpoint/2010/main" val="3710809710"/>
+                <p14:modId xmlns:p14="http://schemas.microsoft.com/office/powerpoint/2010/main" val="2998525464"/>
               </p:ext>
             </p:extLst>
           </p:nvPr>
         </p:nvGraphicFramePr>
         <p:xfrm>
-          <a:off x="838200" y="2375050"/>
+          <a:off x="838200" y="1544539"/>
           <a:ext cx="10515603" cy="3041355"/>
         </p:xfrm>
         <a:graphic>
@@ -9216,6 +12472,50 @@
           </a:graphicData>
         </a:graphic>
       </p:graphicFrame>
+      <p:sp>
+        <p:nvSpPr>
+          <p:cNvPr id="3" name="TextBox 2">
+            <a:extLst>
+              <a:ext uri="{FF2B5EF4-FFF2-40B4-BE49-F238E27FC236}">
+                <a16:creationId xmlns:a16="http://schemas.microsoft.com/office/drawing/2014/main" id="{D207041D-B4DB-4C1F-BB88-CF76EF4E21DE}"/>
+              </a:ext>
+            </a:extLst>
+          </p:cNvPr>
+          <p:cNvSpPr txBox="1"/>
+          <p:nvPr/>
+        </p:nvSpPr>
+        <p:spPr>
+          <a:xfrm>
+            <a:off x="838197" y="4865615"/>
+            <a:ext cx="10515603" cy="369332"/>
+          </a:xfrm>
+          <a:prstGeom prst="rect">
+            <a:avLst/>
+          </a:prstGeom>
+          <a:noFill/>
+        </p:spPr>
+        <p:txBody>
+          <a:bodyPr wrap="square" rtlCol="0">
+            <a:spAutoFit/>
+          </a:bodyPr>
+          <a:lstStyle/>
+          <a:p>
+            <a:pPr algn="ctr"/>
+            <a:r>
+              <a:rPr lang="en-US" b="1" dirty="0"/>
+              <a:t>GeoCDB impact on the entire CDB as a result of replacing </a:t>
+            </a:r>
+            <a:r>
+              <a:rPr lang="en-US" b="1" dirty="0" err="1"/>
+              <a:t>ShapeFiles</a:t>
+            </a:r>
+            <a:r>
+              <a:rPr lang="en-US" b="1" dirty="0"/>
+              <a:t> with GeoPackage</a:t>
+            </a:r>
+          </a:p>
+        </p:txBody>
+      </p:sp>
     </p:spTree>
     <p:extLst>
       <p:ext uri="{BB962C8B-B14F-4D97-AF65-F5344CB8AC3E}">
@@ -9402,7 +12702,7 @@
             <p:ph idx="1"/>
             <p:extLst>
               <p:ext uri="{D42A27DB-BD31-4B8C-83A1-F6EECF244321}">
-                <p14:modId xmlns:p14="http://schemas.microsoft.com/office/powerpoint/2010/main" val="515928461"/>
+                <p14:modId xmlns:p14="http://schemas.microsoft.com/office/powerpoint/2010/main" val="2113914582"/>
               </p:ext>
             </p:extLst>
           </p:nvPr>
@@ -9577,7 +12877,7 @@
           <a:p>
             <a:pPr algn="ctr"/>
             <a:r>
-              <a:rPr lang="en-US" sz="3200">
+              <a:rPr lang="en-US" sz="3200" dirty="0">
                 <a:solidFill>
                   <a:schemeClr val="bg1"/>
                 </a:solidFill>
@@ -10587,7 +13887,7 @@
             <p:ph sz="half" idx="1"/>
             <p:extLst>
               <p:ext uri="{D42A27DB-BD31-4B8C-83A1-F6EECF244321}">
-                <p14:modId xmlns:p14="http://schemas.microsoft.com/office/powerpoint/2010/main" val="2431698781"/>
+                <p14:modId xmlns:p14="http://schemas.microsoft.com/office/powerpoint/2010/main" val="2472279953"/>
               </p:ext>
             </p:extLst>
           </p:nvPr>
@@ -10620,7 +13920,7 @@
         </p:nvSpPr>
         <p:spPr/>
         <p:txBody>
-          <a:bodyPr/>
+          <a:bodyPr anchor="ctr"/>
           <a:lstStyle/>
           <a:p>
             <a:r>
@@ -10642,6 +13942,73 @@
           </a:p>
         </p:txBody>
       </p:sp>
+      <p:sp>
+        <p:nvSpPr>
+          <p:cNvPr id="6" name="Title 1">
+            <a:extLst>
+              <a:ext uri="{FF2B5EF4-FFF2-40B4-BE49-F238E27FC236}">
+                <a16:creationId xmlns:a16="http://schemas.microsoft.com/office/drawing/2014/main" id="{CE8E0F03-AF05-4433-A280-C27B13F1EEA4}"/>
+              </a:ext>
+            </a:extLst>
+          </p:cNvPr>
+          <p:cNvSpPr txBox="1">
+            <a:spLocks/>
+          </p:cNvSpPr>
+          <p:nvPr/>
+        </p:nvSpPr>
+        <p:spPr>
+          <a:xfrm>
+            <a:off x="0" y="672747"/>
+            <a:ext cx="12192000" cy="715556"/>
+          </a:xfrm>
+          <a:prstGeom prst="rect">
+            <a:avLst/>
+          </a:prstGeom>
+          <a:solidFill>
+            <a:schemeClr val="tx1"/>
+          </a:solidFill>
+        </p:spPr>
+        <p:txBody>
+          <a:bodyPr vert="horz" lIns="91440" tIns="45720" rIns="91440" bIns="45720" rtlCol="0" anchor="ctr">
+            <a:normAutofit/>
+          </a:bodyPr>
+          <a:lstStyle>
+            <a:lvl1pPr algn="l" defTabSz="914400" rtl="0" eaLnBrk="1" latinLnBrk="0" hangingPunct="1">
+              <a:lnSpc>
+                <a:spcPct val="90000"/>
+              </a:lnSpc>
+              <a:spcBef>
+                <a:spcPct val="0"/>
+              </a:spcBef>
+              <a:buNone/>
+              <a:defRPr sz="4400" kern="1200">
+                <a:solidFill>
+                  <a:schemeClr val="tx1"/>
+                </a:solidFill>
+                <a:latin typeface="+mj-lt"/>
+                <a:ea typeface="+mj-ea"/>
+                <a:cs typeface="+mj-cs"/>
+              </a:defRPr>
+            </a:lvl1pPr>
+          </a:lstStyle>
+          <a:p>
+            <a:pPr algn="ctr"/>
+            <a:r>
+              <a:rPr lang="en-US" sz="3200">
+                <a:solidFill>
+                  <a:schemeClr val="bg1"/>
+                </a:solidFill>
+              </a:rPr>
+              <a:t>Performance</a:t>
+            </a:r>
+            <a:endParaRPr lang="en-US" sz="3200" dirty="0">
+              <a:solidFill>
+                <a:schemeClr val="bg1"/>
+              </a:solidFill>
+            </a:endParaRPr>
+          </a:p>
+        </p:txBody>
+      </p:sp>
     </p:spTree>
     <p:extLst>
       <p:ext uri="{BB962C8B-B14F-4D97-AF65-F5344CB8AC3E}">
@@ -10658,6 +14025,14 @@
 <file path=ppt/slides/slide8.xml><?xml version="1.0" encoding="utf-8"?>
 <p:sld xmlns:a="http://schemas.openxmlformats.org/drawingml/2006/main" xmlns:r="http://schemas.openxmlformats.org/officeDocument/2006/relationships" xmlns:p="http://schemas.openxmlformats.org/presentationml/2006/main">
   <p:cSld>
+    <p:bg>
+      <p:bgPr>
+        <a:solidFill>
+          <a:schemeClr val="bg1"/>
+        </a:solidFill>
+        <a:effectLst/>
+      </p:bgPr>
+    </p:bg>
     <p:spTree>
       <p:nvGrpSpPr>
         <p:cNvPr id="1" name=""/>
@@ -10674,6 +14049,98 @@
       </p:grpSpPr>
       <p:sp>
         <p:nvSpPr>
+          <p:cNvPr id="13" name="Rectangle 12">
+            <a:extLst>
+              <a:ext uri="{FF2B5EF4-FFF2-40B4-BE49-F238E27FC236}">
+                <a16:creationId xmlns:a16="http://schemas.microsoft.com/office/drawing/2014/main" id="{96918796-2918-40D6-BE3A-4600C47FCD42}"/>
+              </a:ext>
+              <a:ext uri="{C183D7F6-B498-43B3-948B-1728B52AA6E4}">
+                <adec:decorative xmlns:adec="http://schemas.microsoft.com/office/drawing/2017/decorative" val="1"/>
+              </a:ext>
+            </a:extLst>
+          </p:cNvPr>
+          <p:cNvSpPr>
+            <a:spLocks noGrp="1" noRot="1" noChangeAspect="1" noMove="1" noResize="1" noEditPoints="1" noAdjustHandles="1" noChangeArrowheads="1" noChangeShapeType="1" noTextEdit="1"/>
+          </p:cNvSpPr>
+          <p:nvPr>
+            <p:extLst>
+              <p:ext uri="{386F3935-93C4-4BCD-93E2-E3B085C9AB24}">
+                <p16:designElem xmlns:p16="http://schemas.microsoft.com/office/powerpoint/2015/main" val="1"/>
+              </p:ext>
+            </p:extLst>
+          </p:nvPr>
+        </p:nvSpPr>
+        <p:spPr>
+          <a:xfrm>
+            <a:off x="0" y="651752"/>
+            <a:ext cx="12192000" cy="736551"/>
+          </a:xfrm>
+          <a:prstGeom prst="rect">
+            <a:avLst/>
+          </a:prstGeom>
+          <a:solidFill>
+            <a:schemeClr val="tx1"/>
+          </a:solidFill>
+          <a:ln>
+            <a:noFill/>
+          </a:ln>
+        </p:spPr>
+        <p:style>
+          <a:lnRef idx="2">
+            <a:schemeClr val="accent1">
+              <a:shade val="50000"/>
+            </a:schemeClr>
+          </a:lnRef>
+          <a:fillRef idx="1">
+            <a:schemeClr val="accent1"/>
+          </a:fillRef>
+          <a:effectRef idx="0">
+            <a:schemeClr val="accent1"/>
+          </a:effectRef>
+          <a:fontRef idx="minor">
+            <a:schemeClr val="lt1"/>
+          </a:fontRef>
+        </p:style>
+        <p:txBody>
+          <a:bodyPr rtlCol="0" anchor="ctr"/>
+          <a:lstStyle/>
+          <a:p>
+            <a:pPr marL="0" marR="0" lvl="0" indent="0" algn="ctr" defTabSz="457200" rtl="0" eaLnBrk="1" fontAlgn="auto" latinLnBrk="0" hangingPunct="1">
+              <a:lnSpc>
+                <a:spcPct val="100000"/>
+              </a:lnSpc>
+              <a:spcBef>
+                <a:spcPts val="0"/>
+              </a:spcBef>
+              <a:spcAft>
+                <a:spcPts val="0"/>
+              </a:spcAft>
+              <a:buClrTx/>
+              <a:buSzTx/>
+              <a:buFontTx/>
+              <a:buNone/>
+              <a:tabLst/>
+              <a:defRPr/>
+            </a:pPr>
+            <a:endParaRPr kumimoji="0" lang="en-US" sz="1800" b="0" i="0" u="none" strike="noStrike" kern="1200" cap="none" spc="0" normalizeH="0" baseline="0" noProof="0">
+              <a:ln>
+                <a:noFill/>
+              </a:ln>
+              <a:solidFill>
+                <a:prstClr val="white"/>
+              </a:solidFill>
+              <a:effectLst/>
+              <a:uLnTx/>
+              <a:uFillTx/>
+              <a:latin typeface="Calibri" panose="020F0502020204030204"/>
+              <a:ea typeface="+mn-ea"/>
+              <a:cs typeface="+mn-cs"/>
+            </a:endParaRPr>
+          </a:p>
+        </p:txBody>
+      </p:sp>
+      <p:sp>
+        <p:nvSpPr>
           <p:cNvPr id="5" name="Title 4">
             <a:extLst>
               <a:ext uri="{FF2B5EF4-FFF2-40B4-BE49-F238E27FC236}">
@@ -10688,80 +14155,61 @@
             <p:ph type="title"/>
           </p:nvPr>
         </p:nvSpPr>
-        <p:spPr/>
+        <p:spPr>
+          <a:xfrm>
+            <a:off x="838200" y="672747"/>
+            <a:ext cx="10515600" cy="715556"/>
+          </a:xfrm>
+        </p:spPr>
         <p:txBody>
-          <a:bodyPr/>
+          <a:bodyPr>
+            <a:normAutofit/>
+          </a:bodyPr>
           <a:lstStyle/>
           <a:p>
+            <a:pPr algn="ctr"/>
             <a:r>
-              <a:rPr lang="en-US" dirty="0"/>
+              <a:rPr lang="en-US" sz="3200">
+                <a:solidFill>
+                  <a:schemeClr val="bg1"/>
+                </a:solidFill>
+              </a:rPr>
               <a:t>GeoCDB Tools</a:t>
             </a:r>
           </a:p>
         </p:txBody>
       </p:sp>
-      <p:sp>
-        <p:nvSpPr>
-          <p:cNvPr id="6" name="Content Placeholder 5">
+      <p:graphicFrame>
+        <p:nvGraphicFramePr>
+          <p:cNvPr id="8" name="Content Placeholder 5">
             <a:extLst>
               <a:ext uri="{FF2B5EF4-FFF2-40B4-BE49-F238E27FC236}">
-                <a16:creationId xmlns:a16="http://schemas.microsoft.com/office/drawing/2014/main" id="{50EFCD4C-02C3-4968-BCB7-9362609D5739}"/>
+                <a16:creationId xmlns:a16="http://schemas.microsoft.com/office/drawing/2014/main" id="{B074E57F-E9A5-4E70-91D2-64D8939A4843}"/>
               </a:ext>
             </a:extLst>
           </p:cNvPr>
-          <p:cNvSpPr>
-            <a:spLocks noGrp="1"/>
-          </p:cNvSpPr>
+          <p:cNvGraphicFramePr>
+            <a:graphicFrameLocks noGrp="1"/>
+          </p:cNvGraphicFramePr>
           <p:nvPr>
             <p:ph idx="1"/>
+            <p:extLst>
+              <p:ext uri="{D42A27DB-BD31-4B8C-83A1-F6EECF244321}">
+                <p14:modId xmlns:p14="http://schemas.microsoft.com/office/powerpoint/2010/main" val="2445385575"/>
+              </p:ext>
+            </p:extLst>
           </p:nvPr>
-        </p:nvSpPr>
-        <p:spPr/>
-        <p:txBody>
-          <a:bodyPr/>
-          <a:lstStyle/>
-          <a:p>
-            <a:r>
-              <a:rPr lang="en-US" dirty="0"/>
-              <a:t>Prototype tools to convert an existing CDB to GeoCDB are being published on GitHub:</a:t>
-            </a:r>
-          </a:p>
-          <a:p>
-            <a:pPr lvl="1"/>
-            <a:r>
-              <a:rPr lang="en-US" dirty="0">
-                <a:hlinkClick r:id="rId2"/>
-              </a:rPr>
-              <a:t>https://github.com/Cognitics/GeoCDB</a:t>
-            </a:r>
-            <a:endParaRPr lang="en-US" dirty="0"/>
-          </a:p>
-          <a:p>
-            <a:pPr lvl="1"/>
-            <a:r>
-              <a:rPr lang="en-US" dirty="0"/>
-              <a:t>Existing Prototype tools have been developed in Python using GDAL, other languages/environments </a:t>
-            </a:r>
-            <a:r>
-              <a:rPr lang="en-US"/>
-              <a:t>are planned</a:t>
-            </a:r>
-            <a:endParaRPr lang="en-US" dirty="0"/>
-          </a:p>
-          <a:p>
-            <a:r>
-              <a:rPr lang="en-US" dirty="0"/>
-              <a:t>Additional tools and performance analysis are continuing to be developed and updated on GitHub</a:t>
-            </a:r>
-          </a:p>
-          <a:p>
-            <a:r>
-              <a:rPr lang="en-US" dirty="0"/>
-              <a:t>Contributions and pull requests are welcome</a:t>
-            </a:r>
-          </a:p>
-        </p:txBody>
-      </p:sp>
+        </p:nvGraphicFramePr>
+        <p:xfrm>
+          <a:off x="838200" y="2166938"/>
+          <a:ext cx="10515600" cy="3457575"/>
+        </p:xfrm>
+        <a:graphic>
+          <a:graphicData uri="http://schemas.openxmlformats.org/drawingml/2006/diagram">
+            <dgm:relIds xmlns:dgm="http://schemas.openxmlformats.org/drawingml/2006/diagram" xmlns:r="http://schemas.openxmlformats.org/officeDocument/2006/relationships" r:dm="rId2" r:lo="rId3" r:qs="rId4" r:cs="rId5"/>
+          </a:graphicData>
+        </a:graphic>
+      </p:graphicFrame>
     </p:spTree>
     <p:extLst>
       <p:ext uri="{BB962C8B-B14F-4D97-AF65-F5344CB8AC3E}">

</xml_diff>